<commit_message>
Improved formatting for "9. Encapsulation"
</commit_message>
<xml_diff>
--- a/Courses/Software-Sciences/Module-1-OOP-New/09-Encapsulation/09-Encapsulation.pptx
+++ b/Courses/Software-Sciences/Module-1-OOP-New/09-Encapsulation/09-Encapsulation.pptx
@@ -143,7 +143,7 @@
   <p:extLst>
     <p:ext uri="{521415D9-36F7-43E2-AB2F-B90AF26B5E84}">
       <p14:sectionLst xmlns:p14="http://schemas.microsoft.com/office/powerpoint/2010/main">
-        <p14:section name="Intro" id="{6DFFD998-DD8C-4528-A37B-9330D0402A4D}">
+        <p14:section name="Въведение" id="{6DFFD998-DD8C-4528-A37B-9330D0402A4D}">
           <p14:sldIdLst>
             <p14:sldId id="291"/>
             <p14:sldId id="292"/>
@@ -156,7 +156,7 @@
             <p14:sldId id="296"/>
           </p14:sldIdLst>
         </p14:section>
-        <p14:section name="Access Modifiers" id="{0223928D-95C5-487D-B9F1-73D870003CF5}">
+        <p14:section name="Модификатори за достъп" id="{0223928D-95C5-487D-B9F1-73D870003CF5}">
           <p14:sldIdLst>
             <p14:sldId id="298"/>
             <p14:sldId id="299"/>
@@ -276,7 +276,7 @@
             </a:lvl1pPr>
           </a:lstStyle>
           <a:p>
-            <a:endParaRPr lang="bg-BG"/>
+            <a:endParaRPr lang="bg-BG" dirty="0"/>
           </a:p>
         </p:txBody>
       </p:sp>
@@ -315,9 +315,9 @@
           <a:p>
             <a:fld id="{4E087215-0C8F-4762-A664-737A353EC9A4}" type="datetimeFigureOut">
               <a:rPr lang="bg-BG" smtClean="0"/>
-              <a:t>9.12.22 г.</a:t>
+              <a:t>17.12.22 г.</a:t>
             </a:fld>
-            <a:endParaRPr lang="bg-BG"/>
+            <a:endParaRPr lang="bg-BG" dirty="0"/>
           </a:p>
         </p:txBody>
       </p:sp>
@@ -473,7 +473,7 @@
             </a:lvl1pPr>
           </a:lstStyle>
           <a:p>
-            <a:endParaRPr lang="en-US"/>
+            <a:endParaRPr lang="en-US" dirty="0"/>
           </a:p>
         </p:txBody>
       </p:sp>
@@ -506,9 +506,9 @@
           <a:p>
             <a:fld id="{72D84649-876A-46C9-8472-14CB09C070D8}" type="datetimeFigureOut">
               <a:rPr lang="en-US" smtClean="0"/>
-              <a:t>12/9/22</a:t>
+              <a:t>12/17/22</a:t>
             </a:fld>
-            <a:endParaRPr lang="en-US"/>
+            <a:endParaRPr lang="en-US" dirty="0"/>
           </a:p>
         </p:txBody>
       </p:sp>
@@ -541,7 +541,7 @@
           <a:bodyPr vert="horz" lIns="91440" tIns="45720" rIns="91440" bIns="45720" rtlCol="0" anchor="ctr"/>
           <a:lstStyle/>
           <a:p>
-            <a:endParaRPr lang="en-US"/>
+            <a:endParaRPr lang="en-US" dirty="0"/>
           </a:p>
         </p:txBody>
       </p:sp>
@@ -948,7 +948,7 @@
           <a:bodyPr/>
           <a:lstStyle/>
           <a:p>
-            <a:endParaRPr lang="en-BG" dirty="0"/>
+            <a:endParaRPr lang="en-BG"/>
           </a:p>
         </p:txBody>
       </p:sp>
@@ -991,20 +991,19 @@
           <a:lstStyle/>
           <a:p>
             <a:r>
-              <a:rPr lang="en-US"/>
+              <a:rPr lang="en-US" dirty="0"/>
               <a:t>© SoftUni – </a:t>
             </a:r>
             <a:r>
-              <a:rPr lang="en-US" u="sng">
+              <a:rPr lang="en-US" u="sng" dirty="0">
                 <a:hlinkClick r:id="rId3"/>
               </a:rPr>
               <a:t>https://softuni.org</a:t>
             </a:r>
             <a:r>
-              <a:rPr lang="en-US"/>
+              <a:rPr lang="en-US" dirty="0"/>
               <a:t>. Copyrighted document. Unauthorized copy or reproduction is not permitted.</a:t>
             </a:r>
-            <a:endParaRPr lang="en-US" dirty="0"/>
           </a:p>
         </p:txBody>
       </p:sp>
@@ -1470,7 +1469,7 @@
           <a:bodyPr/>
           <a:lstStyle/>
           <a:p>
-            <a:endParaRPr lang="en-BG" dirty="0"/>
+            <a:endParaRPr lang="en-BG"/>
           </a:p>
         </p:txBody>
       </p:sp>
@@ -1513,20 +1512,19 @@
           <a:lstStyle/>
           <a:p>
             <a:r>
-              <a:rPr lang="en-US"/>
+              <a:rPr lang="en-US" dirty="0"/>
               <a:t>© SoftUni – </a:t>
             </a:r>
             <a:r>
-              <a:rPr lang="en-US" u="sng">
+              <a:rPr lang="en-US" u="sng" dirty="0">
                 <a:hlinkClick r:id="rId3"/>
               </a:rPr>
               <a:t>https://softuni.org</a:t>
             </a:r>
             <a:r>
-              <a:rPr lang="en-US"/>
+              <a:rPr lang="en-US" dirty="0"/>
               <a:t>. Copyrighted document. Unauthorized copy or reproduction is not permitted.</a:t>
             </a:r>
-            <a:endParaRPr lang="en-US" dirty="0"/>
           </a:p>
         </p:txBody>
       </p:sp>
@@ -2126,7 +2124,7 @@
           <a:bodyPr/>
           <a:lstStyle/>
           <a:p>
-            <a:endParaRPr lang="en-US"/>
+            <a:endParaRPr lang="en-US" dirty="0"/>
           </a:p>
         </p:txBody>
       </p:sp>
@@ -2533,7 +2531,7 @@
           <a:bodyPr/>
           <a:lstStyle/>
           <a:p>
-            <a:endParaRPr lang="en-US"/>
+            <a:endParaRPr lang="en-US" dirty="0"/>
           </a:p>
         </p:txBody>
       </p:sp>
@@ -3756,7 +3754,7 @@
               <a:tabLst/>
               <a:defRPr/>
             </a:pPr>
-            <a:endParaRPr kumimoji="0" lang="en-US" altLang="ko-KR" sz="2398" b="0" i="0" u="none" strike="noStrike" kern="1200" cap="none" spc="0" normalizeH="0" baseline="0" noProof="0">
+            <a:endParaRPr kumimoji="0" lang="en-US" altLang="ko-KR" sz="2398" b="0" i="0" u="none" strike="noStrike" kern="1200" cap="none" spc="0" normalizeH="0" baseline="0" noProof="0" dirty="0">
               <a:ln>
                 <a:noFill/>
               </a:ln>
@@ -4385,7 +4383,7 @@
               <a:tabLst/>
               <a:defRPr/>
             </a:pPr>
-            <a:endParaRPr kumimoji="0" lang="en-US" altLang="ko-KR" sz="2398" b="0" i="0" u="none" strike="noStrike" kern="1200" cap="none" spc="0" normalizeH="0" baseline="0" noProof="0">
+            <a:endParaRPr kumimoji="0" lang="en-US" altLang="ko-KR" sz="2398" b="0" i="0" u="none" strike="noStrike" kern="1200" cap="none" spc="0" normalizeH="0" baseline="0" noProof="0" dirty="0">
               <a:ln>
                 <a:noFill/>
               </a:ln>
@@ -4508,7 +4506,7 @@
               <a:tabLst/>
               <a:defRPr/>
             </a:pPr>
-            <a:endParaRPr kumimoji="0" lang="en-US" altLang="ko-KR" sz="2398" b="0" i="0" u="none" strike="noStrike" kern="1200" cap="none" spc="0" normalizeH="0" baseline="0" noProof="0">
+            <a:endParaRPr kumimoji="0" lang="en-US" altLang="ko-KR" sz="2398" b="0" i="0" u="none" strike="noStrike" kern="1200" cap="none" spc="0" normalizeH="0" baseline="0" noProof="0" dirty="0">
               <a:ln>
                 <a:noFill/>
               </a:ln>
@@ -4781,7 +4779,7 @@
               <a:tabLst/>
               <a:defRPr/>
             </a:pPr>
-            <a:endParaRPr kumimoji="0" lang="en-US" altLang="ko-KR" sz="2398" b="0" i="0" u="none" strike="noStrike" kern="1200" cap="none" spc="0" normalizeH="0" baseline="0" noProof="0">
+            <a:endParaRPr kumimoji="0" lang="en-US" altLang="ko-KR" sz="2398" b="0" i="0" u="none" strike="noStrike" kern="1200" cap="none" spc="0" normalizeH="0" baseline="0" noProof="0" dirty="0">
               <a:ln>
                 <a:noFill/>
               </a:ln>
@@ -4967,7 +4965,7 @@
               <a:pPr/>
               <a:t>‹#›</a:t>
             </a:fld>
-            <a:endParaRPr lang="en-US" noProof="0"/>
+            <a:endParaRPr lang="en-US" noProof="0" dirty="0"/>
           </a:p>
         </p:txBody>
       </p:sp>
@@ -5121,7 +5119,7 @@
           </a:lstStyle>
           <a:p>
             <a:r>
-              <a:rPr lang="en-US" altLang="ko-KR" noProof="0"/>
+              <a:rPr lang="en-US" altLang="ko-KR" noProof="0" dirty="0"/>
               <a:t>Your Picture Here</a:t>
             </a:r>
           </a:p>
@@ -5185,7 +5183,7 @@
               <a:tabLst/>
               <a:defRPr/>
             </a:pPr>
-            <a:endParaRPr kumimoji="0" lang="en-US" altLang="ko-KR" sz="2398" b="0" i="0" u="none" strike="noStrike" kern="1200" cap="none" spc="0" normalizeH="0" baseline="0" noProof="0">
+            <a:endParaRPr kumimoji="0" lang="en-US" altLang="ko-KR" sz="2398" b="0" i="0" u="none" strike="noStrike" kern="1200" cap="none" spc="0" normalizeH="0" baseline="0" noProof="0" dirty="0">
               <a:ln>
                 <a:noFill/>
               </a:ln>
@@ -5260,7 +5258,7 @@
               <a:tabLst/>
               <a:defRPr/>
             </a:pPr>
-            <a:endParaRPr kumimoji="0" lang="en-US" altLang="ko-KR" sz="2398" b="0" i="0" u="none" strike="noStrike" kern="1200" cap="none" spc="0" normalizeH="0" baseline="0" noProof="0">
+            <a:endParaRPr kumimoji="0" lang="en-US" altLang="ko-KR" sz="2398" b="0" i="0" u="none" strike="noStrike" kern="1200" cap="none" spc="0" normalizeH="0" baseline="0" noProof="0" dirty="0">
               <a:ln>
                 <a:noFill/>
               </a:ln>
@@ -5341,7 +5339,7 @@
               <a:tabLst/>
               <a:defRPr/>
             </a:pPr>
-            <a:endParaRPr kumimoji="0" lang="en-US" altLang="ko-KR" sz="2398" b="0" i="0" u="none" strike="noStrike" kern="1200" cap="none" spc="0" normalizeH="0" baseline="0" noProof="0">
+            <a:endParaRPr kumimoji="0" lang="en-US" altLang="ko-KR" sz="2398" b="0" i="0" u="none" strike="noStrike" kern="1200" cap="none" spc="0" normalizeH="0" baseline="0" noProof="0" dirty="0">
               <a:ln>
                 <a:noFill/>
               </a:ln>
@@ -5422,7 +5420,7 @@
               <a:tabLst/>
               <a:defRPr/>
             </a:pPr>
-            <a:endParaRPr kumimoji="0" lang="en-US" altLang="ko-KR" sz="2398" b="0" i="0" u="none" strike="noStrike" kern="1200" cap="none" spc="0" normalizeH="0" baseline="0" noProof="0">
+            <a:endParaRPr kumimoji="0" lang="en-US" altLang="ko-KR" sz="2398" b="0" i="0" u="none" strike="noStrike" kern="1200" cap="none" spc="0" normalizeH="0" baseline="0" noProof="0" dirty="0">
               <a:ln>
                 <a:noFill/>
               </a:ln>
@@ -5626,7 +5624,7 @@
               <a:tabLst/>
               <a:defRPr/>
             </a:pPr>
-            <a:endParaRPr kumimoji="0" lang="en-US" altLang="ko-KR" sz="2398" b="0" i="0" u="none" strike="noStrike" kern="1200" cap="none" spc="0" normalizeH="0" baseline="0" noProof="0">
+            <a:endParaRPr kumimoji="0" lang="en-US" altLang="ko-KR" sz="2398" b="0" i="0" u="none" strike="noStrike" kern="1200" cap="none" spc="0" normalizeH="0" baseline="0" noProof="0" dirty="0">
               <a:ln>
                 <a:noFill/>
               </a:ln>
@@ -7132,7 +7130,7 @@
               <a:tabLst/>
               <a:defRPr/>
             </a:pPr>
-            <a:endParaRPr kumimoji="0" lang="en-US" altLang="ko-KR" sz="2398" b="0" i="0" u="none" strike="noStrike" kern="1200" cap="none" spc="0" normalizeH="0" baseline="0" noProof="0">
+            <a:endParaRPr kumimoji="0" lang="en-US" altLang="ko-KR" sz="2398" b="0" i="0" u="none" strike="noStrike" kern="1200" cap="none" spc="0" normalizeH="0" baseline="0" noProof="0" dirty="0">
               <a:ln>
                 <a:noFill/>
               </a:ln>
@@ -7460,7 +7458,7 @@
               <a:tabLst/>
               <a:defRPr/>
             </a:pPr>
-            <a:endParaRPr kumimoji="0" lang="en-US" altLang="ko-KR" sz="2398" b="0" i="0" u="none" strike="noStrike" kern="1200" cap="none" spc="0" normalizeH="0" baseline="0" noProof="0">
+            <a:endParaRPr kumimoji="0" lang="en-US" altLang="ko-KR" sz="2398" b="0" i="0" u="none" strike="noStrike" kern="1200" cap="none" spc="0" normalizeH="0" baseline="0" noProof="0" dirty="0">
               <a:ln>
                 <a:noFill/>
               </a:ln>
@@ -7630,7 +7628,7 @@
               <a:pPr/>
               <a:t>‹#›</a:t>
             </a:fld>
-            <a:endParaRPr lang="en-US" noProof="0"/>
+            <a:endParaRPr lang="en-US" noProof="0" dirty="0"/>
           </a:p>
         </p:txBody>
       </p:sp>
@@ -7825,7 +7823,7 @@
               <a:tabLst/>
               <a:defRPr/>
             </a:pPr>
-            <a:endParaRPr kumimoji="0" lang="en-US" altLang="ko-KR" sz="2398" b="0" i="0" u="none" strike="noStrike" kern="1200" cap="none" spc="0" normalizeH="0" baseline="0" noProof="0">
+            <a:endParaRPr kumimoji="0" lang="en-US" altLang="ko-KR" sz="2398" b="0" i="0" u="none" strike="noStrike" kern="1200" cap="none" spc="0" normalizeH="0" baseline="0" noProof="0" dirty="0">
               <a:ln>
                 <a:noFill/>
               </a:ln>
@@ -9086,7 +9084,7 @@
               <a:pPr/>
               <a:t>‹#›</a:t>
             </a:fld>
-            <a:endParaRPr lang="en-US" noProof="0"/>
+            <a:endParaRPr lang="en-US" noProof="0" dirty="0"/>
           </a:p>
         </p:txBody>
       </p:sp>
@@ -9154,7 +9152,7 @@
               <a:tabLst/>
               <a:defRPr/>
             </a:pPr>
-            <a:endParaRPr kumimoji="0" lang="en-US" altLang="ko-KR" sz="2398" b="0" i="0" u="none" strike="noStrike" kern="1200" cap="none" spc="0" normalizeH="0" baseline="0" noProof="0">
+            <a:endParaRPr kumimoji="0" lang="en-US" altLang="ko-KR" sz="2398" b="0" i="0" u="none" strike="noStrike" kern="1200" cap="none" spc="0" normalizeH="0" baseline="0" noProof="0" dirty="0">
               <a:ln>
                 <a:noFill/>
               </a:ln>
@@ -9522,7 +9520,7 @@
               <a:tabLst/>
               <a:defRPr/>
             </a:pPr>
-            <a:endParaRPr kumimoji="0" lang="en-US" altLang="ko-KR" sz="2398" b="0" i="0" u="none" strike="noStrike" kern="1200" cap="none" spc="0" normalizeH="0" baseline="0" noProof="0">
+            <a:endParaRPr kumimoji="0" lang="en-US" altLang="ko-KR" sz="2398" b="0" i="0" u="none" strike="noStrike" kern="1200" cap="none" spc="0" normalizeH="0" baseline="0" noProof="0" dirty="0">
               <a:ln>
                 <a:noFill/>
               </a:ln>
@@ -10174,7 +10172,7 @@
           <a:lstStyle/>
           <a:p>
             <a:r>
-              <a:rPr lang="en-US">
+              <a:rPr lang="en-US" dirty="0">
                 <a:hlinkClick r:id="rId3"/>
               </a:rPr>
               <a:t>https://softuni.bg</a:t>
@@ -10339,7 +10337,7 @@
           <a:lstStyle/>
           <a:p>
             <a:r>
-              <a:rPr lang="bg-BG" dirty="0" err="1"/>
+              <a:rPr lang="bg-BG" dirty="0"/>
               <a:t>Енкапсулация</a:t>
             </a:r>
             <a:endParaRPr lang="en-US" dirty="0"/>
@@ -16400,11 +16398,7 @@
             </a:pPr>
             <a:r>
               <a:rPr lang="bg-BG" sz="4000" dirty="0"/>
-              <a:t>Какво е </a:t>
-            </a:r>
-            <a:r>
-              <a:rPr lang="bg-BG" sz="4000" dirty="0" err="1"/>
-              <a:t>енкапсулация</a:t>
+              <a:t>Какво е енкапсулация</a:t>
             </a:r>
             <a:r>
               <a:rPr lang="en-US" sz="4000" dirty="0"/>
@@ -19764,7 +19758,7 @@
               <a:t> </a:t>
             </a:r>
             <a:r>
-              <a:rPr lang="bg-BG" b="1" dirty="0" err="1">
+              <a:rPr lang="bg-BG" b="1" dirty="0">
                 <a:solidFill>
                   <a:schemeClr val="bg1"/>
                 </a:solidFill>
@@ -20328,7 +20322,7 @@
               <a:t>Можете да използвате </a:t>
             </a:r>
             <a:r>
-              <a:rPr lang="en-US" sz="2800" b="1" dirty="0" err="1">
+              <a:rPr lang="en-US" sz="2800" b="1" dirty="0">
                 <a:solidFill>
                   <a:schemeClr val="bg1"/>
                 </a:solidFill>
@@ -20338,15 +20332,7 @@
             </a:r>
             <a:r>
               <a:rPr lang="bg-BG" sz="2800" dirty="0"/>
-              <a:t>, за да </a:t>
-            </a:r>
-            <a:r>
-              <a:rPr lang="bg-BG" sz="2800" dirty="0" err="1"/>
-              <a:t>енкапсулирате</a:t>
-            </a:r>
-            <a:r>
-              <a:rPr lang="bg-BG" sz="2800" dirty="0"/>
-              <a:t> колекции</a:t>
+              <a:t>, за да енкапсулирате колекции</a:t>
             </a:r>
             <a:endParaRPr lang="en-US" sz="2800" dirty="0"/>
           </a:p>
@@ -20368,12 +20354,8 @@
           <a:lstStyle/>
           <a:p>
             <a:r>
-              <a:rPr lang="bg-BG" dirty="0" err="1"/>
-              <a:t>Енкапсулация</a:t>
-            </a:r>
-            <a:r>
               <a:rPr lang="bg-BG" dirty="0"/>
-              <a:t> на променими полета</a:t>
+              <a:t>Енкапсулация на променими полета</a:t>
             </a:r>
           </a:p>
         </p:txBody>
@@ -22000,7 +21982,15 @@
             </a:pPr>
             <a:r>
               <a:rPr lang="en-US" sz="2600" dirty="0"/>
-              <a:t>   this.reserveTeam = new List&lt;Person&gt;(); </a:t>
+              <a:t>   </a:t>
+            </a:r>
+            <a:r>
+              <a:rPr lang="en-US" sz="2600" dirty="0" err="1"/>
+              <a:t>this.reserveTeam</a:t>
+            </a:r>
+            <a:r>
+              <a:rPr lang="en-US" sz="2600" dirty="0"/>
+              <a:t> = new List&lt;Person&gt;(); </a:t>
             </a:r>
           </a:p>
           <a:p>
@@ -23588,7 +23578,7 @@
             <a:lstStyle/>
             <a:p>
               <a:pPr algn="ctr"/>
-              <a:endParaRPr lang="ko-KR" altLang="en-US" sz="2399">
+              <a:endParaRPr lang="ko-KR" altLang="en-US" sz="2399" dirty="0">
                 <a:solidFill>
                   <a:schemeClr val="bg1"/>
                 </a:solidFill>
@@ -23649,7 +23639,7 @@
             <a:lstStyle/>
             <a:p>
               <a:pPr algn="ctr"/>
-              <a:endParaRPr lang="ko-KR" altLang="en-US" sz="2399">
+              <a:endParaRPr lang="ko-KR" altLang="en-US" sz="2399" dirty="0">
                 <a:solidFill>
                   <a:schemeClr val="tx1"/>
                 </a:solidFill>
@@ -23897,7 +23887,7 @@
               </a:buClr>
             </a:pPr>
             <a:r>
-              <a:rPr lang="bg-BG" sz="3600" dirty="0" err="1">
+              <a:rPr lang="bg-BG" sz="3600" dirty="0">
                 <a:solidFill>
                   <a:schemeClr val="bg2"/>
                 </a:solidFill>
@@ -25555,7 +25545,7 @@
               <a:t>© </a:t>
             </a:r>
             <a:r>
-              <a:rPr lang="bg-BG" dirty="0" err="1"/>
+              <a:rPr lang="bg-BG" dirty="0"/>
               <a:t>СофтУни</a:t>
             </a:r>
             <a:r>
@@ -25979,10 +25969,9 @@
           <a:lstStyle/>
           <a:p>
             <a:r>
-              <a:rPr lang="bg-BG" dirty="0" err="1"/>
+              <a:rPr lang="bg-BG" dirty="0"/>
               <a:t>Енкапсулация</a:t>
             </a:r>
-            <a:endParaRPr lang="bg-BG" dirty="0"/>
           </a:p>
         </p:txBody>
       </p:sp>
@@ -26956,7 +26945,7 @@
           <a:lstStyle/>
           <a:p>
             <a:r>
-              <a:rPr lang="bg-BG" dirty="0" err="1"/>
+              <a:rPr lang="bg-BG" dirty="0"/>
               <a:t>Енкапсулация</a:t>
             </a:r>
             <a:r>
@@ -28076,7 +28065,11 @@
               <a:t>Основният начин да осъществим </a:t>
             </a:r>
             <a:r>
-              <a:rPr lang="bg-BG" sz="2800" dirty="0" err="1"/>
+              <a:rPr lang="bg-BG" sz="2800" b="1" dirty="0">
+                <a:solidFill>
+                  <a:schemeClr val="bg1"/>
+                </a:solidFill>
+              </a:rPr>
               <a:t>енкапсулация</a:t>
             </a:r>
             <a:r>
@@ -28093,7 +28086,7 @@
             </a:r>
             <a:r>
               <a:rPr lang="bg-BG" sz="2800" dirty="0"/>
-              <a:t>от външния сват</a:t>
+              <a:t>от външния свят</a:t>
             </a:r>
           </a:p>
           <a:p>

</xml_diff>

<commit_message>
Fixed animations for "9. Encapsulation"
</commit_message>
<xml_diff>
--- a/Courses/Software-Sciences/Module-1-OOP-New/09-Encapsulation/09-Encapsulation.pptx
+++ b/Courses/Software-Sciences/Module-1-OOP-New/09-Encapsulation/09-Encapsulation.pptx
@@ -327,7 +327,7 @@
           <a:p>
             <a:fld id="{4E087215-0C8F-4762-A664-737A353EC9A4}" type="datetimeFigureOut">
               <a:rPr lang="bg-BG" smtClean="0"/>
-              <a:t>19.12.2022 г.</a:t>
+              <a:t>21.12.22 г.</a:t>
             </a:fld>
             <a:endParaRPr lang="bg-BG" dirty="0"/>
           </a:p>
@@ -518,7 +518,7 @@
           <a:p>
             <a:fld id="{72D84649-876A-46C9-8472-14CB09C070D8}" type="datetimeFigureOut">
               <a:rPr lang="en-US" smtClean="0"/>
-              <a:t>19-Dec-22</a:t>
+              <a:t>12/21/22</a:t>
             </a:fld>
             <a:endParaRPr lang="en-US" dirty="0"/>
           </a:p>
@@ -13138,6 +13138,55 @@
                                         <p:tgtEl>
                                           <p:spTgt spid="9">
                                             <p:txEl>
+                                              <p:pRg st="1" end="1"/>
+                                            </p:txEl>
+                                          </p:spTgt>
+                                        </p:tgtEl>
+                                        <p:attrNameLst>
+                                          <p:attrName>style.visibility</p:attrName>
+                                        </p:attrNameLst>
+                                      </p:cBhvr>
+                                      <p:to>
+                                        <p:strVal val="visible"/>
+                                      </p:to>
+                                    </p:set>
+                                  </p:childTnLst>
+                                </p:cTn>
+                              </p:par>
+                            </p:childTnLst>
+                          </p:cTn>
+                        </p:par>
+                      </p:childTnLst>
+                    </p:cTn>
+                  </p:par>
+                  <p:par>
+                    <p:cTn id="7" fill="hold">
+                      <p:stCondLst>
+                        <p:cond delay="indefinite"/>
+                      </p:stCondLst>
+                      <p:childTnLst>
+                        <p:par>
+                          <p:cTn id="8" fill="hold">
+                            <p:stCondLst>
+                              <p:cond delay="0"/>
+                            </p:stCondLst>
+                            <p:childTnLst>
+                              <p:par>
+                                <p:cTn id="9" presetID="1" presetClass="entr" presetSubtype="0" fill="hold" nodeType="clickEffect">
+                                  <p:stCondLst>
+                                    <p:cond delay="0"/>
+                                  </p:stCondLst>
+                                  <p:childTnLst>
+                                    <p:set>
+                                      <p:cBhvr>
+                                        <p:cTn id="10" dur="1" fill="hold">
+                                          <p:stCondLst>
+                                            <p:cond delay="0"/>
+                                          </p:stCondLst>
+                                        </p:cTn>
+                                        <p:tgtEl>
+                                          <p:spTgt spid="9">
+                                            <p:txEl>
                                               <p:pRg st="2" end="2"/>
                                             </p:txEl>
                                           </p:spTgt>
@@ -13154,14 +13203,14 @@
                                 </p:cTn>
                               </p:par>
                               <p:par>
-                                <p:cTn id="7" presetID="1" presetClass="entr" presetSubtype="0" fill="hold" nodeType="withEffect">
+                                <p:cTn id="11" presetID="1" presetClass="entr" presetSubtype="0" fill="hold" nodeType="withEffect">
                                   <p:stCondLst>
                                     <p:cond delay="0"/>
                                   </p:stCondLst>
                                   <p:childTnLst>
                                     <p:set>
                                       <p:cBhvr>
-                                        <p:cTn id="8" dur="1" fill="hold">
+                                        <p:cTn id="12" dur="1" fill="hold">
                                           <p:stCondLst>
                                             <p:cond delay="0"/>
                                           </p:stCondLst>
@@ -13185,56 +13234,7 @@
                                 </p:cTn>
                               </p:par>
                               <p:par>
-                                <p:cTn id="9" presetID="1" presetClass="entr" presetSubtype="0" fill="hold" nodeType="withEffect">
-                                  <p:stCondLst>
-                                    <p:cond delay="0"/>
-                                  </p:stCondLst>
-                                  <p:childTnLst>
-                                    <p:set>
-                                      <p:cBhvr>
-                                        <p:cTn id="10" dur="1" fill="hold">
-                                          <p:stCondLst>
-                                            <p:cond delay="0"/>
-                                          </p:stCondLst>
-                                        </p:cTn>
-                                        <p:tgtEl>
-                                          <p:spTgt spid="9">
-                                            <p:txEl>
-                                              <p:pRg st="8" end="8"/>
-                                            </p:txEl>
-                                          </p:spTgt>
-                                        </p:tgtEl>
-                                        <p:attrNameLst>
-                                          <p:attrName>style.visibility</p:attrName>
-                                        </p:attrNameLst>
-                                      </p:cBhvr>
-                                      <p:to>
-                                        <p:strVal val="visible"/>
-                                      </p:to>
-                                    </p:set>
-                                  </p:childTnLst>
-                                </p:cTn>
-                              </p:par>
-                            </p:childTnLst>
-                          </p:cTn>
-                        </p:par>
-                      </p:childTnLst>
-                    </p:cTn>
-                  </p:par>
-                  <p:par>
-                    <p:cTn id="11" fill="hold">
-                      <p:stCondLst>
-                        <p:cond delay="indefinite"/>
-                      </p:stCondLst>
-                      <p:childTnLst>
-                        <p:par>
-                          <p:cTn id="12" fill="hold">
-                            <p:stCondLst>
-                              <p:cond delay="0"/>
-                            </p:stCondLst>
-                            <p:childTnLst>
-                              <p:par>
-                                <p:cTn id="13" presetID="1" presetClass="entr" presetSubtype="0" fill="hold" nodeType="clickEffect">
+                                <p:cTn id="13" presetID="1" presetClass="entr" presetSubtype="0" fill="hold" nodeType="withEffect">
                                   <p:stCondLst>
                                     <p:cond delay="0"/>
                                   </p:stCondLst>
@@ -13249,7 +13249,7 @@
                                         <p:tgtEl>
                                           <p:spTgt spid="9">
                                             <p:txEl>
-                                              <p:pRg st="4" end="4"/>
+                                              <p:pRg st="8" end="8"/>
                                             </p:txEl>
                                           </p:spTgt>
                                         </p:tgtEl>
@@ -13298,7 +13298,7 @@
                                         <p:tgtEl>
                                           <p:spTgt spid="9">
                                             <p:txEl>
-                                              <p:pRg st="5" end="5"/>
+                                              <p:pRg st="4" end="4"/>
                                             </p:txEl>
                                           </p:spTgt>
                                         </p:tgtEl>
@@ -13347,7 +13347,7 @@
                                         <p:tgtEl>
                                           <p:spTgt spid="9">
                                             <p:txEl>
-                                              <p:pRg st="6" end="6"/>
+                                              <p:pRg st="5" end="5"/>
                                             </p:txEl>
                                           </p:spTgt>
                                         </p:tgtEl>
@@ -13389,6 +13389,55 @@
                                     <p:set>
                                       <p:cBhvr>
                                         <p:cTn id="26" dur="1" fill="hold">
+                                          <p:stCondLst>
+                                            <p:cond delay="0"/>
+                                          </p:stCondLst>
+                                        </p:cTn>
+                                        <p:tgtEl>
+                                          <p:spTgt spid="9">
+                                            <p:txEl>
+                                              <p:pRg st="6" end="6"/>
+                                            </p:txEl>
+                                          </p:spTgt>
+                                        </p:tgtEl>
+                                        <p:attrNameLst>
+                                          <p:attrName>style.visibility</p:attrName>
+                                        </p:attrNameLst>
+                                      </p:cBhvr>
+                                      <p:to>
+                                        <p:strVal val="visible"/>
+                                      </p:to>
+                                    </p:set>
+                                  </p:childTnLst>
+                                </p:cTn>
+                              </p:par>
+                            </p:childTnLst>
+                          </p:cTn>
+                        </p:par>
+                      </p:childTnLst>
+                    </p:cTn>
+                  </p:par>
+                  <p:par>
+                    <p:cTn id="27" fill="hold">
+                      <p:stCondLst>
+                        <p:cond delay="indefinite"/>
+                      </p:stCondLst>
+                      <p:childTnLst>
+                        <p:par>
+                          <p:cTn id="28" fill="hold">
+                            <p:stCondLst>
+                              <p:cond delay="0"/>
+                            </p:stCondLst>
+                            <p:childTnLst>
+                              <p:par>
+                                <p:cTn id="29" presetID="1" presetClass="entr" presetSubtype="0" fill="hold" nodeType="clickEffect">
+                                  <p:stCondLst>
+                                    <p:cond delay="0"/>
+                                  </p:stCondLst>
+                                  <p:childTnLst>
+                                    <p:set>
+                                      <p:cBhvr>
+                                        <p:cTn id="30" dur="1" fill="hold">
                                           <p:stCondLst>
                                             <p:cond delay="0"/>
                                           </p:stCondLst>
@@ -14399,26 +14448,39 @@
                                   </p:childTnLst>
                                 </p:cTn>
                               </p:par>
-                            </p:childTnLst>
-                          </p:cTn>
-                        </p:par>
-                      </p:childTnLst>
-                    </p:cTn>
-                  </p:par>
-                  <p:par>
-                    <p:cTn id="11" fill="hold">
-                      <p:stCondLst>
-                        <p:cond delay="indefinite"/>
-                      </p:stCondLst>
-                      <p:childTnLst>
-                        <p:par>
-                          <p:cTn id="12" fill="hold">
-                            <p:stCondLst>
-                              <p:cond delay="0"/>
-                            </p:stCondLst>
-                            <p:childTnLst>
                               <p:par>
-                                <p:cTn id="13" presetID="1" presetClass="entr" presetSubtype="0" fill="hold" nodeType="clickEffect">
+                                <p:cTn id="11" presetID="1" presetClass="entr" presetSubtype="0" fill="hold" nodeType="withEffect">
+                                  <p:stCondLst>
+                                    <p:cond delay="0"/>
+                                  </p:stCondLst>
+                                  <p:childTnLst>
+                                    <p:set>
+                                      <p:cBhvr>
+                                        <p:cTn id="12" dur="1" fill="hold">
+                                          <p:stCondLst>
+                                            <p:cond delay="0"/>
+                                          </p:stCondLst>
+                                        </p:cTn>
+                                        <p:tgtEl>
+                                          <p:spTgt spid="3">
+                                            <p:txEl>
+                                              <p:pRg st="3" end="3"/>
+                                            </p:txEl>
+                                          </p:spTgt>
+                                        </p:tgtEl>
+                                        <p:attrNameLst>
+                                          <p:attrName>style.visibility</p:attrName>
+                                        </p:attrNameLst>
+                                      </p:cBhvr>
+                                      <p:to>
+                                        <p:strVal val="visible"/>
+                                      </p:to>
+                                    </p:set>
+                                  </p:childTnLst>
+                                </p:cTn>
+                              </p:par>
+                              <p:par>
+                                <p:cTn id="13" presetID="1" presetClass="entr" presetSubtype="0" fill="hold" nodeType="withEffect">
                                   <p:stCondLst>
                                     <p:cond delay="0"/>
                                   </p:stCondLst>
@@ -14433,7 +14495,7 @@
                                         <p:tgtEl>
                                           <p:spTgt spid="3">
                                             <p:txEl>
-                                              <p:pRg st="3" end="3"/>
+                                              <p:pRg st="4" end="4"/>
                                             </p:txEl>
                                           </p:spTgt>
                                         </p:tgtEl>
@@ -14482,55 +14544,6 @@
                                         <p:tgtEl>
                                           <p:spTgt spid="3">
                                             <p:txEl>
-                                              <p:pRg st="4" end="4"/>
-                                            </p:txEl>
-                                          </p:spTgt>
-                                        </p:tgtEl>
-                                        <p:attrNameLst>
-                                          <p:attrName>style.visibility</p:attrName>
-                                        </p:attrNameLst>
-                                      </p:cBhvr>
-                                      <p:to>
-                                        <p:strVal val="visible"/>
-                                      </p:to>
-                                    </p:set>
-                                  </p:childTnLst>
-                                </p:cTn>
-                              </p:par>
-                            </p:childTnLst>
-                          </p:cTn>
-                        </p:par>
-                      </p:childTnLst>
-                    </p:cTn>
-                  </p:par>
-                  <p:par>
-                    <p:cTn id="19" fill="hold">
-                      <p:stCondLst>
-                        <p:cond delay="indefinite"/>
-                      </p:stCondLst>
-                      <p:childTnLst>
-                        <p:par>
-                          <p:cTn id="20" fill="hold">
-                            <p:stCondLst>
-                              <p:cond delay="0"/>
-                            </p:stCondLst>
-                            <p:childTnLst>
-                              <p:par>
-                                <p:cTn id="21" presetID="1" presetClass="entr" presetSubtype="0" fill="hold" nodeType="clickEffect">
-                                  <p:stCondLst>
-                                    <p:cond delay="0"/>
-                                  </p:stCondLst>
-                                  <p:childTnLst>
-                                    <p:set>
-                                      <p:cBhvr>
-                                        <p:cTn id="22" dur="1" fill="hold">
-                                          <p:stCondLst>
-                                            <p:cond delay="0"/>
-                                          </p:stCondLst>
-                                        </p:cTn>
-                                        <p:tgtEl>
-                                          <p:spTgt spid="3">
-                                            <p:txEl>
                                               <p:pRg st="5" end="5"/>
                                             </p:txEl>
                                           </p:spTgt>
@@ -14546,33 +14559,15 @@
                                   </p:childTnLst>
                                 </p:cTn>
                               </p:par>
-                            </p:childTnLst>
-                          </p:cTn>
-                        </p:par>
-                      </p:childTnLst>
-                    </p:cTn>
-                  </p:par>
-                  <p:par>
-                    <p:cTn id="23" fill="hold">
-                      <p:stCondLst>
-                        <p:cond delay="indefinite"/>
-                      </p:stCondLst>
-                      <p:childTnLst>
-                        <p:par>
-                          <p:cTn id="24" fill="hold">
-                            <p:stCondLst>
-                              <p:cond delay="0"/>
-                            </p:stCondLst>
-                            <p:childTnLst>
                               <p:par>
-                                <p:cTn id="25" presetID="1" presetClass="entr" presetSubtype="0" fill="hold" nodeType="clickEffect">
+                                <p:cTn id="19" presetID="1" presetClass="entr" presetSubtype="0" fill="hold" nodeType="withEffect">
                                   <p:stCondLst>
                                     <p:cond delay="0"/>
                                   </p:stCondLst>
                                   <p:childTnLst>
                                     <p:set>
                                       <p:cBhvr>
-                                        <p:cTn id="26" dur="1" fill="hold">
+                                        <p:cTn id="20" dur="1" fill="hold">
                                           <p:stCondLst>
                                             <p:cond delay="0"/>
                                           </p:stCondLst>
@@ -14595,33 +14590,15 @@
                                   </p:childTnLst>
                                 </p:cTn>
                               </p:par>
-                            </p:childTnLst>
-                          </p:cTn>
-                        </p:par>
-                      </p:childTnLst>
-                    </p:cTn>
-                  </p:par>
-                  <p:par>
-                    <p:cTn id="27" fill="hold">
-                      <p:stCondLst>
-                        <p:cond delay="indefinite"/>
-                      </p:stCondLst>
-                      <p:childTnLst>
-                        <p:par>
-                          <p:cTn id="28" fill="hold">
-                            <p:stCondLst>
-                              <p:cond delay="0"/>
-                            </p:stCondLst>
-                            <p:childTnLst>
                               <p:par>
-                                <p:cTn id="29" presetID="1" presetClass="entr" presetSubtype="0" fill="hold" nodeType="clickEffect">
+                                <p:cTn id="21" presetID="1" presetClass="entr" presetSubtype="0" fill="hold" nodeType="withEffect">
                                   <p:stCondLst>
                                     <p:cond delay="0"/>
                                   </p:stCondLst>
                                   <p:childTnLst>
                                     <p:set>
                                       <p:cBhvr>
-                                        <p:cTn id="30" dur="1" fill="hold">
+                                        <p:cTn id="22" dur="1" fill="hold">
                                           <p:stCondLst>
                                             <p:cond delay="0"/>
                                           </p:stCondLst>
@@ -14632,51 +14609,6 @@
                                               <p:pRg st="7" end="7"/>
                                             </p:txEl>
                                           </p:spTgt>
-                                        </p:tgtEl>
-                                        <p:attrNameLst>
-                                          <p:attrName>style.visibility</p:attrName>
-                                        </p:attrNameLst>
-                                      </p:cBhvr>
-                                      <p:to>
-                                        <p:strVal val="visible"/>
-                                      </p:to>
-                                    </p:set>
-                                  </p:childTnLst>
-                                </p:cTn>
-                              </p:par>
-                            </p:childTnLst>
-                          </p:cTn>
-                        </p:par>
-                      </p:childTnLst>
-                    </p:cTn>
-                  </p:par>
-                  <p:par>
-                    <p:cTn id="31" fill="hold">
-                      <p:stCondLst>
-                        <p:cond delay="indefinite"/>
-                      </p:stCondLst>
-                      <p:childTnLst>
-                        <p:par>
-                          <p:cTn id="32" fill="hold">
-                            <p:stCondLst>
-                              <p:cond delay="0"/>
-                            </p:stCondLst>
-                            <p:childTnLst>
-                              <p:par>
-                                <p:cTn id="33" presetID="1" presetClass="entr" presetSubtype="0" fill="hold" nodeType="clickEffect">
-                                  <p:stCondLst>
-                                    <p:cond delay="0"/>
-                                  </p:stCondLst>
-                                  <p:childTnLst>
-                                    <p:set>
-                                      <p:cBhvr>
-                                        <p:cTn id="34" dur="1" fill="hold">
-                                          <p:stCondLst>
-                                            <p:cond delay="0"/>
-                                          </p:stCondLst>
-                                        </p:cTn>
-                                        <p:tgtEl>
-                                          <p:spTgt spid="24"/>
                                         </p:tgtEl>
                                         <p:attrNameLst>
                                           <p:attrName>style.visibility</p:attrName>
@@ -16583,14 +16515,18 @@
             <p:ph type="body" sz="quarter" idx="10"/>
           </p:nvPr>
         </p:nvSpPr>
-        <p:spPr/>
+        <p:spPr>
+          <a:xfrm>
+            <a:off x="190406" y="664617"/>
+            <a:ext cx="11818096" cy="5528766"/>
+          </a:xfrm>
+        </p:spPr>
         <p:txBody>
           <a:bodyPr/>
           <a:lstStyle/>
           <a:p>
-            <a:pPr marL="742950" indent="-742950">
-              <a:buFont typeface="+mj-lt"/>
-              <a:buAutoNum type="arabicPeriod"/>
+            <a:pPr marL="0" indent="0">
+              <a:buNone/>
             </a:pPr>
             <a:endParaRPr lang="bg-BG" sz="4000" dirty="0"/>
           </a:p>
@@ -19805,33 +19741,15 @@
                                   </p:childTnLst>
                                 </p:cTn>
                               </p:par>
-                            </p:childTnLst>
-                          </p:cTn>
-                        </p:par>
-                      </p:childTnLst>
-                    </p:cTn>
-                  </p:par>
-                  <p:par>
-                    <p:cTn id="7" fill="hold">
-                      <p:stCondLst>
-                        <p:cond delay="indefinite"/>
-                      </p:stCondLst>
-                      <p:childTnLst>
-                        <p:par>
-                          <p:cTn id="8" fill="hold">
-                            <p:stCondLst>
-                              <p:cond delay="0"/>
-                            </p:stCondLst>
-                            <p:childTnLst>
                               <p:par>
-                                <p:cTn id="9" presetID="1" presetClass="entr" presetSubtype="0" fill="hold" nodeType="clickEffect">
+                                <p:cTn id="7" presetID="1" presetClass="entr" presetSubtype="0" fill="hold" nodeType="withEffect">
                                   <p:stCondLst>
                                     <p:cond delay="0"/>
                                   </p:stCondLst>
                                   <p:childTnLst>
                                     <p:set>
                                       <p:cBhvr>
-                                        <p:cTn id="10" dur="1" fill="hold">
+                                        <p:cTn id="8" dur="1" fill="hold">
                                           <p:stCondLst>
                                             <p:cond delay="0"/>
                                           </p:stCondLst>
@@ -19861,19 +19779,50 @@
                     </p:cTn>
                   </p:par>
                   <p:par>
-                    <p:cTn id="11" fill="hold">
+                    <p:cTn id="9" fill="hold">
                       <p:stCondLst>
                         <p:cond delay="indefinite"/>
                       </p:stCondLst>
                       <p:childTnLst>
                         <p:par>
-                          <p:cTn id="12" fill="hold">
+                          <p:cTn id="10" fill="hold">
                             <p:stCondLst>
                               <p:cond delay="0"/>
                             </p:stCondLst>
                             <p:childTnLst>
                               <p:par>
-                                <p:cTn id="13" presetID="1" presetClass="entr" presetSubtype="0" fill="hold" nodeType="clickEffect">
+                                <p:cTn id="11" presetID="1" presetClass="entr" presetSubtype="0" fill="hold" nodeType="clickEffect">
+                                  <p:stCondLst>
+                                    <p:cond delay="0"/>
+                                  </p:stCondLst>
+                                  <p:childTnLst>
+                                    <p:set>
+                                      <p:cBhvr>
+                                        <p:cTn id="12" dur="1" fill="hold">
+                                          <p:stCondLst>
+                                            <p:cond delay="0"/>
+                                          </p:stCondLst>
+                                        </p:cTn>
+                                        <p:tgtEl>
+                                          <p:spTgt spid="3">
+                                            <p:txEl>
+                                              <p:pRg st="4" end="4"/>
+                                            </p:txEl>
+                                          </p:spTgt>
+                                        </p:tgtEl>
+                                        <p:attrNameLst>
+                                          <p:attrName>style.visibility</p:attrName>
+                                        </p:attrNameLst>
+                                      </p:cBhvr>
+                                      <p:to>
+                                        <p:strVal val="visible"/>
+                                      </p:to>
+                                    </p:set>
+                                  </p:childTnLst>
+                                </p:cTn>
+                              </p:par>
+                              <p:par>
+                                <p:cTn id="13" presetID="1" presetClass="entr" presetSubtype="0" fill="hold" nodeType="withEffect">
                                   <p:stCondLst>
                                     <p:cond delay="0"/>
                                   </p:stCondLst>
@@ -19888,7 +19837,7 @@
                                         <p:tgtEl>
                                           <p:spTgt spid="3">
                                             <p:txEl>
-                                              <p:pRg st="4" end="4"/>
+                                              <p:pRg st="5" end="5"/>
                                             </p:txEl>
                                           </p:spTgt>
                                         </p:tgtEl>
@@ -19937,55 +19886,6 @@
                                         <p:tgtEl>
                                           <p:spTgt spid="3">
                                             <p:txEl>
-                                              <p:pRg st="5" end="5"/>
-                                            </p:txEl>
-                                          </p:spTgt>
-                                        </p:tgtEl>
-                                        <p:attrNameLst>
-                                          <p:attrName>style.visibility</p:attrName>
-                                        </p:attrNameLst>
-                                      </p:cBhvr>
-                                      <p:to>
-                                        <p:strVal val="visible"/>
-                                      </p:to>
-                                    </p:set>
-                                  </p:childTnLst>
-                                </p:cTn>
-                              </p:par>
-                            </p:childTnLst>
-                          </p:cTn>
-                        </p:par>
-                      </p:childTnLst>
-                    </p:cTn>
-                  </p:par>
-                  <p:par>
-                    <p:cTn id="19" fill="hold">
-                      <p:stCondLst>
-                        <p:cond delay="indefinite"/>
-                      </p:stCondLst>
-                      <p:childTnLst>
-                        <p:par>
-                          <p:cTn id="20" fill="hold">
-                            <p:stCondLst>
-                              <p:cond delay="0"/>
-                            </p:stCondLst>
-                            <p:childTnLst>
-                              <p:par>
-                                <p:cTn id="21" presetID="1" presetClass="entr" presetSubtype="0" fill="hold" nodeType="clickEffect">
-                                  <p:stCondLst>
-                                    <p:cond delay="0"/>
-                                  </p:stCondLst>
-                                  <p:childTnLst>
-                                    <p:set>
-                                      <p:cBhvr>
-                                        <p:cTn id="22" dur="1" fill="hold">
-                                          <p:stCondLst>
-                                            <p:cond delay="0"/>
-                                          </p:stCondLst>
-                                        </p:cTn>
-                                        <p:tgtEl>
-                                          <p:spTgt spid="3">
-                                            <p:txEl>
                                               <p:pRg st="6" end="6"/>
                                             </p:txEl>
                                           </p:spTgt>
@@ -20001,33 +19901,15 @@
                                   </p:childTnLst>
                                 </p:cTn>
                               </p:par>
-                            </p:childTnLst>
-                          </p:cTn>
-                        </p:par>
-                      </p:childTnLst>
-                    </p:cTn>
-                  </p:par>
-                  <p:par>
-                    <p:cTn id="23" fill="hold">
-                      <p:stCondLst>
-                        <p:cond delay="indefinite"/>
-                      </p:stCondLst>
-                      <p:childTnLst>
-                        <p:par>
-                          <p:cTn id="24" fill="hold">
-                            <p:stCondLst>
-                              <p:cond delay="0"/>
-                            </p:stCondLst>
-                            <p:childTnLst>
                               <p:par>
-                                <p:cTn id="25" presetID="1" presetClass="entr" presetSubtype="0" fill="hold" nodeType="clickEffect">
+                                <p:cTn id="19" presetID="1" presetClass="entr" presetSubtype="0" fill="hold" nodeType="withEffect">
                                   <p:stCondLst>
                                     <p:cond delay="0"/>
                                   </p:stCondLst>
                                   <p:childTnLst>
                                     <p:set>
                                       <p:cBhvr>
-                                        <p:cTn id="26" dur="1" fill="hold">
+                                        <p:cTn id="20" dur="1" fill="hold">
                                           <p:stCondLst>
                                             <p:cond delay="0"/>
                                           </p:stCondLst>
@@ -20038,51 +19920,6 @@
                                               <p:pRg st="7" end="7"/>
                                             </p:txEl>
                                           </p:spTgt>
-                                        </p:tgtEl>
-                                        <p:attrNameLst>
-                                          <p:attrName>style.visibility</p:attrName>
-                                        </p:attrNameLst>
-                                      </p:cBhvr>
-                                      <p:to>
-                                        <p:strVal val="visible"/>
-                                      </p:to>
-                                    </p:set>
-                                  </p:childTnLst>
-                                </p:cTn>
-                              </p:par>
-                            </p:childTnLst>
-                          </p:cTn>
-                        </p:par>
-                      </p:childTnLst>
-                    </p:cTn>
-                  </p:par>
-                  <p:par>
-                    <p:cTn id="27" fill="hold">
-                      <p:stCondLst>
-                        <p:cond delay="indefinite"/>
-                      </p:stCondLst>
-                      <p:childTnLst>
-                        <p:par>
-                          <p:cTn id="28" fill="hold">
-                            <p:stCondLst>
-                              <p:cond delay="0"/>
-                            </p:stCondLst>
-                            <p:childTnLst>
-                              <p:par>
-                                <p:cTn id="29" presetID="1" presetClass="entr" presetSubtype="0" fill="hold" nodeType="clickEffect">
-                                  <p:stCondLst>
-                                    <p:cond delay="0"/>
-                                  </p:stCondLst>
-                                  <p:childTnLst>
-                                    <p:set>
-                                      <p:cBhvr>
-                                        <p:cTn id="30" dur="1" fill="hold">
-                                          <p:stCondLst>
-                                            <p:cond delay="0"/>
-                                          </p:stCondLst>
-                                        </p:cTn>
-                                        <p:tgtEl>
-                                          <p:spTgt spid="24"/>
                                         </p:tgtEl>
                                         <p:attrNameLst>
                                           <p:attrName>style.visibility</p:attrName>
@@ -21547,7 +21384,9 @@
           </a:xfrm>
         </p:spPr>
         <p:txBody>
-          <a:bodyPr/>
+          <a:bodyPr>
+            <a:normAutofit/>
+          </a:bodyPr>
           <a:lstStyle/>
           <a:p>
             <a:pPr>
@@ -21556,7 +21395,7 @@
               </a:buClr>
             </a:pPr>
             <a:r>
-              <a:rPr lang="bg-BG" b="1" dirty="0">
+              <a:rPr lang="bg-BG" sz="3300" b="1" dirty="0">
                 <a:solidFill>
                   <a:schemeClr val="bg1"/>
                 </a:solidFill>
@@ -21564,7 +21403,7 @@
               <a:t>Непроменими</a:t>
             </a:r>
             <a:r>
-              <a:rPr lang="en-GB" b="1" dirty="0">
+              <a:rPr lang="en-GB" sz="3300" b="1" dirty="0">
                 <a:solidFill>
                   <a:schemeClr val="bg1"/>
                 </a:solidFill>
@@ -21572,14 +21411,14 @@
               <a:t> </a:t>
             </a:r>
             <a:r>
-              <a:rPr lang="bg-BG" b="1" dirty="0">
+              <a:rPr lang="bg-BG" sz="3300" b="1" dirty="0">
                 <a:solidFill>
                   <a:schemeClr val="bg1"/>
                 </a:solidFill>
               </a:rPr>
               <a:t>обекти</a:t>
             </a:r>
-            <a:endParaRPr lang="en-GB" b="1" dirty="0">
+            <a:endParaRPr lang="en-GB" sz="3300" b="1" dirty="0">
               <a:solidFill>
                 <a:schemeClr val="bg1"/>
               </a:solidFill>
@@ -21588,21 +21427,21 @@
           <a:p>
             <a:pPr lvl="1"/>
             <a:r>
-              <a:rPr lang="bg-BG" sz="3200" dirty="0"/>
+              <a:rPr lang="bg-BG" sz="3300" dirty="0"/>
               <a:t>Непроменими </a:t>
             </a:r>
             <a:r>
-              <a:rPr lang="en-GB" sz="3200" dirty="0"/>
+              <a:rPr lang="en-GB" sz="3300" dirty="0"/>
               <a:t>== immutable</a:t>
             </a:r>
           </a:p>
           <a:p>
             <a:pPr lvl="1"/>
             <a:r>
-              <a:rPr lang="bg-BG" sz="3200" dirty="0"/>
+              <a:rPr lang="bg-BG" sz="3300" dirty="0"/>
               <a:t>Заделят нова памет всеки път, когато се променят</a:t>
             </a:r>
-            <a:endParaRPr lang="en-GB" sz="3200" dirty="0"/>
+            <a:endParaRPr lang="en-GB" sz="3300" dirty="0"/>
           </a:p>
           <a:p>
             <a:pPr lvl="1">
@@ -21611,7 +21450,7 @@
               </a:buClr>
             </a:pPr>
             <a:r>
-              <a:rPr lang="en-GB" sz="3200" b="1" dirty="0">
+              <a:rPr lang="en-GB" sz="3300" b="1" dirty="0">
                 <a:solidFill>
                   <a:schemeClr val="bg1"/>
                 </a:solidFill>
@@ -21619,20 +21458,26 @@
               </a:rPr>
               <a:t>string</a:t>
             </a:r>
-          </a:p>
-          <a:p>
-            <a:pPr lvl="1">
-              <a:buClr>
-                <a:schemeClr val="tx1"/>
-              </a:buClr>
-            </a:pPr>
-            <a:r>
-              <a:rPr lang="en-GB" sz="3200" b="1" noProof="1">
+            <a:r>
+              <a:rPr lang="en-US" sz="3300" dirty="0"/>
+              <a:t>,</a:t>
+            </a:r>
+            <a:r>
+              <a:rPr lang="en-GB" sz="3300" b="1" dirty="0">
                 <a:solidFill>
                   <a:schemeClr val="bg1"/>
                 </a:solidFill>
                 <a:latin typeface="Consolas" panose="020B0609020204030204" pitchFamily="49" charset="0"/>
               </a:rPr>
+              <a:t> </a:t>
+            </a:r>
+            <a:r>
+              <a:rPr lang="en-GB" sz="3300" b="1" noProof="1">
+                <a:solidFill>
+                  <a:schemeClr val="bg1"/>
+                </a:solidFill>
+                <a:latin typeface="Consolas" panose="020B0609020204030204" pitchFamily="49" charset="0"/>
+              </a:rPr>
               <a:t>int</a:t>
             </a:r>
           </a:p>
@@ -21640,11 +21485,11 @@
             <a:pPr marL="609219" lvl="1" indent="0">
               <a:buNone/>
             </a:pPr>
-            <a:endParaRPr lang="en-GB" dirty="0"/>
+            <a:endParaRPr lang="en-GB" sz="3300" dirty="0"/>
           </a:p>
           <a:p>
             <a:pPr lvl="1"/>
-            <a:endParaRPr lang="en-GB" dirty="0"/>
+            <a:endParaRPr lang="en-GB" sz="3300" dirty="0"/>
           </a:p>
         </p:txBody>
       </p:sp>
@@ -21666,7 +21511,9 @@
         </p:nvSpPr>
         <p:spPr/>
         <p:txBody>
-          <a:bodyPr/>
+          <a:bodyPr>
+            <a:normAutofit/>
+          </a:bodyPr>
           <a:lstStyle/>
           <a:p>
             <a:pPr>
@@ -21675,7 +21522,7 @@
               </a:buClr>
             </a:pPr>
             <a:r>
-              <a:rPr lang="bg-BG" b="1" dirty="0">
+              <a:rPr lang="bg-BG" sz="3300" b="1" dirty="0">
                 <a:solidFill>
                   <a:schemeClr val="bg1"/>
                 </a:solidFill>
@@ -21683,7 +21530,7 @@
               <a:t>Променими</a:t>
             </a:r>
             <a:r>
-              <a:rPr lang="en-GB" b="1" dirty="0">
+              <a:rPr lang="en-GB" sz="3300" b="1" dirty="0">
                 <a:solidFill>
                   <a:schemeClr val="bg1"/>
                 </a:solidFill>
@@ -21691,14 +21538,14 @@
               <a:t> </a:t>
             </a:r>
             <a:r>
-              <a:rPr lang="bg-BG" b="1" dirty="0">
+              <a:rPr lang="bg-BG" sz="3300" b="1" dirty="0">
                 <a:solidFill>
                   <a:schemeClr val="bg1"/>
                 </a:solidFill>
               </a:rPr>
               <a:t>обекти</a:t>
             </a:r>
-            <a:endParaRPr lang="en-GB" b="1" dirty="0">
+            <a:endParaRPr lang="en-GB" sz="3300" b="1" dirty="0">
               <a:solidFill>
                 <a:schemeClr val="bg1"/>
               </a:solidFill>
@@ -21707,21 +21554,21 @@
           <a:p>
             <a:pPr lvl="1"/>
             <a:r>
-              <a:rPr lang="bg-BG" sz="3200" dirty="0"/>
+              <a:rPr lang="bg-BG" sz="3300" dirty="0"/>
               <a:t>Променими</a:t>
             </a:r>
             <a:r>
-              <a:rPr lang="en-US" sz="3200" dirty="0"/>
+              <a:rPr lang="en-US" sz="3300" dirty="0"/>
               <a:t> == mutable</a:t>
             </a:r>
           </a:p>
           <a:p>
             <a:pPr lvl="1"/>
             <a:r>
-              <a:rPr lang="bg-BG" sz="3200" dirty="0"/>
+              <a:rPr lang="bg-BG" sz="3300" dirty="0"/>
               <a:t>Използват една и съща локация в паметта</a:t>
             </a:r>
-            <a:endParaRPr lang="en-US" sz="3200" dirty="0"/>
+            <a:endParaRPr lang="en-US" sz="3300" dirty="0"/>
           </a:p>
           <a:p>
             <a:pPr lvl="1">
@@ -21730,7 +21577,7 @@
               </a:buClr>
             </a:pPr>
             <a:r>
-              <a:rPr lang="en-US" sz="3200" b="1" noProof="1">
+              <a:rPr lang="en-US" sz="3300" b="1" noProof="1">
                 <a:solidFill>
                   <a:schemeClr val="bg1"/>
                 </a:solidFill>
@@ -21738,21 +21585,18 @@
               </a:rPr>
               <a:t>StringBuilder</a:t>
             </a:r>
-          </a:p>
-          <a:p>
-            <a:pPr lvl="1">
-              <a:buClr>
-                <a:schemeClr val="tx1"/>
-              </a:buClr>
-            </a:pPr>
-            <a:r>
-              <a:rPr lang="en-US" sz="3200" b="1" noProof="1">
+            <a:r>
+              <a:rPr lang="en-US" sz="3300" dirty="0"/>
+              <a:t>,</a:t>
+            </a:r>
+            <a:r>
+              <a:rPr lang="en-US" sz="3300" b="1" noProof="1">
                 <a:solidFill>
                   <a:schemeClr val="bg1"/>
                 </a:solidFill>
                 <a:latin typeface="Consolas" panose="020B0609020204030204" pitchFamily="49" charset="0"/>
               </a:rPr>
-              <a:t>List</a:t>
+              <a:t> List</a:t>
             </a:r>
           </a:p>
         </p:txBody>
@@ -21985,15 +21829,33 @@
                                   </p:childTnLst>
                                 </p:cTn>
                               </p:par>
+                            </p:childTnLst>
+                          </p:cTn>
+                        </p:par>
+                      </p:childTnLst>
+                    </p:cTn>
+                  </p:par>
+                  <p:par>
+                    <p:cTn id="7" fill="hold">
+                      <p:stCondLst>
+                        <p:cond delay="indefinite"/>
+                      </p:stCondLst>
+                      <p:childTnLst>
+                        <p:par>
+                          <p:cTn id="8" fill="hold">
+                            <p:stCondLst>
+                              <p:cond delay="0"/>
+                            </p:stCondLst>
+                            <p:childTnLst>
                               <p:par>
-                                <p:cTn id="7" presetID="1" presetClass="entr" presetSubtype="0" fill="hold" nodeType="withEffect">
+                                <p:cTn id="9" presetID="1" presetClass="entr" presetSubtype="0" fill="hold" nodeType="clickEffect">
                                   <p:stCondLst>
                                     <p:cond delay="0"/>
                                   </p:stCondLst>
                                   <p:childTnLst>
                                     <p:set>
                                       <p:cBhvr>
-                                        <p:cTn id="8" dur="1" fill="hold">
+                                        <p:cTn id="10" dur="1" fill="hold">
                                           <p:stCondLst>
                                             <p:cond delay="0"/>
                                           </p:stCondLst>
@@ -22023,26 +21885,26 @@
                     </p:cTn>
                   </p:par>
                   <p:par>
-                    <p:cTn id="9" fill="hold">
+                    <p:cTn id="11" fill="hold">
                       <p:stCondLst>
                         <p:cond delay="indefinite"/>
                       </p:stCondLst>
                       <p:childTnLst>
                         <p:par>
-                          <p:cTn id="10" fill="hold">
+                          <p:cTn id="12" fill="hold">
                             <p:stCondLst>
                               <p:cond delay="0"/>
                             </p:stCondLst>
                             <p:childTnLst>
                               <p:par>
-                                <p:cTn id="11" presetID="1" presetClass="entr" presetSubtype="0" fill="hold" nodeType="clickEffect">
+                                <p:cTn id="13" presetID="1" presetClass="entr" presetSubtype="0" fill="hold" nodeType="clickEffect">
                                   <p:stCondLst>
                                     <p:cond delay="0"/>
                                   </p:stCondLst>
                                   <p:childTnLst>
                                     <p:set>
                                       <p:cBhvr>
-                                        <p:cTn id="12" dur="1" fill="hold">
+                                        <p:cTn id="14" dur="1" fill="hold">
                                           <p:stCondLst>
                                             <p:cond delay="0"/>
                                           </p:stCondLst>
@@ -22065,70 +21927,26 @@
                                   </p:childTnLst>
                                 </p:cTn>
                               </p:par>
+                            </p:childTnLst>
+                          </p:cTn>
+                        </p:par>
+                      </p:childTnLst>
+                    </p:cTn>
+                  </p:par>
+                  <p:par>
+                    <p:cTn id="15" fill="hold">
+                      <p:stCondLst>
+                        <p:cond delay="indefinite"/>
+                      </p:stCondLst>
+                      <p:childTnLst>
+                        <p:par>
+                          <p:cTn id="16" fill="hold">
+                            <p:stCondLst>
+                              <p:cond delay="0"/>
+                            </p:stCondLst>
+                            <p:childTnLst>
                               <p:par>
-                                <p:cTn id="13" presetID="1" presetClass="entr" presetSubtype="0" fill="hold" nodeType="withEffect">
-                                  <p:stCondLst>
-                                    <p:cond delay="0"/>
-                                  </p:stCondLst>
-                                  <p:childTnLst>
-                                    <p:set>
-                                      <p:cBhvr>
-                                        <p:cTn id="14" dur="1" fill="hold">
-                                          <p:stCondLst>
-                                            <p:cond delay="0"/>
-                                          </p:stCondLst>
-                                        </p:cTn>
-                                        <p:tgtEl>
-                                          <p:spTgt spid="5">
-                                            <p:txEl>
-                                              <p:pRg st="4" end="4"/>
-                                            </p:txEl>
-                                          </p:spTgt>
-                                        </p:tgtEl>
-                                        <p:attrNameLst>
-                                          <p:attrName>style.visibility</p:attrName>
-                                        </p:attrNameLst>
-                                      </p:cBhvr>
-                                      <p:to>
-                                        <p:strVal val="visible"/>
-                                      </p:to>
-                                    </p:set>
-                                  </p:childTnLst>
-                                </p:cTn>
-                              </p:par>
-                              <p:par>
-                                <p:cTn id="15" presetID="1" presetClass="entr" presetSubtype="0" fill="hold" nodeType="withEffect">
-                                  <p:stCondLst>
-                                    <p:cond delay="0"/>
-                                  </p:stCondLst>
-                                  <p:childTnLst>
-                                    <p:set>
-                                      <p:cBhvr>
-                                        <p:cTn id="16" dur="1" fill="hold">
-                                          <p:stCondLst>
-                                            <p:cond delay="0"/>
-                                          </p:stCondLst>
-                                        </p:cTn>
-                                        <p:tgtEl>
-                                          <p:spTgt spid="6">
-                                            <p:txEl>
-                                              <p:pRg st="3" end="3"/>
-                                            </p:txEl>
-                                          </p:spTgt>
-                                        </p:tgtEl>
-                                        <p:attrNameLst>
-                                          <p:attrName>style.visibility</p:attrName>
-                                        </p:attrNameLst>
-                                      </p:cBhvr>
-                                      <p:to>
-                                        <p:strVal val="visible"/>
-                                      </p:to>
-                                    </p:set>
-                                  </p:childTnLst>
-                                </p:cTn>
-                              </p:par>
-                              <p:par>
-                                <p:cTn id="17" presetID="1" presetClass="entr" presetSubtype="0" fill="hold" nodeType="withEffect">
+                                <p:cTn id="17" presetID="1" presetClass="entr" presetSubtype="0" fill="hold" nodeType="clickEffect">
                                   <p:stCondLst>
                                     <p:cond delay="0"/>
                                   </p:stCondLst>
@@ -22143,7 +21961,7 @@
                                         <p:tgtEl>
                                           <p:spTgt spid="6">
                                             <p:txEl>
-                                              <p:pRg st="4" end="4"/>
+                                              <p:pRg st="3" end="3"/>
                                             </p:txEl>
                                           </p:spTgt>
                                         </p:tgtEl>
@@ -22898,8 +22716,8 @@
         </p:nvSpPr>
         <p:spPr bwMode="auto">
           <a:xfrm>
-            <a:off x="651000" y="2160442"/>
-            <a:ext cx="10035000" cy="4680813"/>
+            <a:off x="651000" y="2160443"/>
+            <a:ext cx="9900000" cy="4526925"/>
           </a:xfrm>
           <a:prstGeom prst="rect">
             <a:avLst/>
@@ -22935,7 +22753,7 @@
               <a:buNone/>
             </a:pPr>
             <a:r>
-              <a:rPr lang="en-US" sz="2600" b="1" noProof="1">
+              <a:rPr lang="en-US" sz="2500" b="1" noProof="1">
                 <a:latin typeface="Consolas" pitchFamily="49" charset="0"/>
                 <a:cs typeface="Consolas" pitchFamily="49" charset="0"/>
               </a:rPr>
@@ -22954,7 +22772,7 @@
               <a:buNone/>
             </a:pPr>
             <a:r>
-              <a:rPr lang="en-US" sz="2600" b="1" noProof="1">
+              <a:rPr lang="en-US" sz="2500" b="1" noProof="1">
                 <a:latin typeface="Consolas" pitchFamily="49" charset="0"/>
                 <a:cs typeface="Consolas" pitchFamily="49" charset="0"/>
               </a:rPr>
@@ -22973,7 +22791,7 @@
               <a:buNone/>
             </a:pPr>
             <a:r>
-              <a:rPr lang="en-US" sz="2600" b="1" noProof="1">
+              <a:rPr lang="en-US" sz="2500" b="1" noProof="1">
                 <a:latin typeface="Consolas" pitchFamily="49" charset="0"/>
                 <a:cs typeface="Consolas" pitchFamily="49" charset="0"/>
               </a:rPr>
@@ -22992,21 +22810,21 @@
               <a:buNone/>
             </a:pPr>
             <a:r>
-              <a:rPr lang="en-US" sz="2600" b="1" noProof="1">
+              <a:rPr lang="en-US" sz="2500" b="1" noProof="1">
                 <a:latin typeface="Consolas" pitchFamily="49" charset="0"/>
                 <a:cs typeface="Consolas" pitchFamily="49" charset="0"/>
               </a:rPr>
               <a:t>  </a:t>
             </a:r>
             <a:r>
-              <a:rPr lang="en-GB" sz="2600" b="1" noProof="1">
+              <a:rPr lang="en-GB" sz="2500" b="1" noProof="1">
                 <a:latin typeface="Consolas" pitchFamily="49" charset="0"/>
                 <a:cs typeface="Consolas" pitchFamily="49" charset="0"/>
               </a:rPr>
               <a:t>public </a:t>
             </a:r>
             <a:r>
-              <a:rPr lang="en-GB" sz="2600" b="1" noProof="1">
+              <a:rPr lang="en-GB" sz="2500" b="1" noProof="1">
                 <a:solidFill>
                   <a:schemeClr val="bg1"/>
                 </a:solidFill>
@@ -23016,21 +22834,21 @@
               <a:t>IReadOnlyCollection&lt;Person&gt; </a:t>
             </a:r>
             <a:r>
-              <a:rPr lang="en-GB" sz="2600" b="1" noProof="1">
+              <a:rPr lang="en-GB" sz="2500" b="1" noProof="1">
                 <a:latin typeface="Consolas" pitchFamily="49" charset="0"/>
                 <a:cs typeface="Consolas" pitchFamily="49" charset="0"/>
               </a:rPr>
               <a:t>P</a:t>
             </a:r>
             <a:r>
-              <a:rPr lang="en-US" sz="2600" b="1" noProof="1">
+              <a:rPr lang="en-US" sz="2500" b="1" noProof="1">
                 <a:latin typeface="Consolas" pitchFamily="49" charset="0"/>
                 <a:cs typeface="Consolas" pitchFamily="49" charset="0"/>
               </a:rPr>
               <a:t>layers</a:t>
             </a:r>
             <a:r>
-              <a:rPr lang="en-GB" sz="2600" b="1" noProof="1">
+              <a:rPr lang="en-GB" sz="2500" b="1" noProof="1">
                 <a:latin typeface="Consolas" pitchFamily="49" charset="0"/>
                 <a:cs typeface="Consolas" pitchFamily="49" charset="0"/>
               </a:rPr>
@@ -23049,7 +22867,7 @@
               <a:buNone/>
             </a:pPr>
             <a:r>
-              <a:rPr lang="en-GB" sz="2600" b="1" noProof="1">
+              <a:rPr lang="en-GB" sz="2500" b="1" noProof="1">
                 <a:latin typeface="Consolas" pitchFamily="49" charset="0"/>
                 <a:cs typeface="Consolas" pitchFamily="49" charset="0"/>
               </a:rPr>
@@ -23068,28 +22886,28 @@
               <a:buNone/>
             </a:pPr>
             <a:r>
-              <a:rPr lang="en-GB" sz="2600" b="1" noProof="1">
+              <a:rPr lang="en-GB" sz="2500" b="1" noProof="1">
                 <a:latin typeface="Consolas" pitchFamily="49" charset="0"/>
                 <a:cs typeface="Consolas" pitchFamily="49" charset="0"/>
               </a:rPr>
               <a:t>    get { return this.</a:t>
             </a:r>
             <a:r>
-              <a:rPr lang="en-US" sz="2600" b="1" noProof="1">
+              <a:rPr lang="en-US" sz="2500" b="1" noProof="1">
                 <a:latin typeface="Consolas" pitchFamily="49" charset="0"/>
                 <a:cs typeface="Consolas" pitchFamily="49" charset="0"/>
               </a:rPr>
               <a:t>players</a:t>
             </a:r>
             <a:r>
-              <a:rPr lang="en-GB" sz="2600" b="1" noProof="1">
+              <a:rPr lang="en-GB" sz="2500" b="1" noProof="1">
                 <a:latin typeface="Consolas" pitchFamily="49" charset="0"/>
                 <a:cs typeface="Consolas" pitchFamily="49" charset="0"/>
               </a:rPr>
               <a:t>.</a:t>
             </a:r>
             <a:r>
-              <a:rPr lang="en-GB" sz="2600" b="1" noProof="1">
+              <a:rPr lang="en-GB" sz="2500" b="1" noProof="1">
                 <a:solidFill>
                   <a:schemeClr val="bg1"/>
                 </a:solidFill>
@@ -23099,7 +22917,7 @@
               <a:t>AsReadOnly</a:t>
             </a:r>
             <a:r>
-              <a:rPr lang="en-GB" sz="2600" b="1" noProof="1">
+              <a:rPr lang="en-GB" sz="2500" b="1" noProof="1">
                 <a:latin typeface="Consolas" pitchFamily="49" charset="0"/>
                 <a:cs typeface="Consolas" pitchFamily="49" charset="0"/>
               </a:rPr>
@@ -23118,7 +22936,7 @@
               <a:buNone/>
             </a:pPr>
             <a:r>
-              <a:rPr lang="en-GB" sz="2600" b="1" noProof="1">
+              <a:rPr lang="en-GB" sz="2500" b="1" noProof="1">
                 <a:latin typeface="Consolas" pitchFamily="49" charset="0"/>
                 <a:cs typeface="Consolas" pitchFamily="49" charset="0"/>
               </a:rPr>
@@ -23137,14 +22955,14 @@
               <a:buNone/>
             </a:pPr>
             <a:r>
-              <a:rPr lang="en-GB" sz="2600" b="1" noProof="1">
+              <a:rPr lang="en-GB" sz="2500" b="1" noProof="1">
                 <a:latin typeface="Consolas" pitchFamily="49" charset="0"/>
                 <a:cs typeface="Consolas" pitchFamily="49" charset="0"/>
               </a:rPr>
               <a:t>  public void </a:t>
             </a:r>
             <a:r>
-              <a:rPr lang="en-GB" sz="2600" b="1" noProof="1">
+              <a:rPr lang="en-GB" sz="2500" b="1" noProof="1">
                 <a:solidFill>
                   <a:schemeClr val="bg1"/>
                 </a:solidFill>
@@ -23154,7 +22972,7 @@
               <a:t>AddPlayer</a:t>
             </a:r>
             <a:r>
-              <a:rPr lang="en-GB" sz="2600" b="1" noProof="1">
+              <a:rPr lang="en-GB" sz="2500" b="1" noProof="1">
                 <a:latin typeface="Consolas" pitchFamily="49" charset="0"/>
                 <a:cs typeface="Consolas" pitchFamily="49" charset="0"/>
               </a:rPr>
@@ -23173,14 +22991,14 @@
               <a:buNone/>
             </a:pPr>
             <a:r>
-              <a:rPr lang="en-GB" sz="2600" b="1" noProof="1">
+              <a:rPr lang="en-GB" sz="2500" b="1" noProof="1">
                 <a:latin typeface="Consolas" pitchFamily="49" charset="0"/>
                 <a:cs typeface="Consolas" pitchFamily="49" charset="0"/>
               </a:rPr>
               <a:t>    =&gt; </a:t>
             </a:r>
             <a:r>
-              <a:rPr lang="en-GB" sz="2600" b="1" noProof="1">
+              <a:rPr lang="en-GB" sz="2500" b="1" noProof="1">
                 <a:solidFill>
                   <a:schemeClr val="bg1"/>
                 </a:solidFill>
@@ -23190,7 +23008,7 @@
               <a:t>this.players.Add(player)</a:t>
             </a:r>
             <a:r>
-              <a:rPr lang="en-GB" sz="2600" b="1" noProof="1">
+              <a:rPr lang="en-GB" sz="2500" b="1" noProof="1">
                 <a:latin typeface="Consolas" pitchFamily="49" charset="0"/>
                 <a:cs typeface="Consolas" pitchFamily="49" charset="0"/>
               </a:rPr>
@@ -23209,7 +23027,7 @@
               <a:buNone/>
             </a:pPr>
             <a:r>
-              <a:rPr lang="en-US" sz="2600" b="1" noProof="1">
+              <a:rPr lang="en-US" sz="2500" b="1" noProof="1">
                 <a:latin typeface="Consolas" pitchFamily="49" charset="0"/>
                 <a:cs typeface="Consolas" pitchFamily="49" charset="0"/>
               </a:rPr>
@@ -24656,8 +24474,21 @@
                   <a:schemeClr val="accent2"/>
                 </a:solidFill>
               </a:rPr>
-              <a:t>// continues on the next slide</a:t>
-            </a:r>
+              <a:t>// </a:t>
+            </a:r>
+            <a:r>
+              <a:rPr lang="bg-BG" sz="2600" i="1" dirty="0">
+                <a:solidFill>
+                  <a:schemeClr val="accent2"/>
+                </a:solidFill>
+              </a:rPr>
+              <a:t>продължава на следващия слайд</a:t>
+            </a:r>
+            <a:endParaRPr lang="en-US" sz="2600" i="1" dirty="0">
+              <a:solidFill>
+                <a:schemeClr val="accent2"/>
+              </a:solidFill>
+            </a:endParaRPr>
           </a:p>
         </p:txBody>
       </p:sp>
@@ -25315,8 +25146,37 @@
                   <a:schemeClr val="accent2"/>
                 </a:solidFill>
               </a:rPr>
-              <a:t> Implement reserve team getter</a:t>
-            </a:r>
+              <a:t> </a:t>
+            </a:r>
+            <a:r>
+              <a:rPr lang="bg-BG" sz="2600" i="1" noProof="1">
+                <a:solidFill>
+                  <a:schemeClr val="accent2"/>
+                </a:solidFill>
+              </a:rPr>
+              <a:t>Добавете </a:t>
+            </a:r>
+            <a:r>
+              <a:rPr lang="en-US" sz="2600" i="1" noProof="1">
+                <a:solidFill>
+                  <a:schemeClr val="accent2"/>
+                </a:solidFill>
+              </a:rPr>
+              <a:t>getter</a:t>
+            </a:r>
+            <a:r>
+              <a:rPr lang="bg-BG" sz="2600" i="1" noProof="1">
+                <a:solidFill>
+                  <a:schemeClr val="accent2"/>
+                </a:solidFill>
+              </a:rPr>
+              <a:t> за резервния отбор</a:t>
+            </a:r>
+            <a:endParaRPr lang="en-US" sz="2600" i="1" noProof="1">
+              <a:solidFill>
+                <a:schemeClr val="accent2"/>
+              </a:solidFill>
+            </a:endParaRPr>
           </a:p>
           <a:p>
             <a:pPr>
@@ -28870,7 +28730,26 @@
                   <a:srgbClr val="FFFFFF"/>
                 </a:solidFill>
               </a:rPr>
-              <a:t>само за публичните методи на класа</a:t>
+              <a:t>само за </a:t>
+            </a:r>
+            <a:r>
+              <a:rPr lang="bg-BG" sz="2400" b="1" noProof="1">
+                <a:solidFill>
+                  <a:schemeClr val="bg1">
+                    <a:lumMod val="60000"/>
+                    <a:lumOff val="40000"/>
+                  </a:schemeClr>
+                </a:solidFill>
+              </a:rPr>
+              <a:t>публичните методи </a:t>
+            </a:r>
+            <a:r>
+              <a:rPr lang="bg-BG" sz="2400" b="1" noProof="1">
+                <a:solidFill>
+                  <a:srgbClr val="FFFFFF"/>
+                </a:solidFill>
+              </a:rPr>
+              <a:t>на класа</a:t>
             </a:r>
             <a:endParaRPr lang="en-US" sz="2400" b="1" noProof="1">
               <a:solidFill>
@@ -28984,10 +28863,40 @@
             <a:r>
               <a:rPr lang="bg-BG" sz="2400" b="1" noProof="1">
                 <a:solidFill>
+                  <a:schemeClr val="bg1">
+                    <a:lumMod val="60000"/>
+                    <a:lumOff val="40000"/>
+                  </a:schemeClr>
+                </a:solidFill>
+              </a:rPr>
+              <a:t>достъп</a:t>
+            </a:r>
+            <a:r>
+              <a:rPr lang="bg-BG" sz="2400" b="1" noProof="1">
+                <a:solidFill>
                   <a:srgbClr val="FFFFFF"/>
                 </a:solidFill>
               </a:rPr>
-              <a:t>достъп и промяна на стойността</a:t>
+              <a:t> и </a:t>
+            </a:r>
+            <a:r>
+              <a:rPr lang="bg-BG" sz="2400" b="1" noProof="1">
+                <a:solidFill>
+                  <a:schemeClr val="bg1">
+                    <a:lumMod val="60000"/>
+                    <a:lumOff val="40000"/>
+                  </a:schemeClr>
+                </a:solidFill>
+              </a:rPr>
+              <a:t>промяна</a:t>
+            </a:r>
+            <a:r>
+              <a:rPr lang="bg-BG" sz="2400" b="1" noProof="1">
+                <a:solidFill>
+                  <a:srgbClr val="FFFFFF"/>
+                </a:solidFill>
+              </a:rPr>
+              <a:t> на стойността</a:t>
             </a:r>
             <a:endParaRPr lang="en-US" sz="2400" b="1" noProof="1">
               <a:solidFill>
@@ -29400,7 +29309,8 @@
                 <a:solidFill>
                   <a:schemeClr val="bg1"/>
                 </a:solidFill>
-                <a:latin typeface="Consolas" panose="020B0609020204030204" pitchFamily="49" charset="0"/>
+                <a:latin typeface="Calibri" panose="020F0502020204030204" pitchFamily="34" charset="0"/>
+                <a:cs typeface="Calibri" panose="020F0502020204030204" pitchFamily="34" charset="0"/>
               </a:rPr>
               <a:t>частни</a:t>
             </a:r>
@@ -29408,7 +29318,8 @@
               <a:solidFill>
                 <a:schemeClr val="bg1"/>
               </a:solidFill>
-              <a:latin typeface="Consolas" panose="020B0609020204030204" pitchFamily="49" charset="0"/>
+              <a:latin typeface="Calibri" panose="020F0502020204030204" pitchFamily="34" charset="0"/>
+              <a:cs typeface="Calibri" panose="020F0502020204030204" pitchFamily="34" charset="0"/>
             </a:endParaRPr>
           </a:p>
           <a:p>
@@ -29441,7 +29352,8 @@
                 <a:solidFill>
                   <a:schemeClr val="bg1"/>
                 </a:solidFill>
-                <a:latin typeface="Consolas" panose="020B0609020204030204" pitchFamily="49" charset="0"/>
+                <a:latin typeface="Calibri" panose="020F0502020204030204" pitchFamily="34" charset="0"/>
+                <a:cs typeface="Calibri" panose="020F0502020204030204" pitchFamily="34" charset="0"/>
               </a:rPr>
               <a:t>публични</a:t>
             </a:r>
@@ -29449,7 +29361,8 @@
               <a:solidFill>
                 <a:schemeClr val="bg1"/>
               </a:solidFill>
-              <a:latin typeface="Consolas" panose="020B0609020204030204" pitchFamily="49" charset="0"/>
+              <a:latin typeface="Calibri" panose="020F0502020204030204" pitchFamily="34" charset="0"/>
+              <a:cs typeface="Calibri" panose="020F0502020204030204" pitchFamily="34" charset="0"/>
             </a:endParaRPr>
           </a:p>
           <a:p>
@@ -31553,15 +31466,33 @@
                                   </p:childTnLst>
                                 </p:cTn>
                               </p:par>
+                            </p:childTnLst>
+                          </p:cTn>
+                        </p:par>
+                      </p:childTnLst>
+                    </p:cTn>
+                  </p:par>
+                  <p:par>
+                    <p:cTn id="7" fill="hold">
+                      <p:stCondLst>
+                        <p:cond delay="indefinite"/>
+                      </p:stCondLst>
+                      <p:childTnLst>
+                        <p:par>
+                          <p:cTn id="8" fill="hold">
+                            <p:stCondLst>
+                              <p:cond delay="0"/>
+                            </p:stCondLst>
+                            <p:childTnLst>
                               <p:par>
-                                <p:cTn id="7" presetID="1" presetClass="entr" presetSubtype="0" fill="hold" grpId="0" nodeType="withEffect">
+                                <p:cTn id="9" presetID="1" presetClass="entr" presetSubtype="0" fill="hold" grpId="0" nodeType="clickEffect">
                                   <p:stCondLst>
                                     <p:cond delay="0"/>
                                   </p:stCondLst>
                                   <p:childTnLst>
                                     <p:set>
                                       <p:cBhvr>
-                                        <p:cTn id="8" dur="1" fill="hold">
+                                        <p:cTn id="10" dur="1" fill="hold">
                                           <p:stCondLst>
                                             <p:cond delay="0"/>
                                           </p:stCondLst>
@@ -32076,9 +32007,6 @@
                     <p:cTn id="3" fill="hold">
                       <p:stCondLst>
                         <p:cond delay="indefinite"/>
-                        <p:cond evt="onBegin" delay="0">
-                          <p:tn val="2"/>
-                        </p:cond>
                       </p:stCondLst>
                       <p:childTnLst>
                         <p:par>
@@ -32088,7 +32016,7 @@
                             </p:stCondLst>
                             <p:childTnLst>
                               <p:par>
-                                <p:cTn id="5" presetID="1" presetClass="entr" presetSubtype="0" fill="hold" grpId="0" nodeType="withEffect">
+                                <p:cTn id="5" presetID="1" presetClass="entr" presetSubtype="0" fill="hold" grpId="0" nodeType="clickEffect">
                                   <p:stCondLst>
                                     <p:cond delay="0"/>
                                   </p:stCondLst>
@@ -32114,15 +32042,33 @@
                                   </p:childTnLst>
                                 </p:cTn>
                               </p:par>
+                            </p:childTnLst>
+                          </p:cTn>
+                        </p:par>
+                      </p:childTnLst>
+                    </p:cTn>
+                  </p:par>
+                  <p:par>
+                    <p:cTn id="7" fill="hold">
+                      <p:stCondLst>
+                        <p:cond delay="indefinite"/>
+                      </p:stCondLst>
+                      <p:childTnLst>
+                        <p:par>
+                          <p:cTn id="8" fill="hold">
+                            <p:stCondLst>
+                              <p:cond delay="0"/>
+                            </p:stCondLst>
+                            <p:childTnLst>
                               <p:par>
-                                <p:cTn id="7" presetID="1" presetClass="entr" presetSubtype="0" fill="hold" grpId="0" nodeType="withEffect">
+                                <p:cTn id="9" presetID="1" presetClass="entr" presetSubtype="0" fill="hold" grpId="0" nodeType="clickEffect">
                                   <p:stCondLst>
                                     <p:cond delay="0"/>
                                   </p:stCondLst>
                                   <p:childTnLst>
                                     <p:set>
                                       <p:cBhvr>
-                                        <p:cTn id="8" dur="1" fill="hold">
+                                        <p:cTn id="10" dur="1" fill="hold">
                                           <p:stCondLst>
                                             <p:cond delay="0"/>
                                           </p:stCondLst>

</xml_diff>

<commit_message>
Completed TODOs for "09. Encapsulation" slides
</commit_message>
<xml_diff>
--- a/Courses/Software-Sciences/Module-1-OOP-New/09-Encapsulation/09-Encapsulation.pptx
+++ b/Courses/Software-Sciences/Module-1-OOP-New/09-Encapsulation/09-Encapsulation.pptx
@@ -5,10 +5,10 @@
     <p:sldMasterId id="2147483675" r:id="rId1"/>
   </p:sldMasterIdLst>
   <p:notesMasterIdLst>
-    <p:notesMasterId r:id="rId37"/>
+    <p:notesMasterId r:id="rId38"/>
   </p:notesMasterIdLst>
   <p:handoutMasterIdLst>
-    <p:handoutMasterId r:id="rId38"/>
+    <p:handoutMasterId r:id="rId39"/>
   </p:handoutMasterIdLst>
   <p:sldIdLst>
     <p:sldId id="291" r:id="rId2"/>
@@ -30,22 +30,23 @@
     <p:sldId id="307" r:id="rId18"/>
     <p:sldId id="499" r:id="rId19"/>
     <p:sldId id="498" r:id="rId20"/>
-    <p:sldId id="502" r:id="rId21"/>
-    <p:sldId id="308" r:id="rId22"/>
-    <p:sldId id="309" r:id="rId23"/>
-    <p:sldId id="310" r:id="rId24"/>
-    <p:sldId id="311" r:id="rId25"/>
-    <p:sldId id="312" r:id="rId26"/>
-    <p:sldId id="494" r:id="rId27"/>
-    <p:sldId id="313" r:id="rId28"/>
-    <p:sldId id="314" r:id="rId29"/>
-    <p:sldId id="315" r:id="rId30"/>
-    <p:sldId id="316" r:id="rId31"/>
-    <p:sldId id="317" r:id="rId32"/>
-    <p:sldId id="318" r:id="rId33"/>
-    <p:sldId id="319" r:id="rId34"/>
-    <p:sldId id="401" r:id="rId35"/>
-    <p:sldId id="493" r:id="rId36"/>
+    <p:sldId id="503" r:id="rId21"/>
+    <p:sldId id="502" r:id="rId22"/>
+    <p:sldId id="308" r:id="rId23"/>
+    <p:sldId id="309" r:id="rId24"/>
+    <p:sldId id="310" r:id="rId25"/>
+    <p:sldId id="311" r:id="rId26"/>
+    <p:sldId id="312" r:id="rId27"/>
+    <p:sldId id="494" r:id="rId28"/>
+    <p:sldId id="313" r:id="rId29"/>
+    <p:sldId id="314" r:id="rId30"/>
+    <p:sldId id="315" r:id="rId31"/>
+    <p:sldId id="316" r:id="rId32"/>
+    <p:sldId id="317" r:id="rId33"/>
+    <p:sldId id="318" r:id="rId34"/>
+    <p:sldId id="319" r:id="rId35"/>
+    <p:sldId id="401" r:id="rId36"/>
+    <p:sldId id="493" r:id="rId37"/>
   </p:sldIdLst>
   <p:sldSz cx="12192000" cy="6858000"/>
   <p:notesSz cx="6858000" cy="9144000"/>
@@ -180,6 +181,7 @@
           <p14:sldIdLst>
             <p14:sldId id="499"/>
             <p14:sldId id="498"/>
+            <p14:sldId id="503"/>
             <p14:sldId id="502"/>
           </p14:sldIdLst>
         </p14:section>
@@ -327,7 +329,7 @@
           <a:p>
             <a:fld id="{4E087215-0C8F-4762-A664-737A353EC9A4}" type="datetimeFigureOut">
               <a:rPr lang="bg-BG" smtClean="0"/>
-              <a:t>21.12.22 г.</a:t>
+              <a:t>16.01.23 г.</a:t>
             </a:fld>
             <a:endParaRPr lang="bg-BG" dirty="0"/>
           </a:p>
@@ -518,7 +520,7 @@
           <a:p>
             <a:fld id="{72D84649-876A-46C9-8472-14CB09C070D8}" type="datetimeFigureOut">
               <a:rPr lang="en-US" smtClean="0"/>
-              <a:t>12/21/22</a:t>
+              <a:t>1/16/23</a:t>
             </a:fld>
             <a:endParaRPr lang="en-US" dirty="0"/>
           </a:p>
@@ -1051,80 +1053,21 @@
       </p:grpSpPr>
       <p:sp>
         <p:nvSpPr>
-          <p:cNvPr id="4" name="Rectangle 2"/>
+          <p:cNvPr id="2" name="Slide Image Placeholder 1"/>
           <p:cNvSpPr>
-            <a:spLocks noGrp="1" noChangeArrowheads="1"/>
-          </p:cNvSpPr>
-          <p:nvPr>
-            <p:ph type="hdr" sz="quarter"/>
-          </p:nvPr>
-        </p:nvSpPr>
-        <p:spPr>
-          <a:ln/>
-        </p:spPr>
-        <p:txBody>
-          <a:bodyPr/>
-          <a:lstStyle/>
-          <a:p>
-            <a:r>
-              <a:rPr lang="en-US" dirty="0"/>
-              <a:t>*</a:t>
-            </a:r>
-          </a:p>
-        </p:txBody>
-      </p:sp>
-      <p:sp>
-        <p:nvSpPr>
-          <p:cNvPr id="6" name="Rectangle 7"/>
-          <p:cNvSpPr>
-            <a:spLocks noGrp="1" noChangeArrowheads="1"/>
-          </p:cNvSpPr>
-          <p:nvPr>
-            <p:ph type="sldNum" sz="quarter" idx="5"/>
-          </p:nvPr>
-        </p:nvSpPr>
-        <p:spPr>
-          <a:ln/>
-        </p:spPr>
-        <p:txBody>
-          <a:bodyPr/>
-          <a:lstStyle/>
-          <a:p>
-            <a:fld id="{9C149E57-0798-442F-9EDF-19F617E03DDC}" type="slidenum">
-              <a:rPr lang="en-US"/>
-              <a:pPr/>
-              <a:t>20</a:t>
-            </a:fld>
-            <a:r>
-              <a:rPr lang="en-US" dirty="0"/>
-              <a:t>##</a:t>
-            </a:r>
-          </a:p>
-        </p:txBody>
-      </p:sp>
-      <p:sp>
-        <p:nvSpPr>
-          <p:cNvPr id="567298" name="Rectangle 2"/>
-          <p:cNvSpPr>
-            <a:spLocks noGrp="1" noRot="1" noChangeAspect="1" noChangeArrowheads="1" noTextEdit="1"/>
+            <a:spLocks noGrp="1" noRot="1" noChangeAspect="1"/>
           </p:cNvSpPr>
           <p:nvPr>
             <p:ph type="sldImg"/>
           </p:nvPr>
         </p:nvSpPr>
-        <p:spPr>
-          <a:xfrm>
-            <a:off x="381000" y="685800"/>
-            <a:ext cx="6096000" cy="3429000"/>
-          </a:xfrm>
-          <a:ln/>
-        </p:spPr>
+        <p:spPr/>
       </p:sp>
       <p:sp>
         <p:nvSpPr>
-          <p:cNvPr id="567299" name="Rectangle 3"/>
+          <p:cNvPr id="3" name="Notes Placeholder 2"/>
           <p:cNvSpPr>
-            <a:spLocks noGrp="1" noChangeArrowheads="1"/>
+            <a:spLocks noGrp="1"/>
           </p:cNvSpPr>
           <p:nvPr>
             <p:ph type="body" idx="1"/>
@@ -1135,19 +1078,36 @@
           <a:bodyPr/>
           <a:lstStyle/>
           <a:p>
-            <a:endParaRPr lang="bg-BG"/>
+            <a:endParaRPr lang="en-BG" dirty="0"/>
           </a:p>
         </p:txBody>
       </p:sp>
       <p:sp>
         <p:nvSpPr>
-          <p:cNvPr id="7" name="Footer Placeholder 5">
-            <a:extLst>
-              <a:ext uri="{FF2B5EF4-FFF2-40B4-BE49-F238E27FC236}">
-                <a16:creationId xmlns:a16="http://schemas.microsoft.com/office/drawing/2014/main" id="{EA54F4D8-B34D-426C-8872-C14F1CB34A49}"/>
-              </a:ext>
-            </a:extLst>
-          </p:cNvPr>
+          <p:cNvPr id="4" name="Slide Number Placeholder 3"/>
+          <p:cNvSpPr>
+            <a:spLocks noGrp="1"/>
+          </p:cNvSpPr>
+          <p:nvPr>
+            <p:ph type="sldNum" sz="quarter" idx="5"/>
+          </p:nvPr>
+        </p:nvSpPr>
+        <p:spPr/>
+        <p:txBody>
+          <a:bodyPr/>
+          <a:lstStyle/>
+          <a:p>
+            <a:fld id="{2BF067CD-8E6B-4360-9AA8-C5DF2A48A6D1}" type="slidenum">
+              <a:rPr lang="en-US" smtClean="0"/>
+              <a:t>19</a:t>
+            </a:fld>
+            <a:endParaRPr lang="en-US" dirty="0"/>
+          </a:p>
+        </p:txBody>
+      </p:sp>
+      <p:sp>
+        <p:nvSpPr>
+          <p:cNvPr id="5" name="Footer Placeholder 4"/>
           <p:cNvSpPr>
             <a:spLocks noGrp="1"/>
           </p:cNvSpPr>
@@ -1155,44 +1115,33 @@
             <p:ph type="ftr" sz="quarter" idx="4"/>
           </p:nvPr>
         </p:nvSpPr>
-        <p:spPr>
-          <a:xfrm>
-            <a:off x="-1" y="8890412"/>
-            <a:ext cx="6308999" cy="252000"/>
-          </a:xfrm>
-          <a:prstGeom prst="rect">
-            <a:avLst/>
-          </a:prstGeom>
-        </p:spPr>
+        <p:spPr/>
         <p:txBody>
-          <a:bodyPr vert="horz" lIns="91440" tIns="45720" rIns="91440" bIns="45720" rtlCol="0" anchor="b"/>
-          <a:lstStyle>
-            <a:lvl1pPr algn="l">
-              <a:defRPr sz="1000"/>
-            </a:lvl1pPr>
-          </a:lstStyle>
-          <a:p>
-            <a:r>
-              <a:rPr lang="en-US" dirty="0"/>
+          <a:bodyPr/>
+          <a:lstStyle/>
+          <a:p>
+            <a:r>
+              <a:rPr lang="en-US"/>
               <a:t>© SoftUni – </a:t>
             </a:r>
             <a:r>
-              <a:rPr lang="en-US" u="sng" dirty="0">
+              <a:rPr lang="en-US" u="sng">
                 <a:hlinkClick r:id="rId3"/>
               </a:rPr>
               <a:t>https://softuni.org</a:t>
             </a:r>
             <a:r>
-              <a:rPr lang="en-US" dirty="0"/>
+              <a:rPr lang="en-US"/>
               <a:t>. Copyrighted document. Unauthorized copy or reproduction is not permitted.</a:t>
             </a:r>
+            <a:endParaRPr lang="en-US" dirty="0"/>
           </a:p>
         </p:txBody>
       </p:sp>
     </p:spTree>
     <p:extLst>
       <p:ext uri="{BB962C8B-B14F-4D97-AF65-F5344CB8AC3E}">
-        <p14:creationId xmlns:p14="http://schemas.microsoft.com/office/powerpoint/2010/main" val="3254075894"/>
+        <p14:creationId xmlns:p14="http://schemas.microsoft.com/office/powerpoint/2010/main" val="968829322"/>
       </p:ext>
     </p:extLst>
   </p:cSld>
@@ -1246,18 +1195,18 @@
           <a:bodyPr/>
           <a:lstStyle/>
           <a:p>
-            <a:endParaRPr lang="en-US" dirty="0"/>
+            <a:endParaRPr lang="en-BG" dirty="0"/>
           </a:p>
         </p:txBody>
       </p:sp>
       <p:sp>
         <p:nvSpPr>
-          <p:cNvPr id="5" name="Slide Number Placeholder 4"/>
+          <p:cNvPr id="4" name="Slide Number Placeholder 3"/>
           <p:cNvSpPr>
             <a:spLocks noGrp="1"/>
           </p:cNvSpPr>
           <p:nvPr>
-            <p:ph type="sldNum" sz="quarter" idx="11"/>
+            <p:ph type="sldNum" sz="quarter" idx="5"/>
           </p:nvPr>
         </p:nvSpPr>
         <p:spPr/>
@@ -1265,10 +1214,9 @@
           <a:bodyPr/>
           <a:lstStyle/>
           <a:p>
-            <a:fld id="{3EBA5BD7-F043-4D1B-AA17-CD412FC534DE}" type="slidenum">
+            <a:fld id="{2BF067CD-8E6B-4360-9AA8-C5DF2A48A6D1}" type="slidenum">
               <a:rPr lang="en-US" smtClean="0"/>
-              <a:pPr/>
-              <a:t>21</a:t>
+              <a:t>20</a:t>
             </a:fld>
             <a:endParaRPr lang="en-US" dirty="0"/>
           </a:p>
@@ -1276,13 +1224,7 @@
       </p:sp>
       <p:sp>
         <p:nvSpPr>
-          <p:cNvPr id="6" name="Footer Placeholder 7">
-            <a:extLst>
-              <a:ext uri="{FF2B5EF4-FFF2-40B4-BE49-F238E27FC236}">
-                <a16:creationId xmlns:a16="http://schemas.microsoft.com/office/drawing/2014/main" id="{D714A544-2F3B-41FD-A739-AC3A08799704}"/>
-              </a:ext>
-            </a:extLst>
-          </p:cNvPr>
+          <p:cNvPr id="5" name="Footer Placeholder 4"/>
           <p:cNvSpPr>
             <a:spLocks noGrp="1"/>
           </p:cNvSpPr>
@@ -1290,44 +1232,33 @@
             <p:ph type="ftr" sz="quarter" idx="4"/>
           </p:nvPr>
         </p:nvSpPr>
-        <p:spPr>
-          <a:xfrm>
-            <a:off x="-1" y="8847000"/>
-            <a:ext cx="6488999" cy="297000"/>
-          </a:xfrm>
-          <a:prstGeom prst="rect">
-            <a:avLst/>
-          </a:prstGeom>
-        </p:spPr>
+        <p:spPr/>
         <p:txBody>
-          <a:bodyPr vert="horz" lIns="91440" tIns="45720" rIns="91440" bIns="45720" rtlCol="0" anchor="b"/>
-          <a:lstStyle>
-            <a:lvl1pPr algn="l">
-              <a:defRPr sz="1100"/>
-            </a:lvl1pPr>
-          </a:lstStyle>
-          <a:p>
-            <a:r>
-              <a:rPr lang="en-US" dirty="0"/>
+          <a:bodyPr/>
+          <a:lstStyle/>
+          <a:p>
+            <a:r>
+              <a:rPr lang="en-US"/>
               <a:t>© SoftUni – </a:t>
             </a:r>
             <a:r>
-              <a:rPr lang="en-US" u="sng" dirty="0">
+              <a:rPr lang="en-US" u="sng">
                 <a:hlinkClick r:id="rId3"/>
               </a:rPr>
               <a:t>https://softuni.org</a:t>
             </a:r>
             <a:r>
-              <a:rPr lang="en-US" dirty="0"/>
+              <a:rPr lang="en-US"/>
               <a:t>. Copyrighted document. Unauthorized copy or reproduction is not permitted.</a:t>
             </a:r>
+            <a:endParaRPr lang="en-US" dirty="0"/>
           </a:p>
         </p:txBody>
       </p:sp>
     </p:spTree>
     <p:extLst>
       <p:ext uri="{BB962C8B-B14F-4D97-AF65-F5344CB8AC3E}">
-        <p14:creationId xmlns:p14="http://schemas.microsoft.com/office/powerpoint/2010/main" val="4291752549"/>
+        <p14:creationId xmlns:p14="http://schemas.microsoft.com/office/powerpoint/2010/main" val="967898394"/>
       </p:ext>
     </p:extLst>
   </p:cSld>
@@ -1356,21 +1287,80 @@
       </p:grpSpPr>
       <p:sp>
         <p:nvSpPr>
-          <p:cNvPr id="2" name="Slide Image Placeholder 1"/>
+          <p:cNvPr id="4" name="Rectangle 2"/>
           <p:cNvSpPr>
-            <a:spLocks noGrp="1" noRot="1" noChangeAspect="1"/>
+            <a:spLocks noGrp="1" noChangeArrowheads="1"/>
+          </p:cNvSpPr>
+          <p:nvPr>
+            <p:ph type="hdr" sz="quarter"/>
+          </p:nvPr>
+        </p:nvSpPr>
+        <p:spPr>
+          <a:ln/>
+        </p:spPr>
+        <p:txBody>
+          <a:bodyPr/>
+          <a:lstStyle/>
+          <a:p>
+            <a:r>
+              <a:rPr lang="en-US" dirty="0"/>
+              <a:t>*</a:t>
+            </a:r>
+          </a:p>
+        </p:txBody>
+      </p:sp>
+      <p:sp>
+        <p:nvSpPr>
+          <p:cNvPr id="6" name="Rectangle 7"/>
+          <p:cNvSpPr>
+            <a:spLocks noGrp="1" noChangeArrowheads="1"/>
+          </p:cNvSpPr>
+          <p:nvPr>
+            <p:ph type="sldNum" sz="quarter" idx="5"/>
+          </p:nvPr>
+        </p:nvSpPr>
+        <p:spPr>
+          <a:ln/>
+        </p:spPr>
+        <p:txBody>
+          <a:bodyPr/>
+          <a:lstStyle/>
+          <a:p>
+            <a:fld id="{9C149E57-0798-442F-9EDF-19F617E03DDC}" type="slidenum">
+              <a:rPr lang="en-US"/>
+              <a:pPr/>
+              <a:t>21</a:t>
+            </a:fld>
+            <a:r>
+              <a:rPr lang="en-US" dirty="0"/>
+              <a:t>##</a:t>
+            </a:r>
+          </a:p>
+        </p:txBody>
+      </p:sp>
+      <p:sp>
+        <p:nvSpPr>
+          <p:cNvPr id="567298" name="Rectangle 2"/>
+          <p:cNvSpPr>
+            <a:spLocks noGrp="1" noRot="1" noChangeAspect="1" noChangeArrowheads="1" noTextEdit="1"/>
           </p:cNvSpPr>
           <p:nvPr>
             <p:ph type="sldImg"/>
           </p:nvPr>
         </p:nvSpPr>
-        <p:spPr/>
+        <p:spPr>
+          <a:xfrm>
+            <a:off x="381000" y="685800"/>
+            <a:ext cx="6096000" cy="3429000"/>
+          </a:xfrm>
+          <a:ln/>
+        </p:spPr>
       </p:sp>
       <p:sp>
         <p:nvSpPr>
-          <p:cNvPr id="3" name="Notes Placeholder 2"/>
+          <p:cNvPr id="567299" name="Rectangle 3"/>
           <p:cNvSpPr>
-            <a:spLocks noGrp="1"/>
+            <a:spLocks noGrp="1" noChangeArrowheads="1"/>
           </p:cNvSpPr>
           <p:nvPr>
             <p:ph type="body" idx="1"/>
@@ -1381,40 +1371,16 @@
           <a:bodyPr/>
           <a:lstStyle/>
           <a:p>
-            <a:endParaRPr lang="en-GB" dirty="0"/>
+            <a:endParaRPr lang="bg-BG"/>
           </a:p>
         </p:txBody>
       </p:sp>
       <p:sp>
         <p:nvSpPr>
-          <p:cNvPr id="5" name="Slide Number Placeholder 4"/>
-          <p:cNvSpPr>
-            <a:spLocks noGrp="1"/>
-          </p:cNvSpPr>
-          <p:nvPr>
-            <p:ph type="sldNum" sz="quarter" idx="11"/>
-          </p:nvPr>
-        </p:nvSpPr>
-        <p:spPr/>
-        <p:txBody>
-          <a:bodyPr/>
-          <a:lstStyle/>
-          <a:p>
-            <a:fld id="{3EBA5BD7-F043-4D1B-AA17-CD412FC534DE}" type="slidenum">
-              <a:rPr lang="en-US" smtClean="0"/>
-              <a:pPr/>
-              <a:t>22</a:t>
-            </a:fld>
-            <a:endParaRPr lang="en-US" dirty="0"/>
-          </a:p>
-        </p:txBody>
-      </p:sp>
-      <p:sp>
-        <p:nvSpPr>
-          <p:cNvPr id="6" name="Footer Placeholder 7">
+          <p:cNvPr id="7" name="Footer Placeholder 5">
             <a:extLst>
               <a:ext uri="{FF2B5EF4-FFF2-40B4-BE49-F238E27FC236}">
-                <a16:creationId xmlns:a16="http://schemas.microsoft.com/office/drawing/2014/main" id="{DFD14236-4576-4105-AAD1-7C969FCF050B}"/>
+                <a16:creationId xmlns:a16="http://schemas.microsoft.com/office/drawing/2014/main" id="{EA54F4D8-B34D-426C-8872-C14F1CB34A49}"/>
               </a:ext>
             </a:extLst>
           </p:cNvPr>
@@ -1427,8 +1393,8 @@
         </p:nvSpPr>
         <p:spPr>
           <a:xfrm>
-            <a:off x="-1" y="8847000"/>
-            <a:ext cx="6488999" cy="297000"/>
+            <a:off x="-1" y="8890412"/>
+            <a:ext cx="6308999" cy="252000"/>
           </a:xfrm>
           <a:prstGeom prst="rect">
             <a:avLst/>
@@ -1438,7 +1404,7 @@
           <a:bodyPr vert="horz" lIns="91440" tIns="45720" rIns="91440" bIns="45720" rtlCol="0" anchor="b"/>
           <a:lstStyle>
             <a:lvl1pPr algn="l">
-              <a:defRPr sz="1100"/>
+              <a:defRPr sz="1000"/>
             </a:lvl1pPr>
           </a:lstStyle>
           <a:p>
@@ -1462,7 +1428,7 @@
     </p:spTree>
     <p:extLst>
       <p:ext uri="{BB962C8B-B14F-4D97-AF65-F5344CB8AC3E}">
-        <p14:creationId xmlns:p14="http://schemas.microsoft.com/office/powerpoint/2010/main" val="988592648"/>
+        <p14:creationId xmlns:p14="http://schemas.microsoft.com/office/powerpoint/2010/main" val="3254075894"/>
       </p:ext>
     </p:extLst>
   </p:cSld>
@@ -1516,7 +1482,7 @@
           <a:bodyPr/>
           <a:lstStyle/>
           <a:p>
-            <a:endParaRPr lang="en-GB" dirty="0"/>
+            <a:endParaRPr lang="en-US" dirty="0"/>
           </a:p>
         </p:txBody>
       </p:sp>
@@ -1538,7 +1504,7 @@
             <a:fld id="{3EBA5BD7-F043-4D1B-AA17-CD412FC534DE}" type="slidenum">
               <a:rPr lang="en-US" smtClean="0"/>
               <a:pPr/>
-              <a:t>23</a:t>
+              <a:t>22</a:t>
             </a:fld>
             <a:endParaRPr lang="en-US" dirty="0"/>
           </a:p>
@@ -1549,7 +1515,7 @@
           <p:cNvPr id="6" name="Footer Placeholder 7">
             <a:extLst>
               <a:ext uri="{FF2B5EF4-FFF2-40B4-BE49-F238E27FC236}">
-                <a16:creationId xmlns:a16="http://schemas.microsoft.com/office/drawing/2014/main" id="{EB3870E2-B579-4A21-9A24-0D329EF52847}"/>
+                <a16:creationId xmlns:a16="http://schemas.microsoft.com/office/drawing/2014/main" id="{D714A544-2F3B-41FD-A739-AC3A08799704}"/>
               </a:ext>
             </a:extLst>
           </p:cNvPr>
@@ -1597,7 +1563,7 @@
     </p:spTree>
     <p:extLst>
       <p:ext uri="{BB962C8B-B14F-4D97-AF65-F5344CB8AC3E}">
-        <p14:creationId xmlns:p14="http://schemas.microsoft.com/office/powerpoint/2010/main" val="3521962176"/>
+        <p14:creationId xmlns:p14="http://schemas.microsoft.com/office/powerpoint/2010/main" val="4291752549"/>
       </p:ext>
     </p:extLst>
   </p:cSld>
@@ -1651,18 +1617,18 @@
           <a:bodyPr/>
           <a:lstStyle/>
           <a:p>
-            <a:endParaRPr lang="en-BG"/>
+            <a:endParaRPr lang="en-GB" dirty="0"/>
           </a:p>
         </p:txBody>
       </p:sp>
       <p:sp>
         <p:nvSpPr>
-          <p:cNvPr id="4" name="Slide Number Placeholder 3"/>
+          <p:cNvPr id="5" name="Slide Number Placeholder 4"/>
           <p:cNvSpPr>
             <a:spLocks noGrp="1"/>
           </p:cNvSpPr>
           <p:nvPr>
-            <p:ph type="sldNum" sz="quarter" idx="5"/>
+            <p:ph type="sldNum" sz="quarter" idx="11"/>
           </p:nvPr>
         </p:nvSpPr>
         <p:spPr/>
@@ -1670,9 +1636,10 @@
           <a:bodyPr/>
           <a:lstStyle/>
           <a:p>
-            <a:fld id="{2BF067CD-8E6B-4360-9AA8-C5DF2A48A6D1}" type="slidenum">
+            <a:fld id="{3EBA5BD7-F043-4D1B-AA17-CD412FC534DE}" type="slidenum">
               <a:rPr lang="en-US" smtClean="0"/>
-              <a:t>24</a:t>
+              <a:pPr/>
+              <a:t>23</a:t>
             </a:fld>
             <a:endParaRPr lang="en-US" dirty="0"/>
           </a:p>
@@ -1680,7 +1647,13 @@
       </p:sp>
       <p:sp>
         <p:nvSpPr>
-          <p:cNvPr id="5" name="Footer Placeholder 4"/>
+          <p:cNvPr id="6" name="Footer Placeholder 7">
+            <a:extLst>
+              <a:ext uri="{FF2B5EF4-FFF2-40B4-BE49-F238E27FC236}">
+                <a16:creationId xmlns:a16="http://schemas.microsoft.com/office/drawing/2014/main" id="{DFD14236-4576-4105-AAD1-7C969FCF050B}"/>
+              </a:ext>
+            </a:extLst>
+          </p:cNvPr>
           <p:cNvSpPr>
             <a:spLocks noGrp="1"/>
           </p:cNvSpPr>
@@ -1688,10 +1661,22 @@
             <p:ph type="ftr" sz="quarter" idx="4"/>
           </p:nvPr>
         </p:nvSpPr>
-        <p:spPr/>
+        <p:spPr>
+          <a:xfrm>
+            <a:off x="-1" y="8847000"/>
+            <a:ext cx="6488999" cy="297000"/>
+          </a:xfrm>
+          <a:prstGeom prst="rect">
+            <a:avLst/>
+          </a:prstGeom>
+        </p:spPr>
         <p:txBody>
-          <a:bodyPr/>
-          <a:lstStyle/>
+          <a:bodyPr vert="horz" lIns="91440" tIns="45720" rIns="91440" bIns="45720" rtlCol="0" anchor="b"/>
+          <a:lstStyle>
+            <a:lvl1pPr algn="l">
+              <a:defRPr sz="1100"/>
+            </a:lvl1pPr>
+          </a:lstStyle>
           <a:p>
             <a:r>
               <a:rPr lang="en-US" dirty="0"/>
@@ -1713,7 +1698,7 @@
     </p:spTree>
     <p:extLst>
       <p:ext uri="{BB962C8B-B14F-4D97-AF65-F5344CB8AC3E}">
-        <p14:creationId xmlns:p14="http://schemas.microsoft.com/office/powerpoint/2010/main" val="515944749"/>
+        <p14:creationId xmlns:p14="http://schemas.microsoft.com/office/powerpoint/2010/main" val="988592648"/>
       </p:ext>
     </p:extLst>
   </p:cSld>
@@ -1789,7 +1774,7 @@
             <a:fld id="{3EBA5BD7-F043-4D1B-AA17-CD412FC534DE}" type="slidenum">
               <a:rPr lang="en-US" smtClean="0"/>
               <a:pPr/>
-              <a:t>28</a:t>
+              <a:t>24</a:t>
             </a:fld>
             <a:endParaRPr lang="en-US" dirty="0"/>
           </a:p>
@@ -1800,7 +1785,7 @@
           <p:cNvPr id="6" name="Footer Placeholder 7">
             <a:extLst>
               <a:ext uri="{FF2B5EF4-FFF2-40B4-BE49-F238E27FC236}">
-                <a16:creationId xmlns:a16="http://schemas.microsoft.com/office/drawing/2014/main" id="{4D5C8C0D-B3F7-4463-9A8E-1EC6F4962F2C}"/>
+                <a16:creationId xmlns:a16="http://schemas.microsoft.com/office/drawing/2014/main" id="{EB3870E2-B579-4A21-9A24-0D329EF52847}"/>
               </a:ext>
             </a:extLst>
           </p:cNvPr>
@@ -1848,7 +1833,7 @@
     </p:spTree>
     <p:extLst>
       <p:ext uri="{BB962C8B-B14F-4D97-AF65-F5344CB8AC3E}">
-        <p14:creationId xmlns:p14="http://schemas.microsoft.com/office/powerpoint/2010/main" val="852383263"/>
+        <p14:creationId xmlns:p14="http://schemas.microsoft.com/office/powerpoint/2010/main" val="3521962176"/>
       </p:ext>
     </p:extLst>
   </p:cSld>
@@ -1902,18 +1887,18 @@
           <a:bodyPr/>
           <a:lstStyle/>
           <a:p>
-            <a:endParaRPr lang="en-GB" dirty="0"/>
+            <a:endParaRPr lang="en-BG"/>
           </a:p>
         </p:txBody>
       </p:sp>
       <p:sp>
         <p:nvSpPr>
-          <p:cNvPr id="5" name="Slide Number Placeholder 4"/>
+          <p:cNvPr id="4" name="Slide Number Placeholder 3"/>
           <p:cNvSpPr>
             <a:spLocks noGrp="1"/>
           </p:cNvSpPr>
           <p:nvPr>
-            <p:ph type="sldNum" sz="quarter" idx="11"/>
+            <p:ph type="sldNum" sz="quarter" idx="5"/>
           </p:nvPr>
         </p:nvSpPr>
         <p:spPr/>
@@ -1921,10 +1906,9 @@
           <a:bodyPr/>
           <a:lstStyle/>
           <a:p>
-            <a:fld id="{3EBA5BD7-F043-4D1B-AA17-CD412FC534DE}" type="slidenum">
+            <a:fld id="{2BF067CD-8E6B-4360-9AA8-C5DF2A48A6D1}" type="slidenum">
               <a:rPr lang="en-US" smtClean="0"/>
-              <a:pPr/>
-              <a:t>29</a:t>
+              <a:t>25</a:t>
             </a:fld>
             <a:endParaRPr lang="en-US" dirty="0"/>
           </a:p>
@@ -1932,13 +1916,7 @@
       </p:sp>
       <p:sp>
         <p:nvSpPr>
-          <p:cNvPr id="6" name="Footer Placeholder 7">
-            <a:extLst>
-              <a:ext uri="{FF2B5EF4-FFF2-40B4-BE49-F238E27FC236}">
-                <a16:creationId xmlns:a16="http://schemas.microsoft.com/office/drawing/2014/main" id="{47A39B85-E5D9-4A4E-81E6-254839195C9F}"/>
-              </a:ext>
-            </a:extLst>
-          </p:cNvPr>
+          <p:cNvPr id="5" name="Footer Placeholder 4"/>
           <p:cNvSpPr>
             <a:spLocks noGrp="1"/>
           </p:cNvSpPr>
@@ -1946,22 +1924,10 @@
             <p:ph type="ftr" sz="quarter" idx="4"/>
           </p:nvPr>
         </p:nvSpPr>
-        <p:spPr>
-          <a:xfrm>
-            <a:off x="-1" y="8847000"/>
-            <a:ext cx="6488999" cy="297000"/>
-          </a:xfrm>
-          <a:prstGeom prst="rect">
-            <a:avLst/>
-          </a:prstGeom>
-        </p:spPr>
+        <p:spPr/>
         <p:txBody>
-          <a:bodyPr vert="horz" lIns="91440" tIns="45720" rIns="91440" bIns="45720" rtlCol="0" anchor="b"/>
-          <a:lstStyle>
-            <a:lvl1pPr algn="l">
-              <a:defRPr sz="1100"/>
-            </a:lvl1pPr>
-          </a:lstStyle>
+          <a:bodyPr/>
+          <a:lstStyle/>
           <a:p>
             <a:r>
               <a:rPr lang="en-US" dirty="0"/>
@@ -1983,7 +1949,7 @@
     </p:spTree>
     <p:extLst>
       <p:ext uri="{BB962C8B-B14F-4D97-AF65-F5344CB8AC3E}">
-        <p14:creationId xmlns:p14="http://schemas.microsoft.com/office/powerpoint/2010/main" val="236169634"/>
+        <p14:creationId xmlns:p14="http://schemas.microsoft.com/office/powerpoint/2010/main" val="515944749"/>
       </p:ext>
     </p:extLst>
   </p:cSld>
@@ -2037,18 +2003,18 @@
           <a:bodyPr/>
           <a:lstStyle/>
           <a:p>
-            <a:endParaRPr lang="bg-BG" dirty="0"/>
+            <a:endParaRPr lang="en-GB" dirty="0"/>
           </a:p>
         </p:txBody>
       </p:sp>
       <p:sp>
         <p:nvSpPr>
-          <p:cNvPr id="4" name="Slide Number Placeholder 3"/>
+          <p:cNvPr id="5" name="Slide Number Placeholder 4"/>
           <p:cNvSpPr>
             <a:spLocks noGrp="1"/>
           </p:cNvSpPr>
           <p:nvPr>
-            <p:ph type="sldNum" sz="quarter" idx="10"/>
+            <p:ph type="sldNum" sz="quarter" idx="11"/>
           </p:nvPr>
         </p:nvSpPr>
         <p:spPr/>
@@ -2056,9 +2022,10 @@
           <a:bodyPr/>
           <a:lstStyle/>
           <a:p>
-            <a:fld id="{2BF067CD-8E6B-4360-9AA8-C5DF2A48A6D1}" type="slidenum">
+            <a:fld id="{3EBA5BD7-F043-4D1B-AA17-CD412FC534DE}" type="slidenum">
               <a:rPr lang="en-US" smtClean="0"/>
-              <a:t>30</a:t>
+              <a:pPr/>
+              <a:t>29</a:t>
             </a:fld>
             <a:endParaRPr lang="en-US" dirty="0"/>
           </a:p>
@@ -2066,10 +2033,10 @@
       </p:sp>
       <p:sp>
         <p:nvSpPr>
-          <p:cNvPr id="7" name="Footer Placeholder 7">
+          <p:cNvPr id="6" name="Footer Placeholder 7">
             <a:extLst>
               <a:ext uri="{FF2B5EF4-FFF2-40B4-BE49-F238E27FC236}">
-                <a16:creationId xmlns:a16="http://schemas.microsoft.com/office/drawing/2014/main" id="{DBB02913-2456-4263-9670-8F6A8CDDC63E}"/>
+                <a16:creationId xmlns:a16="http://schemas.microsoft.com/office/drawing/2014/main" id="{4D5C8C0D-B3F7-4463-9A8E-1EC6F4962F2C}"/>
               </a:ext>
             </a:extLst>
           </p:cNvPr>
@@ -2117,7 +2084,7 @@
     </p:spTree>
     <p:extLst>
       <p:ext uri="{BB962C8B-B14F-4D97-AF65-F5344CB8AC3E}">
-        <p14:creationId xmlns:p14="http://schemas.microsoft.com/office/powerpoint/2010/main" val="23806579"/>
+        <p14:creationId xmlns:p14="http://schemas.microsoft.com/office/powerpoint/2010/main" val="852383263"/>
       </p:ext>
     </p:extLst>
   </p:cSld>
@@ -2171,7 +2138,7 @@
           <a:bodyPr/>
           <a:lstStyle/>
           <a:p>
-            <a:endParaRPr lang="en-US" dirty="0"/>
+            <a:endParaRPr lang="en-GB" dirty="0"/>
           </a:p>
         </p:txBody>
       </p:sp>
@@ -2193,7 +2160,7 @@
             <a:fld id="{3EBA5BD7-F043-4D1B-AA17-CD412FC534DE}" type="slidenum">
               <a:rPr lang="en-US" smtClean="0"/>
               <a:pPr/>
-              <a:t>33</a:t>
+              <a:t>30</a:t>
             </a:fld>
             <a:endParaRPr lang="en-US" dirty="0"/>
           </a:p>
@@ -2204,7 +2171,7 @@
           <p:cNvPr id="6" name="Footer Placeholder 7">
             <a:extLst>
               <a:ext uri="{FF2B5EF4-FFF2-40B4-BE49-F238E27FC236}">
-                <a16:creationId xmlns:a16="http://schemas.microsoft.com/office/drawing/2014/main" id="{BC506739-5DCA-4827-ABDF-8FCD90A02B02}"/>
+                <a16:creationId xmlns:a16="http://schemas.microsoft.com/office/drawing/2014/main" id="{47A39B85-E5D9-4A4E-81E6-254839195C9F}"/>
               </a:ext>
             </a:extLst>
           </p:cNvPr>
@@ -2252,7 +2219,7 @@
     </p:spTree>
     <p:extLst>
       <p:ext uri="{BB962C8B-B14F-4D97-AF65-F5344CB8AC3E}">
-        <p14:creationId xmlns:p14="http://schemas.microsoft.com/office/powerpoint/2010/main" val="1539019058"/>
+        <p14:creationId xmlns:p14="http://schemas.microsoft.com/office/powerpoint/2010/main" val="236169634"/>
       </p:ext>
     </p:extLst>
   </p:cSld>
@@ -2429,6 +2396,275 @@
 </file>
 
 <file path=ppt/notesSlides/notesSlide20.xml><?xml version="1.0" encoding="utf-8"?>
+<p:notes xmlns:a="http://schemas.openxmlformats.org/drawingml/2006/main" xmlns:r="http://schemas.openxmlformats.org/officeDocument/2006/relationships" xmlns:p="http://schemas.openxmlformats.org/presentationml/2006/main">
+  <p:cSld>
+    <p:spTree>
+      <p:nvGrpSpPr>
+        <p:cNvPr id="1" name=""/>
+        <p:cNvGrpSpPr/>
+        <p:nvPr/>
+      </p:nvGrpSpPr>
+      <p:grpSpPr>
+        <a:xfrm>
+          <a:off x="0" y="0"/>
+          <a:ext cx="0" cy="0"/>
+          <a:chOff x="0" y="0"/>
+          <a:chExt cx="0" cy="0"/>
+        </a:xfrm>
+      </p:grpSpPr>
+      <p:sp>
+        <p:nvSpPr>
+          <p:cNvPr id="2" name="Slide Image Placeholder 1"/>
+          <p:cNvSpPr>
+            <a:spLocks noGrp="1" noRot="1" noChangeAspect="1"/>
+          </p:cNvSpPr>
+          <p:nvPr>
+            <p:ph type="sldImg"/>
+          </p:nvPr>
+        </p:nvSpPr>
+        <p:spPr/>
+      </p:sp>
+      <p:sp>
+        <p:nvSpPr>
+          <p:cNvPr id="3" name="Notes Placeholder 2"/>
+          <p:cNvSpPr>
+            <a:spLocks noGrp="1"/>
+          </p:cNvSpPr>
+          <p:nvPr>
+            <p:ph type="body" idx="1"/>
+          </p:nvPr>
+        </p:nvSpPr>
+        <p:spPr/>
+        <p:txBody>
+          <a:bodyPr/>
+          <a:lstStyle/>
+          <a:p>
+            <a:endParaRPr lang="bg-BG" dirty="0"/>
+          </a:p>
+        </p:txBody>
+      </p:sp>
+      <p:sp>
+        <p:nvSpPr>
+          <p:cNvPr id="4" name="Slide Number Placeholder 3"/>
+          <p:cNvSpPr>
+            <a:spLocks noGrp="1"/>
+          </p:cNvSpPr>
+          <p:nvPr>
+            <p:ph type="sldNum" sz="quarter" idx="10"/>
+          </p:nvPr>
+        </p:nvSpPr>
+        <p:spPr/>
+        <p:txBody>
+          <a:bodyPr/>
+          <a:lstStyle/>
+          <a:p>
+            <a:fld id="{2BF067CD-8E6B-4360-9AA8-C5DF2A48A6D1}" type="slidenum">
+              <a:rPr lang="en-US" smtClean="0"/>
+              <a:t>31</a:t>
+            </a:fld>
+            <a:endParaRPr lang="en-US" dirty="0"/>
+          </a:p>
+        </p:txBody>
+      </p:sp>
+      <p:sp>
+        <p:nvSpPr>
+          <p:cNvPr id="7" name="Footer Placeholder 7">
+            <a:extLst>
+              <a:ext uri="{FF2B5EF4-FFF2-40B4-BE49-F238E27FC236}">
+                <a16:creationId xmlns:a16="http://schemas.microsoft.com/office/drawing/2014/main" id="{DBB02913-2456-4263-9670-8F6A8CDDC63E}"/>
+              </a:ext>
+            </a:extLst>
+          </p:cNvPr>
+          <p:cNvSpPr>
+            <a:spLocks noGrp="1"/>
+          </p:cNvSpPr>
+          <p:nvPr>
+            <p:ph type="ftr" sz="quarter" idx="4"/>
+          </p:nvPr>
+        </p:nvSpPr>
+        <p:spPr>
+          <a:xfrm>
+            <a:off x="-1" y="8847000"/>
+            <a:ext cx="6488999" cy="297000"/>
+          </a:xfrm>
+          <a:prstGeom prst="rect">
+            <a:avLst/>
+          </a:prstGeom>
+        </p:spPr>
+        <p:txBody>
+          <a:bodyPr vert="horz" lIns="91440" tIns="45720" rIns="91440" bIns="45720" rtlCol="0" anchor="b"/>
+          <a:lstStyle>
+            <a:lvl1pPr algn="l">
+              <a:defRPr sz="1100"/>
+            </a:lvl1pPr>
+          </a:lstStyle>
+          <a:p>
+            <a:r>
+              <a:rPr lang="en-US" dirty="0"/>
+              <a:t>© SoftUni – </a:t>
+            </a:r>
+            <a:r>
+              <a:rPr lang="en-US" u="sng" dirty="0">
+                <a:hlinkClick r:id="rId3"/>
+              </a:rPr>
+              <a:t>https://softuni.org</a:t>
+            </a:r>
+            <a:r>
+              <a:rPr lang="en-US" dirty="0"/>
+              <a:t>. Copyrighted document. Unauthorized copy or reproduction is not permitted.</a:t>
+            </a:r>
+          </a:p>
+        </p:txBody>
+      </p:sp>
+    </p:spTree>
+    <p:extLst>
+      <p:ext uri="{BB962C8B-B14F-4D97-AF65-F5344CB8AC3E}">
+        <p14:creationId xmlns:p14="http://schemas.microsoft.com/office/powerpoint/2010/main" val="23806579"/>
+      </p:ext>
+    </p:extLst>
+  </p:cSld>
+  <p:clrMapOvr>
+    <a:masterClrMapping/>
+  </p:clrMapOvr>
+</p:notes>
+</file>
+
+<file path=ppt/notesSlides/notesSlide21.xml><?xml version="1.0" encoding="utf-8"?>
+<p:notes xmlns:a="http://schemas.openxmlformats.org/drawingml/2006/main" xmlns:r="http://schemas.openxmlformats.org/officeDocument/2006/relationships" xmlns:p="http://schemas.openxmlformats.org/presentationml/2006/main">
+  <p:cSld>
+    <p:spTree>
+      <p:nvGrpSpPr>
+        <p:cNvPr id="1" name=""/>
+        <p:cNvGrpSpPr/>
+        <p:nvPr/>
+      </p:nvGrpSpPr>
+      <p:grpSpPr>
+        <a:xfrm>
+          <a:off x="0" y="0"/>
+          <a:ext cx="0" cy="0"/>
+          <a:chOff x="0" y="0"/>
+          <a:chExt cx="0" cy="0"/>
+        </a:xfrm>
+      </p:grpSpPr>
+      <p:sp>
+        <p:nvSpPr>
+          <p:cNvPr id="2" name="Slide Image Placeholder 1"/>
+          <p:cNvSpPr>
+            <a:spLocks noGrp="1" noRot="1" noChangeAspect="1"/>
+          </p:cNvSpPr>
+          <p:nvPr>
+            <p:ph type="sldImg"/>
+          </p:nvPr>
+        </p:nvSpPr>
+        <p:spPr/>
+      </p:sp>
+      <p:sp>
+        <p:nvSpPr>
+          <p:cNvPr id="3" name="Notes Placeholder 2"/>
+          <p:cNvSpPr>
+            <a:spLocks noGrp="1"/>
+          </p:cNvSpPr>
+          <p:nvPr>
+            <p:ph type="body" idx="1"/>
+          </p:nvPr>
+        </p:nvSpPr>
+        <p:spPr/>
+        <p:txBody>
+          <a:bodyPr/>
+          <a:lstStyle/>
+          <a:p>
+            <a:endParaRPr lang="en-US" dirty="0"/>
+          </a:p>
+        </p:txBody>
+      </p:sp>
+      <p:sp>
+        <p:nvSpPr>
+          <p:cNvPr id="5" name="Slide Number Placeholder 4"/>
+          <p:cNvSpPr>
+            <a:spLocks noGrp="1"/>
+          </p:cNvSpPr>
+          <p:nvPr>
+            <p:ph type="sldNum" sz="quarter" idx="11"/>
+          </p:nvPr>
+        </p:nvSpPr>
+        <p:spPr/>
+        <p:txBody>
+          <a:bodyPr/>
+          <a:lstStyle/>
+          <a:p>
+            <a:fld id="{3EBA5BD7-F043-4D1B-AA17-CD412FC534DE}" type="slidenum">
+              <a:rPr lang="en-US" smtClean="0"/>
+              <a:pPr/>
+              <a:t>34</a:t>
+            </a:fld>
+            <a:endParaRPr lang="en-US" dirty="0"/>
+          </a:p>
+        </p:txBody>
+      </p:sp>
+      <p:sp>
+        <p:nvSpPr>
+          <p:cNvPr id="6" name="Footer Placeholder 7">
+            <a:extLst>
+              <a:ext uri="{FF2B5EF4-FFF2-40B4-BE49-F238E27FC236}">
+                <a16:creationId xmlns:a16="http://schemas.microsoft.com/office/drawing/2014/main" id="{BC506739-5DCA-4827-ABDF-8FCD90A02B02}"/>
+              </a:ext>
+            </a:extLst>
+          </p:cNvPr>
+          <p:cNvSpPr>
+            <a:spLocks noGrp="1"/>
+          </p:cNvSpPr>
+          <p:nvPr>
+            <p:ph type="ftr" sz="quarter" idx="4"/>
+          </p:nvPr>
+        </p:nvSpPr>
+        <p:spPr>
+          <a:xfrm>
+            <a:off x="-1" y="8847000"/>
+            <a:ext cx="6488999" cy="297000"/>
+          </a:xfrm>
+          <a:prstGeom prst="rect">
+            <a:avLst/>
+          </a:prstGeom>
+        </p:spPr>
+        <p:txBody>
+          <a:bodyPr vert="horz" lIns="91440" tIns="45720" rIns="91440" bIns="45720" rtlCol="0" anchor="b"/>
+          <a:lstStyle>
+            <a:lvl1pPr algn="l">
+              <a:defRPr sz="1100"/>
+            </a:lvl1pPr>
+          </a:lstStyle>
+          <a:p>
+            <a:r>
+              <a:rPr lang="en-US" dirty="0"/>
+              <a:t>© SoftUni – </a:t>
+            </a:r>
+            <a:r>
+              <a:rPr lang="en-US" u="sng" dirty="0">
+                <a:hlinkClick r:id="rId3"/>
+              </a:rPr>
+              <a:t>https://softuni.org</a:t>
+            </a:r>
+            <a:r>
+              <a:rPr lang="en-US" dirty="0"/>
+              <a:t>. Copyrighted document. Unauthorized copy or reproduction is not permitted.</a:t>
+            </a:r>
+          </a:p>
+        </p:txBody>
+      </p:sp>
+    </p:spTree>
+    <p:extLst>
+      <p:ext uri="{BB962C8B-B14F-4D97-AF65-F5344CB8AC3E}">
+        <p14:creationId xmlns:p14="http://schemas.microsoft.com/office/powerpoint/2010/main" val="1539019058"/>
+      </p:ext>
+    </p:extLst>
+  </p:cSld>
+  <p:clrMapOvr>
+    <a:masterClrMapping/>
+  </p:clrMapOvr>
+</p:notes>
+</file>
+
+<file path=ppt/notesSlides/notesSlide22.xml><?xml version="1.0" encoding="utf-8"?>
 <p:notes xmlns:a="http://schemas.openxmlformats.org/drawingml/2006/main" xmlns:r="http://schemas.openxmlformats.org/officeDocument/2006/relationships" xmlns:p="http://schemas.openxmlformats.org/presentationml/2006/main">
   <p:cSld>
     <p:spTree>
@@ -2600,7 +2836,7 @@
             <a:fld id="{3EBA5BD7-F043-4D1B-AA17-CD412FC534DE}" type="slidenum">
               <a:rPr lang="en-US" smtClean="0"/>
               <a:pPr/>
-              <a:t>34</a:t>
+              <a:t>35</a:t>
             </a:fld>
             <a:endParaRPr lang="en-US" dirty="0"/>
           </a:p>
@@ -2669,7 +2905,7 @@
 </p:notes>
 </file>
 
-<file path=ppt/notesSlides/notesSlide21.xml><?xml version="1.0" encoding="utf-8"?>
+<file path=ppt/notesSlides/notesSlide23.xml><?xml version="1.0" encoding="utf-8"?>
 <p:notes xmlns:a="http://schemas.openxmlformats.org/drawingml/2006/main" xmlns:r="http://schemas.openxmlformats.org/officeDocument/2006/relationships" xmlns:p="http://schemas.openxmlformats.org/presentationml/2006/main">
   <p:cSld>
     <p:spTree>
@@ -2841,7 +3077,7 @@
             <a:fld id="{3EBA5BD7-F043-4D1B-AA17-CD412FC534DE}" type="slidenum">
               <a:rPr lang="en-US" smtClean="0"/>
               <a:pPr/>
-              <a:t>35</a:t>
+              <a:t>36</a:t>
             </a:fld>
             <a:endParaRPr lang="en-US" dirty="0"/>
           </a:p>
@@ -11237,104 +11473,72 @@
         </p:nvSpPr>
         <p:spPr/>
         <p:txBody>
-          <a:bodyPr/>
+          <a:bodyPr>
+            <a:normAutofit/>
+          </a:bodyPr>
           <a:lstStyle/>
           <a:p>
-            <a:r>
-              <a:rPr lang="bg-BG" dirty="0">
-                <a:highlight>
-                  <a:srgbClr val="FFFF00"/>
-                </a:highlight>
-              </a:rPr>
-              <a:t>Превръщане на обект в </a:t>
-            </a:r>
-            <a:r>
-              <a:rPr lang="en-US" dirty="0">
-                <a:highlight>
-                  <a:srgbClr val="FFFF00"/>
-                </a:highlight>
-              </a:rPr>
-              <a:t>string (</a:t>
-            </a:r>
-            <a:r>
-              <a:rPr lang="bg-BG" b="1" dirty="0" err="1">
-                <a:highlight>
-                  <a:srgbClr val="FFFF00"/>
-                </a:highlight>
-              </a:rPr>
+            <a:pPr algn="just"/>
+            <a:r>
+              <a:rPr lang="bg-BG" sz="2800" dirty="0"/>
+              <a:t>За да визуализираме данните от класа, трябва да превърнем обекта в </a:t>
+            </a:r>
+            <a:r>
+              <a:rPr lang="en-US" sz="2800" b="1" dirty="0">
+                <a:latin typeface="Consolas" panose="020B0609020204030204" pitchFamily="49" charset="0"/>
+                <a:cs typeface="Consolas" panose="020B0609020204030204" pitchFamily="49" charset="0"/>
+              </a:rPr>
+              <a:t>string</a:t>
+            </a:r>
+            <a:r>
+              <a:rPr lang="en-US" sz="2800" dirty="0"/>
+              <a:t> (</a:t>
+            </a:r>
+            <a:r>
+              <a:rPr lang="bg-BG" sz="2800" b="1" dirty="0" err="1"/>
               <a:t>стрингосване</a:t>
             </a:r>
             <a:r>
-              <a:rPr lang="bg-BG" dirty="0">
-                <a:highlight>
-                  <a:srgbClr val="FFFF00"/>
-                </a:highlight>
-              </a:rPr>
+              <a:rPr lang="bg-BG" sz="2800" dirty="0"/>
               <a:t>)</a:t>
             </a:r>
           </a:p>
           <a:p>
-            <a:pPr lvl="1"/>
-            <a:r>
-              <a:rPr lang="bg-BG" dirty="0">
-                <a:highlight>
-                  <a:srgbClr val="FFFF00"/>
-                </a:highlight>
-              </a:rPr>
-              <a:t> Пренаписва се методът </a:t>
-            </a:r>
-            <a:r>
-              <a:rPr lang="en-US" dirty="0" err="1">
-                <a:highlight>
-                  <a:srgbClr val="FFFF00"/>
-                </a:highlight>
+            <a:pPr lvl="1" algn="just"/>
+            <a:r>
+              <a:rPr lang="bg-BG" sz="2800" dirty="0"/>
+              <a:t> За тази цел пренаписваме метода </a:t>
+            </a:r>
+            <a:r>
+              <a:rPr lang="en-US" sz="2800" b="1" dirty="0" err="1">
+                <a:solidFill>
+                  <a:schemeClr val="bg1"/>
+                </a:solidFill>
+                <a:latin typeface="Consolas" panose="020B0609020204030204" pitchFamily="49" charset="0"/>
+                <a:cs typeface="Consolas" panose="020B0609020204030204" pitchFamily="49" charset="0"/>
               </a:rPr>
               <a:t>ToString</a:t>
             </a:r>
             <a:r>
-              <a:rPr lang="en-US" dirty="0">
-                <a:highlight>
-                  <a:srgbClr val="FFFF00"/>
-                </a:highlight>
+              <a:rPr lang="en-US" sz="2800" b="1" dirty="0">
+                <a:solidFill>
+                  <a:schemeClr val="bg1"/>
+                </a:solidFill>
+                <a:latin typeface="Consolas" panose="020B0609020204030204" pitchFamily="49" charset="0"/>
+                <a:cs typeface="Consolas" panose="020B0609020204030204" pitchFamily="49" charset="0"/>
               </a:rPr>
               <a:t>()</a:t>
             </a:r>
             <a:r>
-              <a:rPr lang="bg-BG" dirty="0">
-                <a:highlight>
-                  <a:srgbClr val="FFFF00"/>
-                </a:highlight>
-              </a:rPr>
+              <a:rPr lang="bg-BG" sz="2800" dirty="0"/>
               <a:t>:</a:t>
             </a:r>
           </a:p>
           <a:p>
-            <a:pPr lvl="1"/>
-            <a:endParaRPr lang="bg-BG" dirty="0">
-              <a:highlight>
-                <a:srgbClr val="FFFF00"/>
-              </a:highlight>
-            </a:endParaRPr>
-          </a:p>
-          <a:p>
-            <a:pPr lvl="1"/>
-            <a:endParaRPr lang="bg-BG" dirty="0">
-              <a:highlight>
-                <a:srgbClr val="FFFF00"/>
-              </a:highlight>
-            </a:endParaRPr>
-          </a:p>
-          <a:p>
-            <a:pPr lvl="1"/>
-            <a:r>
-              <a:rPr lang="bg-BG" dirty="0">
-                <a:highlight>
-                  <a:srgbClr val="FFFF00"/>
-                </a:highlight>
-              </a:rPr>
-              <a:t>ПРИМЕР</a:t>
-            </a:r>
-            <a:endParaRPr lang="en-US" dirty="0">
+            <a:pPr marL="442912" lvl="1" indent="0" algn="just">
+              <a:buNone/>
+            </a:pPr>
+            <a:endParaRPr lang="bg-BG" sz="2800" dirty="0">
               <a:highlight>
                 <a:srgbClr val="FFFF00"/>
               </a:highlight>
@@ -11378,6 +11582,227 @@
           </a:p>
         </p:txBody>
       </p:sp>
+      <p:sp>
+        <p:nvSpPr>
+          <p:cNvPr id="6" name="Text Placeholder 5">
+            <a:extLst>
+              <a:ext uri="{FF2B5EF4-FFF2-40B4-BE49-F238E27FC236}">
+                <a16:creationId xmlns:a16="http://schemas.microsoft.com/office/drawing/2014/main" id="{73430C57-7833-CAA0-78A4-D5FA27601727}"/>
+              </a:ext>
+            </a:extLst>
+          </p:cNvPr>
+          <p:cNvSpPr txBox="1">
+            <a:spLocks/>
+          </p:cNvSpPr>
+          <p:nvPr/>
+        </p:nvSpPr>
+        <p:spPr>
+          <a:xfrm>
+            <a:off x="1033608" y="2851592"/>
+            <a:ext cx="10124784" cy="3952408"/>
+          </a:xfrm>
+          <a:prstGeom prst="rect">
+            <a:avLst/>
+          </a:prstGeom>
+          <a:solidFill>
+            <a:schemeClr val="accent6">
+              <a:lumMod val="75000"/>
+              <a:alpha val="15000"/>
+            </a:schemeClr>
+          </a:solidFill>
+          <a:ln w="12700">
+            <a:solidFill>
+              <a:schemeClr val="tx1">
+                <a:lumMod val="50000"/>
+              </a:schemeClr>
+            </a:solidFill>
+          </a:ln>
+        </p:spPr>
+        <p:txBody>
+          <a:bodyPr vert="horz" wrap="square" lIns="143963" tIns="107972" rIns="143963" bIns="107972" rtlCol="0">
+            <a:spAutoFit/>
+          </a:bodyPr>
+          <a:lstStyle>
+            <a:defPPr>
+              <a:defRPr lang="en-US"/>
+            </a:defPPr>
+            <a:lvl1pPr defTabSz="1218438" latinLnBrk="1">
+              <a:spcBef>
+                <a:spcPts val="600"/>
+              </a:spcBef>
+              <a:spcAft>
+                <a:spcPts val="600"/>
+              </a:spcAft>
+              <a:buFont typeface="Wingdings" panose="05000000000000000000" pitchFamily="2" charset="2"/>
+              <a:buNone/>
+              <a:defRPr sz="2397" b="1">
+                <a:latin typeface="Consolas" pitchFamily="49" charset="0"/>
+                <a:cs typeface="Consolas" pitchFamily="49" charset="0"/>
+              </a:defRPr>
+            </a:lvl1pPr>
+          </a:lstStyle>
+          <a:p>
+            <a:pPr>
+              <a:spcBef>
+                <a:spcPts val="200"/>
+              </a:spcBef>
+              <a:spcAft>
+                <a:spcPts val="200"/>
+              </a:spcAft>
+            </a:pPr>
+            <a:r>
+              <a:rPr lang="en-GB" sz="2400" dirty="0"/>
+              <a:t>public class </a:t>
+            </a:r>
+            <a:r>
+              <a:rPr lang="en-GB" sz="2400" dirty="0">
+                <a:solidFill>
+                  <a:schemeClr val="bg1"/>
+                </a:solidFill>
+              </a:rPr>
+              <a:t>Student</a:t>
+            </a:r>
+            <a:r>
+              <a:rPr lang="en-GB" sz="2400" dirty="0"/>
+              <a:t> </a:t>
+            </a:r>
+          </a:p>
+          <a:p>
+            <a:pPr>
+              <a:spcBef>
+                <a:spcPts val="200"/>
+              </a:spcBef>
+              <a:spcAft>
+                <a:spcPts val="200"/>
+              </a:spcAft>
+            </a:pPr>
+            <a:r>
+              <a:rPr lang="en-GB" sz="2400" dirty="0"/>
+              <a:t>{</a:t>
+            </a:r>
+          </a:p>
+          <a:p>
+            <a:pPr>
+              <a:spcBef>
+                <a:spcPts val="200"/>
+              </a:spcBef>
+              <a:spcAft>
+                <a:spcPts val="200"/>
+              </a:spcAft>
+            </a:pPr>
+            <a:r>
+              <a:rPr lang="en-US" sz="2400" dirty="0"/>
+              <a:t>  public string FirstName { get; private set; }</a:t>
+            </a:r>
+          </a:p>
+          <a:p>
+            <a:pPr>
+              <a:spcBef>
+                <a:spcPts val="200"/>
+              </a:spcBef>
+              <a:spcAft>
+                <a:spcPts val="200"/>
+              </a:spcAft>
+            </a:pPr>
+            <a:r>
+              <a:rPr lang="en-US" sz="2400" dirty="0"/>
+              <a:t>  public string LastName { get; private set; }</a:t>
+            </a:r>
+          </a:p>
+          <a:p>
+            <a:pPr>
+              <a:spcBef>
+                <a:spcPts val="200"/>
+              </a:spcBef>
+              <a:spcAft>
+                <a:spcPts val="200"/>
+              </a:spcAft>
+            </a:pPr>
+            <a:r>
+              <a:rPr lang="en-GB" sz="2400" dirty="0"/>
+              <a:t>  public override string ToString() </a:t>
+            </a:r>
+            <a:endParaRPr lang="bg-BG" sz="2400" dirty="0"/>
+          </a:p>
+          <a:p>
+            <a:pPr>
+              <a:spcBef>
+                <a:spcPts val="200"/>
+              </a:spcBef>
+              <a:spcAft>
+                <a:spcPts val="200"/>
+              </a:spcAft>
+            </a:pPr>
+            <a:r>
+              <a:rPr lang="bg-BG" sz="2400" dirty="0"/>
+              <a:t>  </a:t>
+            </a:r>
+            <a:r>
+              <a:rPr lang="en-GB" sz="2400" dirty="0"/>
+              <a:t>{</a:t>
+            </a:r>
+          </a:p>
+          <a:p>
+            <a:pPr>
+              <a:spcBef>
+                <a:spcPts val="200"/>
+              </a:spcBef>
+              <a:spcAft>
+                <a:spcPts val="200"/>
+              </a:spcAft>
+            </a:pPr>
+            <a:r>
+              <a:rPr lang="en-GB" sz="2400" dirty="0"/>
+              <a:t>    return $"The student’s name is</a:t>
+            </a:r>
+            <a:r>
+              <a:rPr lang="en-US" sz="2400" dirty="0"/>
+              <a:t>{FirstName} {</a:t>
+            </a:r>
+            <a:r>
+              <a:rPr lang="en-US" sz="2400" dirty="0" err="1"/>
+              <a:t>LastName</a:t>
+            </a:r>
+            <a:r>
+              <a:rPr lang="en-US" sz="2400" dirty="0"/>
+              <a:t>}.</a:t>
+            </a:r>
+            <a:r>
+              <a:rPr lang="en-GB" sz="2400" dirty="0"/>
+              <a:t>"</a:t>
+            </a:r>
+          </a:p>
+          <a:p>
+            <a:pPr>
+              <a:spcBef>
+                <a:spcPts val="200"/>
+              </a:spcBef>
+              <a:spcAft>
+                <a:spcPts val="200"/>
+              </a:spcAft>
+            </a:pPr>
+            <a:r>
+              <a:rPr lang="en-GB" sz="2400" dirty="0"/>
+              <a:t>  }</a:t>
+            </a:r>
+          </a:p>
+          <a:p>
+            <a:pPr>
+              <a:spcBef>
+                <a:spcPts val="200"/>
+              </a:spcBef>
+              <a:spcAft>
+                <a:spcPts val="200"/>
+              </a:spcAft>
+            </a:pPr>
+            <a:r>
+              <a:rPr lang="en-GB" sz="2400" dirty="0"/>
+              <a:t>}</a:t>
+            </a:r>
+            <a:endParaRPr lang="en-US" sz="2400" dirty="0"/>
+          </a:p>
+        </p:txBody>
+      </p:sp>
     </p:spTree>
     <p:extLst>
       <p:ext uri="{BB962C8B-B14F-4D97-AF65-F5344CB8AC3E}">
@@ -11396,6 +11821,294 @@
       <p:transition spd="slow" advClick="0" advTm="5000"/>
     </mc:Fallback>
   </mc:AlternateContent>
+  <p:timing>
+    <p:tnLst>
+      <p:par>
+        <p:cTn id="1" dur="indefinite" restart="never" nodeType="tmRoot">
+          <p:childTnLst>
+            <p:seq concurrent="1" nextAc="seek">
+              <p:cTn id="2" dur="indefinite" nodeType="mainSeq">
+                <p:childTnLst>
+                  <p:par>
+                    <p:cTn id="3" fill="hold">
+                      <p:stCondLst>
+                        <p:cond delay="indefinite"/>
+                      </p:stCondLst>
+                      <p:childTnLst>
+                        <p:par>
+                          <p:cTn id="4" fill="hold">
+                            <p:stCondLst>
+                              <p:cond delay="0"/>
+                            </p:stCondLst>
+                            <p:childTnLst>
+                              <p:par>
+                                <p:cTn id="5" presetID="1" presetClass="entr" presetSubtype="0" fill="hold" nodeType="clickEffect">
+                                  <p:stCondLst>
+                                    <p:cond delay="0"/>
+                                  </p:stCondLst>
+                                  <p:childTnLst>
+                                    <p:set>
+                                      <p:cBhvr>
+                                        <p:cTn id="6" dur="1" fill="hold">
+                                          <p:stCondLst>
+                                            <p:cond delay="0"/>
+                                          </p:stCondLst>
+                                        </p:cTn>
+                                        <p:tgtEl>
+                                          <p:spTgt spid="6">
+                                            <p:txEl>
+                                              <p:pRg st="2" end="2"/>
+                                            </p:txEl>
+                                          </p:spTgt>
+                                        </p:tgtEl>
+                                        <p:attrNameLst>
+                                          <p:attrName>style.visibility</p:attrName>
+                                        </p:attrNameLst>
+                                      </p:cBhvr>
+                                      <p:to>
+                                        <p:strVal val="visible"/>
+                                      </p:to>
+                                    </p:set>
+                                  </p:childTnLst>
+                                </p:cTn>
+                              </p:par>
+                            </p:childTnLst>
+                          </p:cTn>
+                        </p:par>
+                      </p:childTnLst>
+                    </p:cTn>
+                  </p:par>
+                  <p:par>
+                    <p:cTn id="7" fill="hold">
+                      <p:stCondLst>
+                        <p:cond delay="indefinite"/>
+                      </p:stCondLst>
+                      <p:childTnLst>
+                        <p:par>
+                          <p:cTn id="8" fill="hold">
+                            <p:stCondLst>
+                              <p:cond delay="0"/>
+                            </p:stCondLst>
+                            <p:childTnLst>
+                              <p:par>
+                                <p:cTn id="9" presetID="1" presetClass="entr" presetSubtype="0" fill="hold" nodeType="clickEffect">
+                                  <p:stCondLst>
+                                    <p:cond delay="0"/>
+                                  </p:stCondLst>
+                                  <p:childTnLst>
+                                    <p:set>
+                                      <p:cBhvr>
+                                        <p:cTn id="10" dur="1" fill="hold">
+                                          <p:stCondLst>
+                                            <p:cond delay="0"/>
+                                          </p:stCondLst>
+                                        </p:cTn>
+                                        <p:tgtEl>
+                                          <p:spTgt spid="6">
+                                            <p:txEl>
+                                              <p:pRg st="3" end="3"/>
+                                            </p:txEl>
+                                          </p:spTgt>
+                                        </p:tgtEl>
+                                        <p:attrNameLst>
+                                          <p:attrName>style.visibility</p:attrName>
+                                        </p:attrNameLst>
+                                      </p:cBhvr>
+                                      <p:to>
+                                        <p:strVal val="visible"/>
+                                      </p:to>
+                                    </p:set>
+                                  </p:childTnLst>
+                                </p:cTn>
+                              </p:par>
+                            </p:childTnLst>
+                          </p:cTn>
+                        </p:par>
+                      </p:childTnLst>
+                    </p:cTn>
+                  </p:par>
+                  <p:par>
+                    <p:cTn id="11" fill="hold">
+                      <p:stCondLst>
+                        <p:cond delay="indefinite"/>
+                      </p:stCondLst>
+                      <p:childTnLst>
+                        <p:par>
+                          <p:cTn id="12" fill="hold">
+                            <p:stCondLst>
+                              <p:cond delay="0"/>
+                            </p:stCondLst>
+                            <p:childTnLst>
+                              <p:par>
+                                <p:cTn id="13" presetID="1" presetClass="entr" presetSubtype="0" fill="hold" nodeType="clickEffect">
+                                  <p:stCondLst>
+                                    <p:cond delay="0"/>
+                                  </p:stCondLst>
+                                  <p:childTnLst>
+                                    <p:set>
+                                      <p:cBhvr>
+                                        <p:cTn id="14" dur="1" fill="hold">
+                                          <p:stCondLst>
+                                            <p:cond delay="0"/>
+                                          </p:stCondLst>
+                                        </p:cTn>
+                                        <p:tgtEl>
+                                          <p:spTgt spid="6">
+                                            <p:txEl>
+                                              <p:pRg st="4" end="4"/>
+                                            </p:txEl>
+                                          </p:spTgt>
+                                        </p:tgtEl>
+                                        <p:attrNameLst>
+                                          <p:attrName>style.visibility</p:attrName>
+                                        </p:attrNameLst>
+                                      </p:cBhvr>
+                                      <p:to>
+                                        <p:strVal val="visible"/>
+                                      </p:to>
+                                    </p:set>
+                                  </p:childTnLst>
+                                </p:cTn>
+                              </p:par>
+                            </p:childTnLst>
+                          </p:cTn>
+                        </p:par>
+                      </p:childTnLst>
+                    </p:cTn>
+                  </p:par>
+                  <p:par>
+                    <p:cTn id="15" fill="hold">
+                      <p:stCondLst>
+                        <p:cond delay="indefinite"/>
+                      </p:stCondLst>
+                      <p:childTnLst>
+                        <p:par>
+                          <p:cTn id="16" fill="hold">
+                            <p:stCondLst>
+                              <p:cond delay="0"/>
+                            </p:stCondLst>
+                            <p:childTnLst>
+                              <p:par>
+                                <p:cTn id="17" presetID="1" presetClass="entr" presetSubtype="0" fill="hold" nodeType="clickEffect">
+                                  <p:stCondLst>
+                                    <p:cond delay="0"/>
+                                  </p:stCondLst>
+                                  <p:childTnLst>
+                                    <p:set>
+                                      <p:cBhvr>
+                                        <p:cTn id="18" dur="1" fill="hold">
+                                          <p:stCondLst>
+                                            <p:cond delay="0"/>
+                                          </p:stCondLst>
+                                        </p:cTn>
+                                        <p:tgtEl>
+                                          <p:spTgt spid="6">
+                                            <p:txEl>
+                                              <p:pRg st="5" end="5"/>
+                                            </p:txEl>
+                                          </p:spTgt>
+                                        </p:tgtEl>
+                                        <p:attrNameLst>
+                                          <p:attrName>style.visibility</p:attrName>
+                                        </p:attrNameLst>
+                                      </p:cBhvr>
+                                      <p:to>
+                                        <p:strVal val="visible"/>
+                                      </p:to>
+                                    </p:set>
+                                  </p:childTnLst>
+                                </p:cTn>
+                              </p:par>
+                              <p:par>
+                                <p:cTn id="19" presetID="1" presetClass="entr" presetSubtype="0" fill="hold" nodeType="withEffect">
+                                  <p:stCondLst>
+                                    <p:cond delay="0"/>
+                                  </p:stCondLst>
+                                  <p:childTnLst>
+                                    <p:set>
+                                      <p:cBhvr>
+                                        <p:cTn id="20" dur="1" fill="hold">
+                                          <p:stCondLst>
+                                            <p:cond delay="0"/>
+                                          </p:stCondLst>
+                                        </p:cTn>
+                                        <p:tgtEl>
+                                          <p:spTgt spid="6">
+                                            <p:txEl>
+                                              <p:pRg st="6" end="6"/>
+                                            </p:txEl>
+                                          </p:spTgt>
+                                        </p:tgtEl>
+                                        <p:attrNameLst>
+                                          <p:attrName>style.visibility</p:attrName>
+                                        </p:attrNameLst>
+                                      </p:cBhvr>
+                                      <p:to>
+                                        <p:strVal val="visible"/>
+                                      </p:to>
+                                    </p:set>
+                                  </p:childTnLst>
+                                </p:cTn>
+                              </p:par>
+                              <p:par>
+                                <p:cTn id="21" presetID="1" presetClass="entr" presetSubtype="0" fill="hold" nodeType="withEffect">
+                                  <p:stCondLst>
+                                    <p:cond delay="0"/>
+                                  </p:stCondLst>
+                                  <p:childTnLst>
+                                    <p:set>
+                                      <p:cBhvr>
+                                        <p:cTn id="22" dur="1" fill="hold">
+                                          <p:stCondLst>
+                                            <p:cond delay="0"/>
+                                          </p:stCondLst>
+                                        </p:cTn>
+                                        <p:tgtEl>
+                                          <p:spTgt spid="6">
+                                            <p:txEl>
+                                              <p:pRg st="7" end="7"/>
+                                            </p:txEl>
+                                          </p:spTgt>
+                                        </p:tgtEl>
+                                        <p:attrNameLst>
+                                          <p:attrName>style.visibility</p:attrName>
+                                        </p:attrNameLst>
+                                      </p:cBhvr>
+                                      <p:to>
+                                        <p:strVal val="visible"/>
+                                      </p:to>
+                                    </p:set>
+                                  </p:childTnLst>
+                                </p:cTn>
+                              </p:par>
+                            </p:childTnLst>
+                          </p:cTn>
+                        </p:par>
+                      </p:childTnLst>
+                    </p:cTn>
+                  </p:par>
+                </p:childTnLst>
+              </p:cTn>
+              <p:prevCondLst>
+                <p:cond evt="onPrev" delay="0">
+                  <p:tgtEl>
+                    <p:sldTgt/>
+                  </p:tgtEl>
+                </p:cond>
+              </p:prevCondLst>
+              <p:nextCondLst>
+                <p:cond evt="onNext" delay="0">
+                  <p:tgtEl>
+                    <p:sldTgt/>
+                  </p:tgtEl>
+                </p:cond>
+              </p:nextCondLst>
+            </p:seq>
+          </p:childTnLst>
+        </p:cTn>
+      </p:par>
+    </p:tnLst>
+  </p:timing>
 </p:sld>
 </file>
 
@@ -12152,8 +12865,21 @@
                   <a:schemeClr val="accent2"/>
                 </a:solidFill>
               </a:rPr>
-              <a:t> Add a constructor</a:t>
-            </a:r>
+              <a:t> </a:t>
+            </a:r>
+            <a:r>
+              <a:rPr lang="bg-BG" sz="2600" i="1" dirty="0">
+                <a:solidFill>
+                  <a:schemeClr val="accent2"/>
+                </a:solidFill>
+              </a:rPr>
+              <a:t>Добавете конструктор</a:t>
+            </a:r>
+            <a:endParaRPr lang="en-GB" sz="2600" i="1" dirty="0">
+              <a:solidFill>
+                <a:schemeClr val="accent2"/>
+              </a:solidFill>
+            </a:endParaRPr>
           </a:p>
           <a:p>
             <a:pPr>
@@ -12294,7 +13020,7 @@
         </p:nvSpPr>
         <p:spPr>
           <a:xfrm>
-            <a:off x="760412" y="6315652"/>
+            <a:off x="800100" y="6387918"/>
             <a:ext cx="10591800" cy="369332"/>
           </a:xfrm>
           <a:prstGeom prst="rect">
@@ -12786,7 +13512,7 @@
         </p:nvSpPr>
         <p:spPr>
           <a:xfrm>
-            <a:off x="1110164" y="1359000"/>
+            <a:off x="1110163" y="1359000"/>
             <a:ext cx="9971673" cy="4916775"/>
           </a:xfrm>
           <a:prstGeom prst="rect">
@@ -12927,13 +13653,18 @@
                   <a:schemeClr val="accent2"/>
                 </a:solidFill>
               </a:rPr>
-              <a:t>  // Create variables for constructor parameters</a:t>
-            </a:r>
-            <a:endParaRPr lang="bg-BG" sz="2800" i="1" dirty="0">
-              <a:solidFill>
-                <a:schemeClr val="accent2"/>
-              </a:solidFill>
-            </a:endParaRPr>
+              <a:t>  // </a:t>
+            </a:r>
+            <a:r>
+              <a:rPr lang="bg-BG" sz="2600" i="1" dirty="0">
+                <a:solidFill>
+                  <a:schemeClr val="accent2"/>
+                </a:solidFill>
+                <a:latin typeface="Calibri" panose="020F0502020204030204" pitchFamily="34" charset="0"/>
+                <a:cs typeface="Calibri" panose="020F0502020204030204" pitchFamily="34" charset="0"/>
+              </a:rPr>
+              <a:t>Създайте променливи за параметрите на конструктора</a:t>
+            </a:r>
           </a:p>
           <a:p>
             <a:pPr>
@@ -12953,12 +13684,20 @@
               <a:t>  // </a:t>
             </a:r>
             <a:r>
-              <a:rPr lang="en-US" sz="2800" i="1" dirty="0">
+              <a:rPr lang="bg-BG" sz="2600" i="1" dirty="0">
                 <a:solidFill>
                   <a:schemeClr val="accent2"/>
                 </a:solidFill>
               </a:rPr>
-              <a:t>Initialize a Person</a:t>
+              <a:t>Инициализирайте </a:t>
+            </a:r>
+            <a:r>
+              <a:rPr lang="en-US" sz="2600" i="1" dirty="0">
+                <a:solidFill>
+                  <a:schemeClr val="accent2"/>
+                </a:solidFill>
+              </a:rPr>
+              <a:t>Person</a:t>
             </a:r>
           </a:p>
           <a:p>
@@ -12976,7 +13715,31 @@
                   <a:schemeClr val="accent2"/>
                 </a:solidFill>
               </a:rPr>
-              <a:t>  // Add it to the list</a:t>
+              <a:t>  </a:t>
+            </a:r>
+            <a:r>
+              <a:rPr lang="en-US" sz="2600" i="1" dirty="0">
+                <a:solidFill>
+                  <a:schemeClr val="accent2"/>
+                </a:solidFill>
+              </a:rPr>
+              <a:t>// </a:t>
+            </a:r>
+            <a:r>
+              <a:rPr lang="bg-BG" sz="2600" i="1" dirty="0">
+                <a:solidFill>
+                  <a:schemeClr val="accent2"/>
+                </a:solidFill>
+              </a:rPr>
+              <a:t>Добавете го към </a:t>
+            </a:r>
+            <a:r>
+              <a:rPr lang="en-US" sz="2600" i="1" dirty="0">
+                <a:solidFill>
+                  <a:schemeClr val="accent2"/>
+                </a:solidFill>
+              </a:rPr>
+              <a:t>List</a:t>
             </a:r>
           </a:p>
           <a:p>
@@ -13009,7 +13772,7 @@
         </p:nvSpPr>
         <p:spPr>
           <a:xfrm>
-            <a:off x="760412" y="6315652"/>
+            <a:off x="800100" y="6387918"/>
             <a:ext cx="10591800" cy="369332"/>
           </a:xfrm>
           <a:prstGeom prst="rect">
@@ -13550,7 +14313,7 @@
         </p:nvSpPr>
         <p:spPr>
           <a:xfrm>
-            <a:off x="464332" y="1494846"/>
+            <a:off x="464331" y="2232451"/>
             <a:ext cx="11263337" cy="2834154"/>
           </a:xfrm>
           <a:prstGeom prst="rect">
@@ -13600,8 +14363,21 @@
                   <a:schemeClr val="accent2"/>
                 </a:solidFill>
               </a:rPr>
-              <a:t>//continued from previous slide</a:t>
-            </a:r>
+              <a:t>//</a:t>
+            </a:r>
+            <a:r>
+              <a:rPr lang="bg-BG" sz="2600" i="1" noProof="1">
+                <a:solidFill>
+                  <a:schemeClr val="accent2"/>
+                </a:solidFill>
+              </a:rPr>
+              <a:t> Продължение на предишния слайд</a:t>
+            </a:r>
+            <a:endParaRPr lang="en-US" sz="2600" i="1" noProof="1">
+              <a:solidFill>
+                <a:schemeClr val="accent2"/>
+              </a:solidFill>
+            </a:endParaRPr>
           </a:p>
           <a:p>
             <a:r>
@@ -13871,15 +14647,15 @@
           <a:lstStyle/>
           <a:p>
             <a:r>
-              <a:rPr lang="bg-BG" sz="3200" dirty="0"/>
+              <a:rPr lang="bg-BG" sz="3100" dirty="0"/>
               <a:t>Разширете класа</a:t>
             </a:r>
             <a:r>
-              <a:rPr lang="en-US" sz="3200" dirty="0"/>
+              <a:rPr lang="en-US" sz="3100" dirty="0"/>
               <a:t> </a:t>
             </a:r>
             <a:r>
-              <a:rPr lang="en-US" sz="3200" b="1" dirty="0">
+              <a:rPr lang="en-US" sz="3100" b="1" dirty="0">
                 <a:solidFill>
                   <a:schemeClr val="bg1"/>
                 </a:solidFill>
@@ -13888,19 +14664,19 @@
               <a:t>Person</a:t>
             </a:r>
             <a:r>
-              <a:rPr lang="en-US" sz="3200" dirty="0"/>
+              <a:rPr lang="en-US" sz="3100" dirty="0"/>
               <a:t> </a:t>
             </a:r>
             <a:r>
-              <a:rPr lang="bg-BG" sz="3200" dirty="0"/>
+              <a:rPr lang="bg-BG" sz="3100" dirty="0"/>
               <a:t>със</a:t>
             </a:r>
             <a:r>
-              <a:rPr lang="en-US" sz="3200" dirty="0"/>
+              <a:rPr lang="en-US" sz="3100" dirty="0"/>
               <a:t> </a:t>
             </a:r>
             <a:r>
-              <a:rPr lang="en-US" sz="3200" b="1" dirty="0">
+              <a:rPr lang="en-US" sz="3100" b="1" dirty="0">
                 <a:solidFill>
                   <a:schemeClr val="bg1"/>
                 </a:solidFill>
@@ -13909,7 +14685,7 @@
               <a:t>Salary</a:t>
             </a:r>
             <a:r>
-              <a:rPr lang="bg-BG" sz="3200" b="1" dirty="0">
+              <a:rPr lang="bg-BG" sz="3100" b="1" dirty="0">
                 <a:solidFill>
                   <a:schemeClr val="bg1"/>
                 </a:solidFill>
@@ -13917,7 +14693,7 @@
               </a:rPr>
               <a:t> (заплата)</a:t>
             </a:r>
-            <a:endParaRPr lang="en-US" sz="3200" b="1" dirty="0">
+            <a:endParaRPr lang="en-US" sz="3100" b="1" dirty="0">
               <a:solidFill>
                 <a:schemeClr val="bg1"/>
               </a:solidFill>
@@ -13926,23 +14702,23 @@
           </a:p>
           <a:p>
             <a:r>
-              <a:rPr lang="bg-BG" sz="3200" dirty="0"/>
+              <a:rPr lang="bg-BG" sz="3100" dirty="0"/>
               <a:t>Добавете</a:t>
             </a:r>
             <a:r>
-              <a:rPr lang="en-US" sz="3200" dirty="0"/>
+              <a:rPr lang="en-US" sz="3100" dirty="0"/>
               <a:t> getter </a:t>
             </a:r>
             <a:r>
-              <a:rPr lang="bg-BG" sz="3200" dirty="0"/>
+              <a:rPr lang="bg-BG" sz="3100" dirty="0"/>
               <a:t>за</a:t>
             </a:r>
             <a:r>
-              <a:rPr lang="en-US" sz="3200" dirty="0"/>
+              <a:rPr lang="en-US" sz="3100" dirty="0"/>
               <a:t> </a:t>
             </a:r>
             <a:r>
-              <a:rPr lang="en-US" sz="3200" b="1" dirty="0">
+              <a:rPr lang="en-US" sz="3100" b="1" dirty="0">
                 <a:solidFill>
                   <a:schemeClr val="bg1"/>
                 </a:solidFill>
@@ -13953,15 +14729,15 @@
           </a:p>
           <a:p>
             <a:r>
-              <a:rPr lang="bg-BG" sz="3200" dirty="0"/>
+              <a:rPr lang="bg-BG" sz="3100" dirty="0"/>
               <a:t>Добавете метод</a:t>
             </a:r>
             <a:r>
-              <a:rPr lang="en-US" sz="3200" dirty="0"/>
+              <a:rPr lang="en-US" sz="3100" dirty="0"/>
               <a:t>, </a:t>
             </a:r>
             <a:r>
-              <a:rPr lang="bg-BG" sz="3200" dirty="0"/>
+              <a:rPr lang="bg-BG" sz="3100" dirty="0"/>
               <a:t>който </a:t>
             </a:r>
           </a:p>
@@ -13970,11 +14746,11 @@
               <a:buNone/>
             </a:pPr>
             <a:r>
-              <a:rPr lang="bg-BG" sz="3200" dirty="0"/>
+              <a:rPr lang="bg-BG" sz="3100" dirty="0"/>
               <a:t>увеличава </a:t>
             </a:r>
             <a:r>
-              <a:rPr lang="en-US" sz="3200" b="1" dirty="0">
+              <a:rPr lang="en-US" sz="3100" b="1" dirty="0">
                 <a:solidFill>
                   <a:schemeClr val="bg1"/>
                 </a:solidFill>
@@ -13983,11 +14759,11 @@
               <a:t>Salary</a:t>
             </a:r>
             <a:r>
-              <a:rPr lang="en-US" sz="3200" dirty="0"/>
+              <a:rPr lang="en-US" sz="3100" dirty="0"/>
               <a:t> </a:t>
             </a:r>
             <a:r>
-              <a:rPr lang="bg-BG" sz="3200" dirty="0"/>
+              <a:rPr lang="bg-BG" sz="3100" dirty="0"/>
               <a:t>с определен </a:t>
             </a:r>
           </a:p>
@@ -13996,14 +14772,14 @@
               <a:buNone/>
             </a:pPr>
             <a:r>
-              <a:rPr lang="bg-BG" sz="3200" dirty="0"/>
+              <a:rPr lang="bg-BG" sz="3100" dirty="0"/>
               <a:t>процент</a:t>
             </a:r>
-            <a:endParaRPr lang="en-US" sz="3200" dirty="0"/>
-          </a:p>
-          <a:p>
-            <a:r>
-              <a:rPr lang="bg-BG" sz="3200" dirty="0"/>
+            <a:endParaRPr lang="en-US" sz="3100" dirty="0"/>
+          </a:p>
+          <a:p>
+            <a:r>
+              <a:rPr lang="bg-BG" sz="3100" dirty="0"/>
               <a:t>Хора, по-млади от 30, получават </a:t>
             </a:r>
           </a:p>
@@ -14012,7 +14788,7 @@
               <a:buNone/>
             </a:pPr>
             <a:r>
-              <a:rPr lang="bg-BG" sz="3200" dirty="0"/>
+              <a:rPr lang="bg-BG" sz="3100" dirty="0"/>
               <a:t>половината от стандартното </a:t>
             </a:r>
           </a:p>
@@ -14021,10 +14797,10 @@
               <a:buNone/>
             </a:pPr>
             <a:r>
-              <a:rPr lang="bg-BG" sz="3200" dirty="0"/>
+              <a:rPr lang="bg-BG" sz="3100" dirty="0"/>
               <a:t>увеличение.</a:t>
             </a:r>
-            <a:endParaRPr lang="en-US" sz="3200" dirty="0"/>
+            <a:endParaRPr lang="en-US" sz="3100" dirty="0"/>
           </a:p>
         </p:txBody>
       </p:sp>
@@ -14067,10 +14843,10 @@
         </p:nvGrpSpPr>
         <p:grpSpPr>
           <a:xfrm>
-            <a:off x="6546000" y="2079000"/>
-            <a:ext cx="5760000" cy="3420000"/>
+            <a:off x="6304471" y="2255652"/>
+            <a:ext cx="5760000" cy="3441356"/>
             <a:chOff x="-306388" y="2128097"/>
-            <a:chExt cx="3137848" cy="3445966"/>
+            <a:chExt cx="3137848" cy="3467484"/>
           </a:xfrm>
         </p:grpSpPr>
         <p:sp>
@@ -14140,7 +14916,7 @@
           <p:spPr bwMode="auto">
             <a:xfrm>
               <a:off x="-306388" y="2739909"/>
-              <a:ext cx="3137848" cy="2834154"/>
+              <a:ext cx="3137848" cy="2855672"/>
             </a:xfrm>
             <a:prstGeom prst="rect">
               <a:avLst/>
@@ -15306,8 +16082,12 @@
           <a:lstStyle/>
           <a:p>
             <a:r>
+              <a:rPr lang="bg-BG" dirty="0"/>
+              <a:t>Какво представляват изключенията</a:t>
+            </a:r>
+            <a:r>
               <a:rPr lang="en-US" dirty="0"/>
-              <a:t>What are Exceptions?</a:t>
+              <a:t>?</a:t>
             </a:r>
           </a:p>
         </p:txBody>
@@ -15334,9 +16114,10 @@
           <a:lstStyle/>
           <a:p>
             <a:r>
-              <a:rPr lang="en-US" dirty="0"/>
-              <a:t>Exceptions in Programming</a:t>
-            </a:r>
+              <a:rPr lang="bg-BG" dirty="0"/>
+              <a:t>Изключения в програмирането</a:t>
+            </a:r>
+            <a:endParaRPr lang="en-US" dirty="0"/>
           </a:p>
         </p:txBody>
       </p:sp>
@@ -15396,12 +16177,14 @@
         </p:nvSpPr>
         <p:spPr>
           <a:xfrm>
-            <a:off x="1971167" y="999634"/>
+            <a:off x="2081437" y="1249441"/>
             <a:ext cx="10126596" cy="5545145"/>
           </a:xfrm>
         </p:spPr>
         <p:txBody>
-          <a:bodyPr/>
+          <a:bodyPr>
+            <a:normAutofit/>
+          </a:bodyPr>
           <a:lstStyle/>
           <a:p>
             <a:pPr>
@@ -15413,21 +16196,22 @@
               </a:buClr>
             </a:pPr>
             <a:r>
-              <a:rPr lang="en-US" b="1" dirty="0">
+              <a:rPr lang="bg-BG" sz="3400" b="1" dirty="0">
                 <a:solidFill>
                   <a:schemeClr val="bg1"/>
                 </a:solidFill>
               </a:rPr>
-              <a:t>Exceptions</a:t>
-            </a:r>
-            <a:r>
-              <a:rPr lang="en-US" b="1" dirty="0"/>
+              <a:t>Изключенията</a:t>
+            </a:r>
+            <a:r>
+              <a:rPr lang="en-US" sz="3400" b="1" dirty="0"/>
               <a:t> </a:t>
             </a:r>
             <a:r>
-              <a:rPr lang="en-US" dirty="0"/>
-              <a:t>handle errors and problems at runtime</a:t>
-            </a:r>
+              <a:rPr lang="bg-BG" sz="3400" dirty="0"/>
+              <a:t>представят грешки или проблеми, възникнали по време на изпълнение.</a:t>
+            </a:r>
+            <a:endParaRPr lang="en-US" sz="3400" dirty="0"/>
           </a:p>
           <a:p>
             <a:pPr>
@@ -15439,21 +16223,42 @@
               </a:buClr>
             </a:pPr>
             <a:r>
-              <a:rPr lang="en-US" b="1" dirty="0">
+              <a:rPr lang="bg-BG" sz="3400" dirty="0"/>
+              <a:t>Можем да „</a:t>
+            </a:r>
+            <a:r>
+              <a:rPr lang="bg-BG" sz="3400" b="1" dirty="0">
                 <a:solidFill>
                   <a:schemeClr val="bg1"/>
                 </a:solidFill>
               </a:rPr>
-              <a:t>Throw</a:t>
-            </a:r>
-            <a:r>
-              <a:rPr lang="en-US" b="1" dirty="0"/>
-              <a:t> </a:t>
-            </a:r>
-            <a:r>
-              <a:rPr lang="en-US" dirty="0"/>
-              <a:t>an exception to signal about a problem</a:t>
-            </a:r>
+              <a:t>хвърлим</a:t>
+            </a:r>
+            <a:r>
+              <a:rPr lang="bg-BG" sz="3400" dirty="0"/>
+              <a:t>“</a:t>
+            </a:r>
+            <a:r>
+              <a:rPr lang="en-US" sz="3400" dirty="0"/>
+              <a:t> (</a:t>
+            </a:r>
+            <a:r>
+              <a:rPr lang="en-US" sz="3400" b="1" dirty="0">
+                <a:solidFill>
+                  <a:schemeClr val="bg1"/>
+                </a:solidFill>
+              </a:rPr>
+              <a:t>throw</a:t>
+            </a:r>
+            <a:r>
+              <a:rPr lang="en-US" sz="3400" dirty="0"/>
+              <a:t>)</a:t>
+            </a:r>
+            <a:r>
+              <a:rPr lang="bg-BG" sz="3400" dirty="0"/>
+              <a:t> изключението, за да сигнализираме за проблема</a:t>
+            </a:r>
+            <a:endParaRPr lang="en-US" sz="3400" dirty="0"/>
           </a:p>
           <a:p>
             <a:pPr>
@@ -15464,46 +16269,7 @@
                 <a:schemeClr val="tx1"/>
               </a:buClr>
             </a:pPr>
-            <a:endParaRPr lang="en-US" dirty="0"/>
-          </a:p>
-          <a:p>
-            <a:pPr>
-              <a:lnSpc>
-                <a:spcPct val="100000"/>
-              </a:lnSpc>
-              <a:spcBef>
-                <a:spcPts val="0"/>
-              </a:spcBef>
-              <a:buClr>
-                <a:schemeClr val="tx1"/>
-              </a:buClr>
-            </a:pPr>
-            <a:endParaRPr lang="en-US" b="1" dirty="0"/>
-          </a:p>
-          <a:p>
-            <a:pPr>
-              <a:lnSpc>
-                <a:spcPct val="100000"/>
-              </a:lnSpc>
-              <a:spcBef>
-                <a:spcPts val="0"/>
-              </a:spcBef>
-              <a:buClr>
-                <a:schemeClr val="tx1"/>
-              </a:buClr>
-            </a:pPr>
-            <a:r>
-              <a:rPr lang="en-US" b="1" dirty="0">
-                <a:solidFill>
-                  <a:schemeClr val="bg1"/>
-                </a:solidFill>
-              </a:rPr>
-              <a:t>Catch</a:t>
-            </a:r>
-            <a:r>
-              <a:rPr lang="en-US" dirty="0"/>
-              <a:t> an exception to handle the problem</a:t>
-            </a:r>
+            <a:endParaRPr lang="en-US" sz="3400" dirty="0"/>
           </a:p>
         </p:txBody>
       </p:sp>
@@ -15523,16 +16289,24 @@
             <p:ph type="title"/>
           </p:nvPr>
         </p:nvSpPr>
-        <p:spPr/>
+        <p:spPr>
+          <a:xfrm>
+            <a:off x="1281000" y="144000"/>
+            <a:ext cx="8625520" cy="882654"/>
+          </a:xfrm>
+        </p:spPr>
         <p:txBody>
           <a:bodyPr/>
           <a:lstStyle/>
           <a:p>
             <a:r>
-              <a:rPr lang="en-US"/>
-              <a:t>What Are Exceptions?</a:t>
-            </a:r>
-            <a:endParaRPr lang="en-US" dirty="0"/>
+              <a:rPr lang="bg-BG" dirty="0"/>
+              <a:t>Какво представляват изключенията</a:t>
+            </a:r>
+            <a:r>
+              <a:rPr lang="en-US" dirty="0"/>
+              <a:t>?</a:t>
+            </a:r>
           </a:p>
         </p:txBody>
       </p:sp>
@@ -15552,7 +16326,7 @@
         </p:nvSpPr>
         <p:spPr bwMode="auto">
           <a:xfrm>
-            <a:off x="2505664" y="2394229"/>
+            <a:off x="2650270" y="4374000"/>
             <a:ext cx="8988931" cy="1040443"/>
           </a:xfrm>
           <a:prstGeom prst="rect">
@@ -15817,6 +16591,864 @@
       </p:sp>
       <p:sp>
         <p:nvSpPr>
+          <p:cNvPr id="9" name="Slide Number">
+            <a:extLst>
+              <a:ext uri="{FF2B5EF4-FFF2-40B4-BE49-F238E27FC236}">
+                <a16:creationId xmlns:a16="http://schemas.microsoft.com/office/drawing/2014/main" id="{CC6FD336-140F-4950-8E1A-6F77EC29AD26}"/>
+              </a:ext>
+            </a:extLst>
+          </p:cNvPr>
+          <p:cNvSpPr>
+            <a:spLocks noGrp="1"/>
+          </p:cNvSpPr>
+          <p:nvPr>
+            <p:ph type="sldNum" sz="quarter" idx="5"/>
+          </p:nvPr>
+        </p:nvSpPr>
+        <p:spPr>
+          <a:xfrm>
+            <a:off x="11753030" y="6507000"/>
+            <a:ext cx="367414" cy="297000"/>
+          </a:xfrm>
+          <a:prstGeom prst="rect">
+            <a:avLst/>
+          </a:prstGeom>
+        </p:spPr>
+        <p:txBody>
+          <a:bodyPr vert="horz" lIns="91440" tIns="45720" rIns="91440" bIns="45720" rtlCol="0" anchor="b"/>
+          <a:lstStyle>
+            <a:defPPr>
+              <a:defRPr lang="en-US"/>
+            </a:defPPr>
+            <a:lvl1pPr marL="0" algn="r" defTabSz="914400" rtl="0" eaLnBrk="1" latinLnBrk="0" hangingPunct="1">
+              <a:defRPr sz="1000" kern="1200">
+                <a:solidFill>
+                  <a:schemeClr val="tx1"/>
+                </a:solidFill>
+                <a:latin typeface="+mn-lt"/>
+                <a:ea typeface="+mn-ea"/>
+                <a:cs typeface="+mn-cs"/>
+              </a:defRPr>
+            </a:lvl1pPr>
+            <a:lvl2pPr marL="457200" algn="l" defTabSz="914400" rtl="0" eaLnBrk="1" latinLnBrk="0" hangingPunct="1">
+              <a:defRPr sz="1800" kern="1200">
+                <a:solidFill>
+                  <a:schemeClr val="tx1"/>
+                </a:solidFill>
+                <a:latin typeface="+mn-lt"/>
+                <a:ea typeface="+mn-ea"/>
+                <a:cs typeface="+mn-cs"/>
+              </a:defRPr>
+            </a:lvl2pPr>
+            <a:lvl3pPr marL="914400" algn="l" defTabSz="914400" rtl="0" eaLnBrk="1" latinLnBrk="0" hangingPunct="1">
+              <a:defRPr sz="1800" kern="1200">
+                <a:solidFill>
+                  <a:schemeClr val="tx1"/>
+                </a:solidFill>
+                <a:latin typeface="+mn-lt"/>
+                <a:ea typeface="+mn-ea"/>
+                <a:cs typeface="+mn-cs"/>
+              </a:defRPr>
+            </a:lvl3pPr>
+            <a:lvl4pPr marL="1371600" algn="l" defTabSz="914400" rtl="0" eaLnBrk="1" latinLnBrk="0" hangingPunct="1">
+              <a:defRPr sz="1800" kern="1200">
+                <a:solidFill>
+                  <a:schemeClr val="tx1"/>
+                </a:solidFill>
+                <a:latin typeface="+mn-lt"/>
+                <a:ea typeface="+mn-ea"/>
+                <a:cs typeface="+mn-cs"/>
+              </a:defRPr>
+            </a:lvl4pPr>
+            <a:lvl5pPr marL="1828800" algn="l" defTabSz="914400" rtl="0" eaLnBrk="1" latinLnBrk="0" hangingPunct="1">
+              <a:defRPr sz="1800" kern="1200">
+                <a:solidFill>
+                  <a:schemeClr val="tx1"/>
+                </a:solidFill>
+                <a:latin typeface="+mn-lt"/>
+                <a:ea typeface="+mn-ea"/>
+                <a:cs typeface="+mn-cs"/>
+              </a:defRPr>
+            </a:lvl5pPr>
+            <a:lvl6pPr marL="2286000" algn="l" defTabSz="914400" rtl="0" eaLnBrk="1" latinLnBrk="0" hangingPunct="1">
+              <a:defRPr sz="1800" kern="1200">
+                <a:solidFill>
+                  <a:schemeClr val="tx1"/>
+                </a:solidFill>
+                <a:latin typeface="+mn-lt"/>
+                <a:ea typeface="+mn-ea"/>
+                <a:cs typeface="+mn-cs"/>
+              </a:defRPr>
+            </a:lvl6pPr>
+            <a:lvl7pPr marL="2743200" algn="l" defTabSz="914400" rtl="0" eaLnBrk="1" latinLnBrk="0" hangingPunct="1">
+              <a:defRPr sz="1800" kern="1200">
+                <a:solidFill>
+                  <a:schemeClr val="tx1"/>
+                </a:solidFill>
+                <a:latin typeface="+mn-lt"/>
+                <a:ea typeface="+mn-ea"/>
+                <a:cs typeface="+mn-cs"/>
+              </a:defRPr>
+            </a:lvl7pPr>
+            <a:lvl8pPr marL="3200400" algn="l" defTabSz="914400" rtl="0" eaLnBrk="1" latinLnBrk="0" hangingPunct="1">
+              <a:defRPr sz="1800" kern="1200">
+                <a:solidFill>
+                  <a:schemeClr val="tx1"/>
+                </a:solidFill>
+                <a:latin typeface="+mn-lt"/>
+                <a:ea typeface="+mn-ea"/>
+                <a:cs typeface="+mn-cs"/>
+              </a:defRPr>
+            </a:lvl8pPr>
+            <a:lvl9pPr marL="3657600" algn="l" defTabSz="914400" rtl="0" eaLnBrk="1" latinLnBrk="0" hangingPunct="1">
+              <a:defRPr sz="1800" kern="1200">
+                <a:solidFill>
+                  <a:schemeClr val="tx1"/>
+                </a:solidFill>
+                <a:latin typeface="+mn-lt"/>
+                <a:ea typeface="+mn-ea"/>
+                <a:cs typeface="+mn-cs"/>
+              </a:defRPr>
+            </a:lvl9pPr>
+          </a:lstStyle>
+          <a:p>
+            <a:fld id="{2BF067CD-8E6B-4360-9AA8-C5DF2A48A6D1}" type="slidenum">
+              <a:rPr lang="en-US" smtClean="0"/>
+              <a:pPr/>
+              <a:t>19</a:t>
+            </a:fld>
+            <a:endParaRPr lang="en-US" noProof="0" dirty="0"/>
+          </a:p>
+        </p:txBody>
+      </p:sp>
+    </p:spTree>
+    <p:extLst>
+      <p:ext uri="{BB962C8B-B14F-4D97-AF65-F5344CB8AC3E}">
+        <p14:creationId xmlns:p14="http://schemas.microsoft.com/office/powerpoint/2010/main" val="372200594"/>
+      </p:ext>
+    </p:extLst>
+  </p:cSld>
+  <p:clrMapOvr>
+    <a:masterClrMapping/>
+  </p:clrMapOvr>
+  <mc:AlternateContent xmlns:mc="http://schemas.openxmlformats.org/markup-compatibility/2006" xmlns:p14="http://schemas.microsoft.com/office/powerpoint/2010/main">
+    <mc:Choice Requires="p14">
+      <p:transition p14:dur="0" advClick="0" advTm="5000"/>
+    </mc:Choice>
+    <mc:Fallback xmlns="">
+      <p:transition advClick="0" advTm="5000"/>
+    </mc:Fallback>
+  </mc:AlternateContent>
+  <p:timing>
+    <p:tnLst>
+      <p:par>
+        <p:cTn id="1" dur="indefinite" restart="never" nodeType="tmRoot">
+          <p:childTnLst>
+            <p:seq concurrent="1" nextAc="seek">
+              <p:cTn id="2" dur="indefinite" nodeType="mainSeq">
+                <p:childTnLst>
+                  <p:par>
+                    <p:cTn id="3" fill="hold">
+                      <p:stCondLst>
+                        <p:cond delay="indefinite"/>
+                      </p:stCondLst>
+                      <p:childTnLst>
+                        <p:par>
+                          <p:cTn id="4" fill="hold">
+                            <p:stCondLst>
+                              <p:cond delay="0"/>
+                            </p:stCondLst>
+                            <p:childTnLst>
+                              <p:par>
+                                <p:cTn id="5" presetID="1" presetClass="entr" presetSubtype="0" fill="hold" nodeType="clickEffect">
+                                  <p:stCondLst>
+                                    <p:cond delay="0"/>
+                                  </p:stCondLst>
+                                  <p:childTnLst>
+                                    <p:set>
+                                      <p:cBhvr>
+                                        <p:cTn id="6" dur="1" fill="hold">
+                                          <p:stCondLst>
+                                            <p:cond delay="0"/>
+                                          </p:stCondLst>
+                                        </p:cTn>
+                                        <p:tgtEl>
+                                          <p:spTgt spid="2">
+                                            <p:txEl>
+                                              <p:pRg st="1" end="1"/>
+                                            </p:txEl>
+                                          </p:spTgt>
+                                        </p:tgtEl>
+                                        <p:attrNameLst>
+                                          <p:attrName>style.visibility</p:attrName>
+                                        </p:attrNameLst>
+                                      </p:cBhvr>
+                                      <p:to>
+                                        <p:strVal val="visible"/>
+                                      </p:to>
+                                    </p:set>
+                                  </p:childTnLst>
+                                </p:cTn>
+                              </p:par>
+                              <p:par>
+                                <p:cTn id="7" presetID="1" presetClass="entr" presetSubtype="0" fill="hold" grpId="0" nodeType="withEffect">
+                                  <p:stCondLst>
+                                    <p:cond delay="0"/>
+                                  </p:stCondLst>
+                                  <p:childTnLst>
+                                    <p:set>
+                                      <p:cBhvr>
+                                        <p:cTn id="8" dur="1" fill="hold">
+                                          <p:stCondLst>
+                                            <p:cond delay="0"/>
+                                          </p:stCondLst>
+                                        </p:cTn>
+                                        <p:tgtEl>
+                                          <p:spTgt spid="6"/>
+                                        </p:tgtEl>
+                                        <p:attrNameLst>
+                                          <p:attrName>style.visibility</p:attrName>
+                                        </p:attrNameLst>
+                                      </p:cBhvr>
+                                      <p:to>
+                                        <p:strVal val="visible"/>
+                                      </p:to>
+                                    </p:set>
+                                  </p:childTnLst>
+                                </p:cTn>
+                              </p:par>
+                            </p:childTnLst>
+                          </p:cTn>
+                        </p:par>
+                      </p:childTnLst>
+                    </p:cTn>
+                  </p:par>
+                </p:childTnLst>
+              </p:cTn>
+              <p:prevCondLst>
+                <p:cond evt="onPrev" delay="0">
+                  <p:tgtEl>
+                    <p:sldTgt/>
+                  </p:tgtEl>
+                </p:cond>
+              </p:prevCondLst>
+              <p:nextCondLst>
+                <p:cond evt="onNext" delay="0">
+                  <p:tgtEl>
+                    <p:sldTgt/>
+                  </p:tgtEl>
+                </p:cond>
+              </p:nextCondLst>
+            </p:seq>
+          </p:childTnLst>
+        </p:cTn>
+      </p:par>
+    </p:tnLst>
+    <p:bldLst>
+      <p:bldP spid="6" grpId="0" animBg="1"/>
+    </p:bldLst>
+  </p:timing>
+</p:sld>
+</file>
+
+<file path=ppt/slides/slide2.xml><?xml version="1.0" encoding="utf-8"?>
+<p:sld xmlns:a="http://schemas.openxmlformats.org/drawingml/2006/main" xmlns:r="http://schemas.openxmlformats.org/officeDocument/2006/relationships" xmlns:p="http://schemas.openxmlformats.org/presentationml/2006/main">
+  <p:cSld>
+    <p:spTree>
+      <p:nvGrpSpPr>
+        <p:cNvPr id="1" name=""/>
+        <p:cNvGrpSpPr/>
+        <p:nvPr/>
+      </p:nvGrpSpPr>
+      <p:grpSpPr>
+        <a:xfrm>
+          <a:off x="0" y="0"/>
+          <a:ext cx="0" cy="0"/>
+          <a:chOff x="0" y="0"/>
+          <a:chExt cx="0" cy="0"/>
+        </a:xfrm>
+      </p:grpSpPr>
+      <p:sp>
+        <p:nvSpPr>
+          <p:cNvPr id="423939" name="Rectangle 3"/>
+          <p:cNvSpPr>
+            <a:spLocks noGrp="1" noChangeArrowheads="1"/>
+          </p:cNvSpPr>
+          <p:nvPr>
+            <p:ph type="body" sz="quarter" idx="10"/>
+          </p:nvPr>
+        </p:nvSpPr>
+        <p:spPr>
+          <a:xfrm>
+            <a:off x="190406" y="664617"/>
+            <a:ext cx="11818096" cy="5528766"/>
+          </a:xfrm>
+        </p:spPr>
+        <p:txBody>
+          <a:bodyPr/>
+          <a:lstStyle/>
+          <a:p>
+            <a:pPr marL="0" indent="0">
+              <a:buNone/>
+            </a:pPr>
+            <a:endParaRPr lang="bg-BG" sz="4000" dirty="0"/>
+          </a:p>
+          <a:p>
+            <a:pPr marL="742950" indent="-742950">
+              <a:buFont typeface="+mj-lt"/>
+              <a:buAutoNum type="arabicPeriod"/>
+            </a:pPr>
+            <a:r>
+              <a:rPr lang="bg-BG" sz="4000" dirty="0"/>
+              <a:t>Какво е енкапсулация</a:t>
+            </a:r>
+            <a:r>
+              <a:rPr lang="en-US" sz="4000" dirty="0"/>
+              <a:t>?</a:t>
+            </a:r>
+          </a:p>
+          <a:p>
+            <a:pPr marL="742950" indent="-742950">
+              <a:buFont typeface="+mj-lt"/>
+              <a:buAutoNum type="arabicPeriod"/>
+            </a:pPr>
+            <a:r>
+              <a:rPr lang="bg-BG" sz="4000" dirty="0"/>
+              <a:t>Модификатори</a:t>
+            </a:r>
+            <a:r>
+              <a:rPr lang="en-US" sz="4000" dirty="0"/>
+              <a:t> </a:t>
+            </a:r>
+            <a:r>
+              <a:rPr lang="bg-BG" sz="4000" dirty="0"/>
+              <a:t>за достъп</a:t>
+            </a:r>
+            <a:endParaRPr lang="en-US" sz="4000" dirty="0"/>
+          </a:p>
+          <a:p>
+            <a:pPr marL="742950" indent="-742950">
+              <a:buFont typeface="+mj-lt"/>
+              <a:buAutoNum type="arabicPeriod"/>
+            </a:pPr>
+            <a:r>
+              <a:rPr lang="bg-BG" sz="4000" dirty="0"/>
+              <a:t>Изключения</a:t>
+            </a:r>
+          </a:p>
+          <a:p>
+            <a:pPr marL="742950" indent="-742950">
+              <a:buFont typeface="+mj-lt"/>
+              <a:buAutoNum type="arabicPeriod"/>
+            </a:pPr>
+            <a:r>
+              <a:rPr lang="bg-BG" sz="4000" dirty="0"/>
+              <a:t>Валидация </a:t>
+            </a:r>
+          </a:p>
+          <a:p>
+            <a:pPr marL="742950" indent="-742950">
+              <a:buFont typeface="+mj-lt"/>
+              <a:buAutoNum type="arabicPeriod"/>
+            </a:pPr>
+            <a:r>
+              <a:rPr lang="bg-BG" sz="4000" dirty="0"/>
+              <a:t>Променими и непроменими обекти</a:t>
+            </a:r>
+            <a:endParaRPr lang="en-US" sz="4000" dirty="0"/>
+          </a:p>
+          <a:p>
+            <a:endParaRPr lang="en-US" noProof="1"/>
+          </a:p>
+        </p:txBody>
+      </p:sp>
+      <p:sp>
+        <p:nvSpPr>
+          <p:cNvPr id="423938" name="Rectangle 2"/>
+          <p:cNvSpPr>
+            <a:spLocks noGrp="1" noChangeArrowheads="1"/>
+          </p:cNvSpPr>
+          <p:nvPr>
+            <p:ph type="title"/>
+          </p:nvPr>
+        </p:nvSpPr>
+        <p:spPr/>
+        <p:txBody>
+          <a:bodyPr/>
+          <a:lstStyle/>
+          <a:p>
+            <a:r>
+              <a:rPr lang="bg-BG" dirty="0"/>
+              <a:t>Съдържание</a:t>
+            </a:r>
+          </a:p>
+        </p:txBody>
+      </p:sp>
+      <p:sp>
+        <p:nvSpPr>
+          <p:cNvPr id="5" name="Slide Number">
+            <a:extLst>
+              <a:ext uri="{FF2B5EF4-FFF2-40B4-BE49-F238E27FC236}">
+                <a16:creationId xmlns:a16="http://schemas.microsoft.com/office/drawing/2014/main" id="{D813CDB2-A6DC-4174-9AED-EAB79BDC01C9}"/>
+              </a:ext>
+            </a:extLst>
+          </p:cNvPr>
+          <p:cNvSpPr>
+            <a:spLocks noGrp="1"/>
+          </p:cNvSpPr>
+          <p:nvPr>
+            <p:ph type="sldNum" sz="quarter" idx="5"/>
+          </p:nvPr>
+        </p:nvSpPr>
+        <p:spPr>
+          <a:xfrm>
+            <a:off x="11753030" y="6507000"/>
+            <a:ext cx="367414" cy="297000"/>
+          </a:xfrm>
+          <a:prstGeom prst="rect">
+            <a:avLst/>
+          </a:prstGeom>
+        </p:spPr>
+        <p:txBody>
+          <a:bodyPr vert="horz" lIns="91440" tIns="45720" rIns="91440" bIns="45720" rtlCol="0" anchor="b"/>
+          <a:lstStyle>
+            <a:lvl1pPr algn="r">
+              <a:defRPr sz="1000"/>
+            </a:lvl1pPr>
+          </a:lstStyle>
+          <a:p>
+            <a:fld id="{2BF067CD-8E6B-4360-9AA8-C5DF2A48A6D1}" type="slidenum">
+              <a:rPr lang="en-US" noProof="0" smtClean="0"/>
+              <a:pPr/>
+              <a:t>2</a:t>
+            </a:fld>
+            <a:endParaRPr lang="en-US" noProof="0" dirty="0"/>
+          </a:p>
+        </p:txBody>
+      </p:sp>
+    </p:spTree>
+    <p:extLst>
+      <p:ext uri="{BB962C8B-B14F-4D97-AF65-F5344CB8AC3E}">
+        <p14:creationId xmlns:p14="http://schemas.microsoft.com/office/powerpoint/2010/main" val="859700777"/>
+      </p:ext>
+    </p:extLst>
+  </p:cSld>
+  <p:clrMapOvr>
+    <a:masterClrMapping/>
+  </p:clrMapOvr>
+  <mc:AlternateContent xmlns:mc="http://schemas.openxmlformats.org/markup-compatibility/2006" xmlns:p14="http://schemas.microsoft.com/office/powerpoint/2010/main">
+    <mc:Choice Requires="p14">
+      <p:transition p14:dur="0"/>
+    </mc:Choice>
+    <mc:Fallback xmlns="">
+      <p:transition/>
+    </mc:Fallback>
+  </mc:AlternateContent>
+  <p:timing>
+    <p:tnLst>
+      <p:par>
+        <p:cTn id="1" dur="indefinite" restart="never" nodeType="tmRoot">
+          <p:childTnLst>
+            <p:seq concurrent="1" nextAc="seek">
+              <p:cTn id="2" dur="indefinite" nodeType="mainSeq">
+                <p:childTnLst>
+                  <p:par>
+                    <p:cTn id="3" fill="hold">
+                      <p:stCondLst>
+                        <p:cond delay="indefinite"/>
+                      </p:stCondLst>
+                      <p:childTnLst>
+                        <p:par>
+                          <p:cTn id="4" fill="hold">
+                            <p:stCondLst>
+                              <p:cond delay="0"/>
+                            </p:stCondLst>
+                            <p:childTnLst>
+                              <p:par>
+                                <p:cTn id="5" presetID="1" presetClass="entr" presetSubtype="0" fill="hold" nodeType="clickEffect">
+                                  <p:stCondLst>
+                                    <p:cond delay="0"/>
+                                  </p:stCondLst>
+                                  <p:childTnLst>
+                                    <p:set>
+                                      <p:cBhvr>
+                                        <p:cTn id="6" dur="1" fill="hold">
+                                          <p:stCondLst>
+                                            <p:cond delay="0"/>
+                                          </p:stCondLst>
+                                        </p:cTn>
+                                        <p:tgtEl>
+                                          <p:spTgt spid="423939">
+                                            <p:txEl>
+                                              <p:pRg st="2" end="2"/>
+                                            </p:txEl>
+                                          </p:spTgt>
+                                        </p:tgtEl>
+                                        <p:attrNameLst>
+                                          <p:attrName>style.visibility</p:attrName>
+                                        </p:attrNameLst>
+                                      </p:cBhvr>
+                                      <p:to>
+                                        <p:strVal val="visible"/>
+                                      </p:to>
+                                    </p:set>
+                                  </p:childTnLst>
+                                </p:cTn>
+                              </p:par>
+                            </p:childTnLst>
+                          </p:cTn>
+                        </p:par>
+                      </p:childTnLst>
+                    </p:cTn>
+                  </p:par>
+                  <p:par>
+                    <p:cTn id="7" fill="hold">
+                      <p:stCondLst>
+                        <p:cond delay="indefinite"/>
+                      </p:stCondLst>
+                      <p:childTnLst>
+                        <p:par>
+                          <p:cTn id="8" fill="hold">
+                            <p:stCondLst>
+                              <p:cond delay="0"/>
+                            </p:stCondLst>
+                            <p:childTnLst>
+                              <p:par>
+                                <p:cTn id="9" presetID="1" presetClass="entr" presetSubtype="0" fill="hold" nodeType="clickEffect">
+                                  <p:stCondLst>
+                                    <p:cond delay="0"/>
+                                  </p:stCondLst>
+                                  <p:childTnLst>
+                                    <p:set>
+                                      <p:cBhvr>
+                                        <p:cTn id="10" dur="1" fill="hold">
+                                          <p:stCondLst>
+                                            <p:cond delay="0"/>
+                                          </p:stCondLst>
+                                        </p:cTn>
+                                        <p:tgtEl>
+                                          <p:spTgt spid="423939">
+                                            <p:txEl>
+                                              <p:pRg st="3" end="3"/>
+                                            </p:txEl>
+                                          </p:spTgt>
+                                        </p:tgtEl>
+                                        <p:attrNameLst>
+                                          <p:attrName>style.visibility</p:attrName>
+                                        </p:attrNameLst>
+                                      </p:cBhvr>
+                                      <p:to>
+                                        <p:strVal val="visible"/>
+                                      </p:to>
+                                    </p:set>
+                                  </p:childTnLst>
+                                </p:cTn>
+                              </p:par>
+                            </p:childTnLst>
+                          </p:cTn>
+                        </p:par>
+                      </p:childTnLst>
+                    </p:cTn>
+                  </p:par>
+                  <p:par>
+                    <p:cTn id="11" fill="hold">
+                      <p:stCondLst>
+                        <p:cond delay="indefinite"/>
+                      </p:stCondLst>
+                      <p:childTnLst>
+                        <p:par>
+                          <p:cTn id="12" fill="hold">
+                            <p:stCondLst>
+                              <p:cond delay="0"/>
+                            </p:stCondLst>
+                            <p:childTnLst>
+                              <p:par>
+                                <p:cTn id="13" presetID="1" presetClass="entr" presetSubtype="0" fill="hold" nodeType="clickEffect">
+                                  <p:stCondLst>
+                                    <p:cond delay="0"/>
+                                  </p:stCondLst>
+                                  <p:childTnLst>
+                                    <p:set>
+                                      <p:cBhvr>
+                                        <p:cTn id="14" dur="1" fill="hold">
+                                          <p:stCondLst>
+                                            <p:cond delay="0"/>
+                                          </p:stCondLst>
+                                        </p:cTn>
+                                        <p:tgtEl>
+                                          <p:spTgt spid="423939">
+                                            <p:txEl>
+                                              <p:pRg st="4" end="4"/>
+                                            </p:txEl>
+                                          </p:spTgt>
+                                        </p:tgtEl>
+                                        <p:attrNameLst>
+                                          <p:attrName>style.visibility</p:attrName>
+                                        </p:attrNameLst>
+                                      </p:cBhvr>
+                                      <p:to>
+                                        <p:strVal val="visible"/>
+                                      </p:to>
+                                    </p:set>
+                                  </p:childTnLst>
+                                </p:cTn>
+                              </p:par>
+                            </p:childTnLst>
+                          </p:cTn>
+                        </p:par>
+                      </p:childTnLst>
+                    </p:cTn>
+                  </p:par>
+                  <p:par>
+                    <p:cTn id="15" fill="hold">
+                      <p:stCondLst>
+                        <p:cond delay="indefinite"/>
+                      </p:stCondLst>
+                      <p:childTnLst>
+                        <p:par>
+                          <p:cTn id="16" fill="hold">
+                            <p:stCondLst>
+                              <p:cond delay="0"/>
+                            </p:stCondLst>
+                            <p:childTnLst>
+                              <p:par>
+                                <p:cTn id="17" presetID="1" presetClass="entr" presetSubtype="0" fill="hold" nodeType="clickEffect">
+                                  <p:stCondLst>
+                                    <p:cond delay="0"/>
+                                  </p:stCondLst>
+                                  <p:childTnLst>
+                                    <p:set>
+                                      <p:cBhvr>
+                                        <p:cTn id="18" dur="1" fill="hold">
+                                          <p:stCondLst>
+                                            <p:cond delay="0"/>
+                                          </p:stCondLst>
+                                        </p:cTn>
+                                        <p:tgtEl>
+                                          <p:spTgt spid="423939">
+                                            <p:txEl>
+                                              <p:pRg st="5" end="5"/>
+                                            </p:txEl>
+                                          </p:spTgt>
+                                        </p:tgtEl>
+                                        <p:attrNameLst>
+                                          <p:attrName>style.visibility</p:attrName>
+                                        </p:attrNameLst>
+                                      </p:cBhvr>
+                                      <p:to>
+                                        <p:strVal val="visible"/>
+                                      </p:to>
+                                    </p:set>
+                                  </p:childTnLst>
+                                </p:cTn>
+                              </p:par>
+                            </p:childTnLst>
+                          </p:cTn>
+                        </p:par>
+                      </p:childTnLst>
+                    </p:cTn>
+                  </p:par>
+                </p:childTnLst>
+              </p:cTn>
+              <p:prevCondLst>
+                <p:cond evt="onPrev" delay="0">
+                  <p:tgtEl>
+                    <p:sldTgt/>
+                  </p:tgtEl>
+                </p:cond>
+              </p:prevCondLst>
+              <p:nextCondLst>
+                <p:cond evt="onNext" delay="0">
+                  <p:tgtEl>
+                    <p:sldTgt/>
+                  </p:tgtEl>
+                </p:cond>
+              </p:nextCondLst>
+            </p:seq>
+          </p:childTnLst>
+        </p:cTn>
+      </p:par>
+    </p:tnLst>
+  </p:timing>
+</p:sld>
+</file>
+
+<file path=ppt/slides/slide20.xml><?xml version="1.0" encoding="utf-8"?>
+<p:sld xmlns:a="http://schemas.openxmlformats.org/drawingml/2006/main" xmlns:r="http://schemas.openxmlformats.org/officeDocument/2006/relationships" xmlns:p="http://schemas.openxmlformats.org/presentationml/2006/main">
+  <p:cSld>
+    <p:spTree>
+      <p:nvGrpSpPr>
+        <p:cNvPr id="1" name=""/>
+        <p:cNvGrpSpPr/>
+        <p:nvPr/>
+      </p:nvGrpSpPr>
+      <p:grpSpPr>
+        <a:xfrm>
+          <a:off x="0" y="0"/>
+          <a:ext cx="0" cy="0"/>
+          <a:chOff x="0" y="0"/>
+          <a:chExt cx="0" cy="0"/>
+        </a:xfrm>
+      </p:grpSpPr>
+      <p:sp>
+        <p:nvSpPr>
+          <p:cNvPr id="2" name="Text Placeholder 1">
+            <a:extLst>
+              <a:ext uri="{FF2B5EF4-FFF2-40B4-BE49-F238E27FC236}">
+                <a16:creationId xmlns:a16="http://schemas.microsoft.com/office/drawing/2014/main" id="{44F9AF6A-C40B-4369-AF05-597457846397}"/>
+              </a:ext>
+            </a:extLst>
+          </p:cNvPr>
+          <p:cNvSpPr>
+            <a:spLocks noGrp="1"/>
+          </p:cNvSpPr>
+          <p:nvPr>
+            <p:ph type="body" sz="quarter" idx="10"/>
+          </p:nvPr>
+        </p:nvSpPr>
+        <p:spPr>
+          <a:xfrm>
+            <a:off x="1911000" y="1150668"/>
+            <a:ext cx="10126596" cy="5545145"/>
+          </a:xfrm>
+        </p:spPr>
+        <p:txBody>
+          <a:bodyPr>
+            <a:normAutofit/>
+          </a:bodyPr>
+          <a:lstStyle/>
+          <a:p>
+            <a:pPr>
+              <a:lnSpc>
+                <a:spcPct val="100000"/>
+              </a:lnSpc>
+              <a:spcBef>
+                <a:spcPts val="2500"/>
+              </a:spcBef>
+              <a:buClr>
+                <a:schemeClr val="tx1"/>
+              </a:buClr>
+            </a:pPr>
+            <a:r>
+              <a:rPr lang="bg-BG" sz="3200" dirty="0"/>
+              <a:t>Можем да „</a:t>
+            </a:r>
+            <a:r>
+              <a:rPr lang="bg-BG" sz="3200" b="1" dirty="0">
+                <a:solidFill>
+                  <a:schemeClr val="bg1"/>
+                </a:solidFill>
+              </a:rPr>
+              <a:t>хванем</a:t>
+            </a:r>
+            <a:r>
+              <a:rPr lang="bg-BG" sz="3200" dirty="0"/>
+              <a:t>“</a:t>
+            </a:r>
+            <a:r>
+              <a:rPr lang="en-US" sz="3200" dirty="0"/>
+              <a:t> </a:t>
+            </a:r>
+            <a:r>
+              <a:rPr lang="bg-BG" sz="3200" dirty="0"/>
+              <a:t>изключението с оператора </a:t>
+            </a:r>
+            <a:r>
+              <a:rPr lang="en-US" sz="3200" b="1" dirty="0">
+                <a:solidFill>
+                  <a:schemeClr val="bg1"/>
+                </a:solidFill>
+                <a:latin typeface="Consolas" panose="020B0609020204030204" pitchFamily="49" charset="0"/>
+                <a:cs typeface="Consolas" panose="020B0609020204030204" pitchFamily="49" charset="0"/>
+              </a:rPr>
+              <a:t>catch</a:t>
+            </a:r>
+          </a:p>
+          <a:p>
+            <a:pPr>
+              <a:lnSpc>
+                <a:spcPct val="100000"/>
+              </a:lnSpc>
+              <a:spcBef>
+                <a:spcPts val="2500"/>
+              </a:spcBef>
+              <a:buClr>
+                <a:schemeClr val="tx1"/>
+              </a:buClr>
+            </a:pPr>
+            <a:r>
+              <a:rPr lang="bg-BG" sz="3200" dirty="0"/>
+              <a:t>По този начин можем да </a:t>
+            </a:r>
+            <a:r>
+              <a:rPr lang="bg-BG" sz="3200" b="1" dirty="0">
+                <a:solidFill>
+                  <a:schemeClr val="bg1"/>
+                </a:solidFill>
+              </a:rPr>
+              <a:t>реагираме</a:t>
+            </a:r>
+            <a:r>
+              <a:rPr lang="bg-BG" sz="3200" dirty="0"/>
+              <a:t> на грешката и да известим потребителя</a:t>
+            </a:r>
+            <a:r>
+              <a:rPr lang="en-US" sz="3200" dirty="0"/>
+              <a:t> </a:t>
+            </a:r>
+            <a:r>
+              <a:rPr lang="bg-BG" sz="3200" dirty="0"/>
+              <a:t>за нея</a:t>
+            </a:r>
+            <a:endParaRPr lang="en-US" sz="3200" dirty="0">
+              <a:solidFill>
+                <a:schemeClr val="bg1"/>
+              </a:solidFill>
+              <a:latin typeface="Consolas" panose="020B0609020204030204" pitchFamily="49" charset="0"/>
+              <a:cs typeface="Consolas" panose="020B0609020204030204" pitchFamily="49" charset="0"/>
+            </a:endParaRPr>
+          </a:p>
+        </p:txBody>
+      </p:sp>
+      <p:sp>
+        <p:nvSpPr>
+          <p:cNvPr id="3" name="Title 2">
+            <a:extLst>
+              <a:ext uri="{FF2B5EF4-FFF2-40B4-BE49-F238E27FC236}">
+                <a16:creationId xmlns:a16="http://schemas.microsoft.com/office/drawing/2014/main" id="{D15EB54C-81C6-49E6-9276-55A7C993AFE0}"/>
+              </a:ext>
+            </a:extLst>
+          </p:cNvPr>
+          <p:cNvSpPr>
+            <a:spLocks noGrp="1"/>
+          </p:cNvSpPr>
+          <p:nvPr>
+            <p:ph type="title"/>
+          </p:nvPr>
+        </p:nvSpPr>
+        <p:spPr>
+          <a:xfrm>
+            <a:off x="1281000" y="240800"/>
+            <a:ext cx="8625520" cy="882654"/>
+          </a:xfrm>
+        </p:spPr>
+        <p:txBody>
+          <a:bodyPr/>
+          <a:lstStyle/>
+          <a:p>
+            <a:r>
+              <a:rPr lang="bg-BG" dirty="0"/>
+              <a:t>Какво представляват изключенията</a:t>
+            </a:r>
+            <a:r>
+              <a:rPr lang="en-US" dirty="0"/>
+              <a:t>?</a:t>
+            </a:r>
+          </a:p>
+        </p:txBody>
+      </p:sp>
+      <p:sp>
+        <p:nvSpPr>
           <p:cNvPr id="8" name="Text Placeholder 4">
             <a:extLst>
               <a:ext uri="{FF2B5EF4-FFF2-40B4-BE49-F238E27FC236}">
@@ -15831,8 +17463,8 @@
         </p:nvSpPr>
         <p:spPr bwMode="auto">
           <a:xfrm>
-            <a:off x="2505664" y="4234463"/>
-            <a:ext cx="8988931" cy="2298729"/>
+            <a:off x="2839130" y="3699000"/>
+            <a:ext cx="8270336" cy="2298694"/>
           </a:xfrm>
           <a:prstGeom prst="rect">
             <a:avLst/>
@@ -16275,7 +17907,7 @@
             <a:fld id="{2BF067CD-8E6B-4360-9AA8-C5DF2A48A6D1}" type="slidenum">
               <a:rPr lang="en-US" smtClean="0"/>
               <a:pPr/>
-              <a:t>19</a:t>
+              <a:t>20</a:t>
             </a:fld>
             <a:endParaRPr lang="en-US" noProof="0" dirty="0"/>
           </a:p>
@@ -16284,18 +17916,18 @@
     </p:spTree>
     <p:extLst>
       <p:ext uri="{BB962C8B-B14F-4D97-AF65-F5344CB8AC3E}">
-        <p14:creationId xmlns:p14="http://schemas.microsoft.com/office/powerpoint/2010/main" val="372200594"/>
+        <p14:creationId xmlns:p14="http://schemas.microsoft.com/office/powerpoint/2010/main" val="1740617505"/>
       </p:ext>
     </p:extLst>
   </p:cSld>
   <p:clrMapOvr>
     <a:masterClrMapping/>
   </p:clrMapOvr>
-  <mc:AlternateContent xmlns:mc="http://schemas.openxmlformats.org/markup-compatibility/2006" xmlns:p14="http://schemas.microsoft.com/office/powerpoint/2010/main">
-    <mc:Choice Requires="p14">
+  <mc:AlternateContent xmlns:mc="http://schemas.openxmlformats.org/markup-compatibility/2006">
+    <mc:Choice xmlns:p14="http://schemas.microsoft.com/office/powerpoint/2010/main" Requires="p14">
       <p:transition p14:dur="0" advClick="0" advTm="5000"/>
     </mc:Choice>
-    <mc:Fallback xmlns="">
+    <mc:Fallback>
       <p:transition advClick="0" advTm="5000"/>
     </mc:Fallback>
   </mc:AlternateContent>
@@ -16335,36 +17967,9 @@
                                         <p:tgtEl>
                                           <p:spTgt spid="2">
                                             <p:txEl>
-                                              <p:pRg st="1" end="1"/>
+                                              <p:pRg st="0" end="0"/>
                                             </p:txEl>
                                           </p:spTgt>
-                                        </p:tgtEl>
-                                        <p:attrNameLst>
-                                          <p:attrName>style.visibility</p:attrName>
-                                        </p:attrNameLst>
-                                      </p:cBhvr>
-                                      <p:to>
-                                        <p:strVal val="visible"/>
-                                      </p:to>
-                                    </p:set>
-                                  </p:childTnLst>
-                                </p:cTn>
-                              </p:par>
-                              <p:par>
-                                <p:cTn id="7" presetID="1" presetClass="entr" presetSubtype="0" fill="hold" grpId="0" nodeType="withEffect">
-                                  <p:stCondLst>
-                                    <p:cond delay="0"/>
-                                  </p:stCondLst>
-                                  <p:childTnLst>
-                                    <p:set>
-                                      <p:cBhvr>
-                                        <p:cTn id="8" dur="1" fill="hold">
-                                          <p:stCondLst>
-                                            <p:cond delay="0"/>
-                                          </p:stCondLst>
-                                        </p:cTn>
-                                        <p:tgtEl>
-                                          <p:spTgt spid="6"/>
                                         </p:tgtEl>
                                         <p:attrNameLst>
                                           <p:attrName>style.visibility</p:attrName>
@@ -16384,26 +17989,26 @@
                     </p:cTn>
                   </p:par>
                   <p:par>
-                    <p:cTn id="9" fill="hold">
+                    <p:cTn id="7" fill="hold">
                       <p:stCondLst>
                         <p:cond delay="indefinite"/>
                       </p:stCondLst>
                       <p:childTnLst>
                         <p:par>
-                          <p:cTn id="10" fill="hold">
+                          <p:cTn id="8" fill="hold">
                             <p:stCondLst>
                               <p:cond delay="0"/>
                             </p:stCondLst>
                             <p:childTnLst>
                               <p:par>
-                                <p:cTn id="11" presetID="1" presetClass="entr" presetSubtype="0" fill="hold" nodeType="clickEffect">
+                                <p:cTn id="9" presetID="1" presetClass="entr" presetSubtype="0" fill="hold" nodeType="clickEffect">
                                   <p:stCondLst>
                                     <p:cond delay="0"/>
                                   </p:stCondLst>
                                   <p:childTnLst>
                                     <p:set>
                                       <p:cBhvr>
-                                        <p:cTn id="12" dur="1" fill="hold">
+                                        <p:cTn id="10" dur="1" fill="hold">
                                           <p:stCondLst>
                                             <p:cond delay="0"/>
                                           </p:stCondLst>
@@ -16411,7 +18016,7 @@
                                         <p:tgtEl>
                                           <p:spTgt spid="2">
                                             <p:txEl>
-                                              <p:pRg st="4" end="4"/>
+                                              <p:pRg st="1" end="1"/>
                                             </p:txEl>
                                           </p:spTgt>
                                         </p:tgtEl>
@@ -16427,14 +18032,14 @@
                                 </p:cTn>
                               </p:par>
                               <p:par>
-                                <p:cTn id="13" presetID="1" presetClass="entr" presetSubtype="0" fill="hold" grpId="0" nodeType="withEffect">
+                                <p:cTn id="11" presetID="1" presetClass="entr" presetSubtype="0" fill="hold" grpId="0" nodeType="withEffect">
                                   <p:stCondLst>
                                     <p:cond delay="0"/>
                                   </p:stCondLst>
                                   <p:childTnLst>
                                     <p:set>
                                       <p:cBhvr>
-                                        <p:cTn id="14" dur="1" fill="hold">
+                                        <p:cTn id="12" dur="1" fill="hold">
                                           <p:stCondLst>
                                             <p:cond delay="0"/>
                                           </p:stCondLst>
@@ -16481,377 +18086,13 @@
       </p:par>
     </p:tnLst>
     <p:bldLst>
-      <p:bldP spid="6" grpId="0" animBg="1"/>
       <p:bldP spid="8" grpId="0" animBg="1"/>
     </p:bldLst>
   </p:timing>
 </p:sld>
 </file>
 
-<file path=ppt/slides/slide2.xml><?xml version="1.0" encoding="utf-8"?>
-<p:sld xmlns:a="http://schemas.openxmlformats.org/drawingml/2006/main" xmlns:r="http://schemas.openxmlformats.org/officeDocument/2006/relationships" xmlns:p="http://schemas.openxmlformats.org/presentationml/2006/main">
-  <p:cSld>
-    <p:spTree>
-      <p:nvGrpSpPr>
-        <p:cNvPr id="1" name=""/>
-        <p:cNvGrpSpPr/>
-        <p:nvPr/>
-      </p:nvGrpSpPr>
-      <p:grpSpPr>
-        <a:xfrm>
-          <a:off x="0" y="0"/>
-          <a:ext cx="0" cy="0"/>
-          <a:chOff x="0" y="0"/>
-          <a:chExt cx="0" cy="0"/>
-        </a:xfrm>
-      </p:grpSpPr>
-      <p:sp>
-        <p:nvSpPr>
-          <p:cNvPr id="423939" name="Rectangle 3"/>
-          <p:cNvSpPr>
-            <a:spLocks noGrp="1" noChangeArrowheads="1"/>
-          </p:cNvSpPr>
-          <p:nvPr>
-            <p:ph type="body" sz="quarter" idx="10"/>
-          </p:nvPr>
-        </p:nvSpPr>
-        <p:spPr>
-          <a:xfrm>
-            <a:off x="190406" y="664617"/>
-            <a:ext cx="11818096" cy="5528766"/>
-          </a:xfrm>
-        </p:spPr>
-        <p:txBody>
-          <a:bodyPr/>
-          <a:lstStyle/>
-          <a:p>
-            <a:pPr marL="0" indent="0">
-              <a:buNone/>
-            </a:pPr>
-            <a:endParaRPr lang="bg-BG" sz="4000" dirty="0"/>
-          </a:p>
-          <a:p>
-            <a:pPr marL="742950" indent="-742950">
-              <a:buFont typeface="+mj-lt"/>
-              <a:buAutoNum type="arabicPeriod"/>
-            </a:pPr>
-            <a:r>
-              <a:rPr lang="bg-BG" sz="4000" dirty="0"/>
-              <a:t>Какво е енкапсулация</a:t>
-            </a:r>
-            <a:r>
-              <a:rPr lang="en-US" sz="4000" dirty="0"/>
-              <a:t>?</a:t>
-            </a:r>
-          </a:p>
-          <a:p>
-            <a:pPr marL="742950" indent="-742950">
-              <a:buFont typeface="+mj-lt"/>
-              <a:buAutoNum type="arabicPeriod"/>
-            </a:pPr>
-            <a:r>
-              <a:rPr lang="bg-BG" sz="4000" dirty="0"/>
-              <a:t>Модификатори</a:t>
-            </a:r>
-            <a:r>
-              <a:rPr lang="en-US" sz="4000" dirty="0"/>
-              <a:t> </a:t>
-            </a:r>
-            <a:r>
-              <a:rPr lang="bg-BG" sz="4000" dirty="0"/>
-              <a:t>за достъп</a:t>
-            </a:r>
-            <a:endParaRPr lang="en-US" sz="4000" dirty="0"/>
-          </a:p>
-          <a:p>
-            <a:pPr marL="742950" indent="-742950">
-              <a:buFont typeface="+mj-lt"/>
-              <a:buAutoNum type="arabicPeriod"/>
-            </a:pPr>
-            <a:r>
-              <a:rPr lang="bg-BG" sz="4000" dirty="0"/>
-              <a:t>Валидация </a:t>
-            </a:r>
-          </a:p>
-          <a:p>
-            <a:pPr marL="742950" indent="-742950">
-              <a:buFont typeface="+mj-lt"/>
-              <a:buAutoNum type="arabicPeriod"/>
-            </a:pPr>
-            <a:r>
-              <a:rPr lang="bg-BG" sz="4000" dirty="0"/>
-              <a:t>Променими и непроменими обекти</a:t>
-            </a:r>
-            <a:endParaRPr lang="en-US" sz="4000" dirty="0"/>
-          </a:p>
-          <a:p>
-            <a:endParaRPr lang="en-US" noProof="1"/>
-          </a:p>
-        </p:txBody>
-      </p:sp>
-      <p:sp>
-        <p:nvSpPr>
-          <p:cNvPr id="423938" name="Rectangle 2"/>
-          <p:cNvSpPr>
-            <a:spLocks noGrp="1" noChangeArrowheads="1"/>
-          </p:cNvSpPr>
-          <p:nvPr>
-            <p:ph type="title"/>
-          </p:nvPr>
-        </p:nvSpPr>
-        <p:spPr/>
-        <p:txBody>
-          <a:bodyPr/>
-          <a:lstStyle/>
-          <a:p>
-            <a:r>
-              <a:rPr lang="bg-BG" dirty="0"/>
-              <a:t>Съдържание</a:t>
-            </a:r>
-          </a:p>
-        </p:txBody>
-      </p:sp>
-      <p:sp>
-        <p:nvSpPr>
-          <p:cNvPr id="5" name="Slide Number">
-            <a:extLst>
-              <a:ext uri="{FF2B5EF4-FFF2-40B4-BE49-F238E27FC236}">
-                <a16:creationId xmlns:a16="http://schemas.microsoft.com/office/drawing/2014/main" id="{D813CDB2-A6DC-4174-9AED-EAB79BDC01C9}"/>
-              </a:ext>
-            </a:extLst>
-          </p:cNvPr>
-          <p:cNvSpPr>
-            <a:spLocks noGrp="1"/>
-          </p:cNvSpPr>
-          <p:nvPr>
-            <p:ph type="sldNum" sz="quarter" idx="5"/>
-          </p:nvPr>
-        </p:nvSpPr>
-        <p:spPr>
-          <a:xfrm>
-            <a:off x="11753030" y="6507000"/>
-            <a:ext cx="367414" cy="297000"/>
-          </a:xfrm>
-          <a:prstGeom prst="rect">
-            <a:avLst/>
-          </a:prstGeom>
-        </p:spPr>
-        <p:txBody>
-          <a:bodyPr vert="horz" lIns="91440" tIns="45720" rIns="91440" bIns="45720" rtlCol="0" anchor="b"/>
-          <a:lstStyle>
-            <a:lvl1pPr algn="r">
-              <a:defRPr sz="1000"/>
-            </a:lvl1pPr>
-          </a:lstStyle>
-          <a:p>
-            <a:fld id="{2BF067CD-8E6B-4360-9AA8-C5DF2A48A6D1}" type="slidenum">
-              <a:rPr lang="en-US" noProof="0" smtClean="0"/>
-              <a:pPr/>
-              <a:t>2</a:t>
-            </a:fld>
-            <a:endParaRPr lang="en-US" noProof="0" dirty="0"/>
-          </a:p>
-        </p:txBody>
-      </p:sp>
-    </p:spTree>
-    <p:extLst>
-      <p:ext uri="{BB962C8B-B14F-4D97-AF65-F5344CB8AC3E}">
-        <p14:creationId xmlns:p14="http://schemas.microsoft.com/office/powerpoint/2010/main" val="859700777"/>
-      </p:ext>
-    </p:extLst>
-  </p:cSld>
-  <p:clrMapOvr>
-    <a:masterClrMapping/>
-  </p:clrMapOvr>
-  <mc:AlternateContent xmlns:mc="http://schemas.openxmlformats.org/markup-compatibility/2006" xmlns:p14="http://schemas.microsoft.com/office/powerpoint/2010/main">
-    <mc:Choice Requires="p14">
-      <p:transition p14:dur="0"/>
-    </mc:Choice>
-    <mc:Fallback xmlns="">
-      <p:transition/>
-    </mc:Fallback>
-  </mc:AlternateContent>
-  <p:timing>
-    <p:tnLst>
-      <p:par>
-        <p:cTn id="1" dur="indefinite" restart="never" nodeType="tmRoot">
-          <p:childTnLst>
-            <p:seq concurrent="1" nextAc="seek">
-              <p:cTn id="2" dur="indefinite" nodeType="mainSeq">
-                <p:childTnLst>
-                  <p:par>
-                    <p:cTn id="3" fill="hold">
-                      <p:stCondLst>
-                        <p:cond delay="indefinite"/>
-                      </p:stCondLst>
-                      <p:childTnLst>
-                        <p:par>
-                          <p:cTn id="4" fill="hold">
-                            <p:stCondLst>
-                              <p:cond delay="0"/>
-                            </p:stCondLst>
-                            <p:childTnLst>
-                              <p:par>
-                                <p:cTn id="5" presetID="1" presetClass="entr" presetSubtype="0" fill="hold" nodeType="clickEffect">
-                                  <p:stCondLst>
-                                    <p:cond delay="0"/>
-                                  </p:stCondLst>
-                                  <p:childTnLst>
-                                    <p:set>
-                                      <p:cBhvr>
-                                        <p:cTn id="6" dur="1" fill="hold">
-                                          <p:stCondLst>
-                                            <p:cond delay="0"/>
-                                          </p:stCondLst>
-                                        </p:cTn>
-                                        <p:tgtEl>
-                                          <p:spTgt spid="423939">
-                                            <p:txEl>
-                                              <p:pRg st="2" end="2"/>
-                                            </p:txEl>
-                                          </p:spTgt>
-                                        </p:tgtEl>
-                                        <p:attrNameLst>
-                                          <p:attrName>style.visibility</p:attrName>
-                                        </p:attrNameLst>
-                                      </p:cBhvr>
-                                      <p:to>
-                                        <p:strVal val="visible"/>
-                                      </p:to>
-                                    </p:set>
-                                  </p:childTnLst>
-                                </p:cTn>
-                              </p:par>
-                            </p:childTnLst>
-                          </p:cTn>
-                        </p:par>
-                      </p:childTnLst>
-                    </p:cTn>
-                  </p:par>
-                  <p:par>
-                    <p:cTn id="7" fill="hold">
-                      <p:stCondLst>
-                        <p:cond delay="indefinite"/>
-                      </p:stCondLst>
-                      <p:childTnLst>
-                        <p:par>
-                          <p:cTn id="8" fill="hold">
-                            <p:stCondLst>
-                              <p:cond delay="0"/>
-                            </p:stCondLst>
-                            <p:childTnLst>
-                              <p:par>
-                                <p:cTn id="9" presetID="1" presetClass="entr" presetSubtype="0" fill="hold" nodeType="clickEffect">
-                                  <p:stCondLst>
-                                    <p:cond delay="0"/>
-                                  </p:stCondLst>
-                                  <p:childTnLst>
-                                    <p:set>
-                                      <p:cBhvr>
-                                        <p:cTn id="10" dur="1" fill="hold">
-                                          <p:stCondLst>
-                                            <p:cond delay="0"/>
-                                          </p:stCondLst>
-                                        </p:cTn>
-                                        <p:tgtEl>
-                                          <p:spTgt spid="423939">
-                                            <p:txEl>
-                                              <p:pRg st="3" end="3"/>
-                                            </p:txEl>
-                                          </p:spTgt>
-                                        </p:tgtEl>
-                                        <p:attrNameLst>
-                                          <p:attrName>style.visibility</p:attrName>
-                                        </p:attrNameLst>
-                                      </p:cBhvr>
-                                      <p:to>
-                                        <p:strVal val="visible"/>
-                                      </p:to>
-                                    </p:set>
-                                  </p:childTnLst>
-                                </p:cTn>
-                              </p:par>
-                            </p:childTnLst>
-                          </p:cTn>
-                        </p:par>
-                      </p:childTnLst>
-                    </p:cTn>
-                  </p:par>
-                  <p:par>
-                    <p:cTn id="11" fill="hold">
-                      <p:stCondLst>
-                        <p:cond delay="indefinite"/>
-                      </p:stCondLst>
-                      <p:childTnLst>
-                        <p:par>
-                          <p:cTn id="12" fill="hold">
-                            <p:stCondLst>
-                              <p:cond delay="0"/>
-                            </p:stCondLst>
-                            <p:childTnLst>
-                              <p:par>
-                                <p:cTn id="13" presetID="1" presetClass="entr" presetSubtype="0" fill="hold" nodeType="clickEffect">
-                                  <p:stCondLst>
-                                    <p:cond delay="0"/>
-                                  </p:stCondLst>
-                                  <p:childTnLst>
-                                    <p:set>
-                                      <p:cBhvr>
-                                        <p:cTn id="14" dur="1" fill="hold">
-                                          <p:stCondLst>
-                                            <p:cond delay="0"/>
-                                          </p:stCondLst>
-                                        </p:cTn>
-                                        <p:tgtEl>
-                                          <p:spTgt spid="423939">
-                                            <p:txEl>
-                                              <p:pRg st="4" end="4"/>
-                                            </p:txEl>
-                                          </p:spTgt>
-                                        </p:tgtEl>
-                                        <p:attrNameLst>
-                                          <p:attrName>style.visibility</p:attrName>
-                                        </p:attrNameLst>
-                                      </p:cBhvr>
-                                      <p:to>
-                                        <p:strVal val="visible"/>
-                                      </p:to>
-                                    </p:set>
-                                  </p:childTnLst>
-                                </p:cTn>
-                              </p:par>
-                            </p:childTnLst>
-                          </p:cTn>
-                        </p:par>
-                      </p:childTnLst>
-                    </p:cTn>
-                  </p:par>
-                </p:childTnLst>
-              </p:cTn>
-              <p:prevCondLst>
-                <p:cond evt="onPrev" delay="0">
-                  <p:tgtEl>
-                    <p:sldTgt/>
-                  </p:tgtEl>
-                </p:cond>
-              </p:prevCondLst>
-              <p:nextCondLst>
-                <p:cond evt="onNext" delay="0">
-                  <p:tgtEl>
-                    <p:sldTgt/>
-                  </p:tgtEl>
-                </p:cond>
-              </p:nextCondLst>
-            </p:seq>
-          </p:childTnLst>
-        </p:cTn>
-      </p:par>
-    </p:tnLst>
-  </p:timing>
-</p:sld>
-</file>
-
-<file path=ppt/slides/slide20.xml><?xml version="1.0" encoding="utf-8"?>
+<file path=ppt/slides/slide21.xml><?xml version="1.0" encoding="utf-8"?>
 <p:sld xmlns:a="http://schemas.openxmlformats.org/drawingml/2006/main" xmlns:r="http://schemas.openxmlformats.org/officeDocument/2006/relationships" xmlns:p="http://schemas.openxmlformats.org/presentationml/2006/main">
   <p:cSld>
     <p:spTree>
@@ -16884,10 +18125,9 @@
           <a:lstStyle/>
           <a:p>
             <a:r>
-              <a:rPr lang="en-US" sz="3799"/>
-              <a:t>Throwing Exceptions – Example</a:t>
-            </a:r>
-            <a:endParaRPr lang="bg-BG" sz="3799" dirty="0"/>
+              <a:rPr lang="bg-BG" sz="3799" dirty="0"/>
+              <a:t>Хвърляне на изключения - пример</a:t>
+            </a:r>
           </a:p>
         </p:txBody>
       </p:sp>
@@ -17311,7 +18551,7 @@
             <a:fld id="{2BF067CD-8E6B-4360-9AA8-C5DF2A48A6D1}" type="slidenum">
               <a:rPr lang="en-US" noProof="0" smtClean="0"/>
               <a:pPr/>
-              <a:t>20</a:t>
+              <a:t>21</a:t>
             </a:fld>
             <a:endParaRPr lang="en-US" noProof="0" dirty="0"/>
           </a:p>
@@ -17719,7 +18959,7 @@
 </p:sld>
 </file>
 
-<file path=ppt/slides/slide21.xml><?xml version="1.0" encoding="utf-8"?>
+<file path=ppt/slides/slide22.xml><?xml version="1.0" encoding="utf-8"?>
 <p:sld xmlns:a="http://schemas.openxmlformats.org/drawingml/2006/main" xmlns:r="http://schemas.openxmlformats.org/officeDocument/2006/relationships" xmlns:p="http://schemas.openxmlformats.org/presentationml/2006/main">
   <p:cSld>
     <p:spTree>
@@ -17856,7 +19096,7 @@
 </p:sld>
 </file>
 
-<file path=ppt/slides/slide22.xml><?xml version="1.0" encoding="utf-8"?>
+<file path=ppt/slides/slide23.xml><?xml version="1.0" encoding="utf-8"?>
 <p:sld xmlns:a="http://schemas.openxmlformats.org/drawingml/2006/main" xmlns:r="http://schemas.openxmlformats.org/officeDocument/2006/relationships" xmlns:p="http://schemas.openxmlformats.org/presentationml/2006/main">
   <p:cSld>
     <p:spTree>
@@ -18345,7 +19585,7 @@
             <a:fld id="{2BF067CD-8E6B-4360-9AA8-C5DF2A48A6D1}" type="slidenum">
               <a:rPr lang="en-US" noProof="0" smtClean="0"/>
               <a:pPr/>
-              <a:t>22</a:t>
+              <a:t>23</a:t>
             </a:fld>
             <a:endParaRPr lang="en-US" noProof="0" dirty="0"/>
           </a:p>
@@ -18561,7 +19801,7 @@
 </p:sld>
 </file>
 
-<file path=ppt/slides/slide23.xml><?xml version="1.0" encoding="utf-8"?>
+<file path=ppt/slides/slide24.xml><?xml version="1.0" encoding="utf-8"?>
 <p:sld xmlns:a="http://schemas.openxmlformats.org/drawingml/2006/main" xmlns:r="http://schemas.openxmlformats.org/officeDocument/2006/relationships" xmlns:p="http://schemas.openxmlformats.org/presentationml/2006/main">
   <p:cSld>
     <p:spTree>
@@ -18976,7 +20216,7 @@
             <a:fld id="{2BF067CD-8E6B-4360-9AA8-C5DF2A48A6D1}" type="slidenum">
               <a:rPr lang="en-US" noProof="0" smtClean="0"/>
               <a:pPr/>
-              <a:t>23</a:t>
+              <a:t>24</a:t>
             </a:fld>
             <a:endParaRPr lang="en-US" noProof="0" dirty="0"/>
           </a:p>
@@ -19176,7 +20416,7 @@
 </p:sld>
 </file>
 
-<file path=ppt/slides/slide24.xml><?xml version="1.0" encoding="utf-8"?>
+<file path=ppt/slides/slide25.xml><?xml version="1.0" encoding="utf-8"?>
 <p:sld xmlns:a="http://schemas.openxmlformats.org/drawingml/2006/main" xmlns:r="http://schemas.openxmlformats.org/officeDocument/2006/relationships" xmlns:p="http://schemas.openxmlformats.org/presentationml/2006/main">
   <p:cSld>
     <p:spTree>
@@ -19666,7 +20906,7 @@
             <a:fld id="{2BF067CD-8E6B-4360-9AA8-C5DF2A48A6D1}" type="slidenum">
               <a:rPr lang="en-US" noProof="0" smtClean="0"/>
               <a:pPr/>
-              <a:t>24</a:t>
+              <a:t>25</a:t>
             </a:fld>
             <a:endParaRPr lang="en-US" noProof="0" dirty="0"/>
           </a:p>
@@ -19963,7 +21203,7 @@
 </p:sld>
 </file>
 
-<file path=ppt/slides/slide25.xml><?xml version="1.0" encoding="utf-8"?>
+<file path=ppt/slides/slide26.xml><?xml version="1.0" encoding="utf-8"?>
 <p:sld xmlns:a="http://schemas.openxmlformats.org/drawingml/2006/main" xmlns:r="http://schemas.openxmlformats.org/officeDocument/2006/relationships" xmlns:p="http://schemas.openxmlformats.org/presentationml/2006/main">
   <p:cSld>
     <p:spTree>
@@ -20277,8 +21517,21 @@
                   <a:schemeClr val="accent2"/>
                 </a:solidFill>
               </a:rPr>
-              <a:t> Add validation for the rest</a:t>
-            </a:r>
+              <a:t> </a:t>
+            </a:r>
+            <a:r>
+              <a:rPr lang="bg-BG" sz="2600" i="1" dirty="0">
+                <a:solidFill>
+                  <a:schemeClr val="accent2"/>
+                </a:solidFill>
+              </a:rPr>
+              <a:t>Добавете валидация за останалите</a:t>
+            </a:r>
+            <a:endParaRPr lang="en-US" sz="2600" i="1" dirty="0">
+              <a:solidFill>
+                <a:schemeClr val="accent2"/>
+              </a:solidFill>
+            </a:endParaRPr>
           </a:p>
         </p:txBody>
       </p:sp>
@@ -20365,7 +21618,7 @@
             <a:fld id="{2BF067CD-8E6B-4360-9AA8-C5DF2A48A6D1}" type="slidenum">
               <a:rPr lang="en-US" noProof="0" smtClean="0"/>
               <a:pPr/>
-              <a:t>25</a:t>
+              <a:t>26</a:t>
             </a:fld>
             <a:endParaRPr lang="en-US" noProof="0" dirty="0"/>
           </a:p>
@@ -20693,7 +21946,7 @@
 </p:sld>
 </file>
 
-<file path=ppt/slides/slide26.xml><?xml version="1.0" encoding="utf-8"?>
+<file path=ppt/slides/slide27.xml><?xml version="1.0" encoding="utf-8"?>
 <p:sld xmlns:a="http://schemas.openxmlformats.org/drawingml/2006/main" xmlns:r="http://schemas.openxmlformats.org/officeDocument/2006/relationships" xmlns:p="http://schemas.openxmlformats.org/presentationml/2006/main">
   <p:cSld>
     <p:spTree>
@@ -21344,7 +22597,7 @@
 </p:sld>
 </file>
 
-<file path=ppt/slides/slide27.xml><?xml version="1.0" encoding="utf-8"?>
+<file path=ppt/slides/slide28.xml><?xml version="1.0" encoding="utf-8"?>
 <p:sld xmlns:a="http://schemas.openxmlformats.org/drawingml/2006/main" xmlns:r="http://schemas.openxmlformats.org/officeDocument/2006/relationships" xmlns:p="http://schemas.openxmlformats.org/presentationml/2006/main">
   <p:cSld>
     <p:spTree>
@@ -21754,7 +23007,7 @@
             <a:fld id="{2BF067CD-8E6B-4360-9AA8-C5DF2A48A6D1}" type="slidenum">
               <a:rPr lang="en-US" smtClean="0"/>
               <a:pPr/>
-              <a:t>27</a:t>
+              <a:t>28</a:t>
             </a:fld>
             <a:endParaRPr lang="en-US" dirty="0"/>
           </a:p>
@@ -22007,7 +23260,7 @@
 </p:sld>
 </file>
 
-<file path=ppt/slides/slide28.xml><?xml version="1.0" encoding="utf-8"?>
+<file path=ppt/slides/slide29.xml><?xml version="1.0" encoding="utf-8"?>
 <p:sld xmlns:a="http://schemas.openxmlformats.org/drawingml/2006/main" xmlns:r="http://schemas.openxmlformats.org/officeDocument/2006/relationships" xmlns:p="http://schemas.openxmlformats.org/presentationml/2006/main">
   <p:cSld>
     <p:spTree>
@@ -22161,6 +23414,9 @@
           </a:p>
           <a:p>
             <a:pPr>
+              <a:spcBef>
+                <a:spcPts val="300"/>
+              </a:spcBef>
               <a:buClr>
                 <a:schemeClr val="tx1"/>
               </a:buClr>
@@ -22470,7 +23726,7 @@
             <a:fld id="{2BF067CD-8E6B-4360-9AA8-C5DF2A48A6D1}" type="slidenum">
               <a:rPr lang="en-US" noProof="0" smtClean="0"/>
               <a:pPr/>
-              <a:t>28</a:t>
+              <a:t>29</a:t>
             </a:fld>
             <a:endParaRPr lang="en-US" noProof="0" dirty="0"/>
           </a:p>
@@ -22624,7 +23880,113 @@
 </p:sld>
 </file>
 
-<file path=ppt/slides/slide29.xml><?xml version="1.0" encoding="utf-8"?>
+<file path=ppt/slides/slide3.xml><?xml version="1.0" encoding="utf-8"?>
+<p:sld xmlns:a="http://schemas.openxmlformats.org/drawingml/2006/main" xmlns:r="http://schemas.openxmlformats.org/officeDocument/2006/relationships" xmlns:p="http://schemas.openxmlformats.org/presentationml/2006/main">
+  <p:cSld>
+    <p:spTree>
+      <p:nvGrpSpPr>
+        <p:cNvPr id="1" name=""/>
+        <p:cNvGrpSpPr/>
+        <p:nvPr/>
+      </p:nvGrpSpPr>
+      <p:grpSpPr>
+        <a:xfrm>
+          <a:off x="0" y="0"/>
+          <a:ext cx="0" cy="0"/>
+          <a:chOff x="0" y="0"/>
+          <a:chExt cx="0" cy="0"/>
+        </a:xfrm>
+      </p:grpSpPr>
+      <p:sp>
+        <p:nvSpPr>
+          <p:cNvPr id="5" name="Title 4">
+            <a:extLst>
+              <a:ext uri="{FF2B5EF4-FFF2-40B4-BE49-F238E27FC236}">
+                <a16:creationId xmlns:a16="http://schemas.microsoft.com/office/drawing/2014/main" id="{D0486905-80AF-4B7E-BC5B-2EBA1C26D4B9}"/>
+              </a:ext>
+            </a:extLst>
+          </p:cNvPr>
+          <p:cNvSpPr>
+            <a:spLocks noGrp="1"/>
+          </p:cNvSpPr>
+          <p:nvPr>
+            <p:ph type="title" sz="quarter" idx="10"/>
+          </p:nvPr>
+        </p:nvSpPr>
+        <p:spPr/>
+        <p:txBody>
+          <a:bodyPr/>
+          <a:lstStyle/>
+          <a:p>
+            <a:r>
+              <a:rPr lang="bg-BG" dirty="0"/>
+              <a:t>Скриване на имплементацията</a:t>
+            </a:r>
+            <a:endParaRPr lang="en-US" dirty="0"/>
+          </a:p>
+        </p:txBody>
+      </p:sp>
+      <p:pic>
+        <p:nvPicPr>
+          <p:cNvPr id="6" name="Picture 5" descr="Object-Oriented Programming in Java"/>
+          <p:cNvPicPr>
+            <a:picLocks noChangeAspect="1" noChangeArrowheads="1"/>
+          </p:cNvPicPr>
+          <p:nvPr/>
+        </p:nvPicPr>
+        <p:blipFill rotWithShape="1">
+          <a:blip r:embed="rId3">
+            <a:extLst>
+              <a:ext uri="{28A0092B-C50C-407E-A947-70E740481C1C}">
+                <a14:useLocalDpi xmlns:a14="http://schemas.microsoft.com/office/drawing/2010/main" val="0"/>
+              </a:ext>
+            </a:extLst>
+          </a:blip>
+          <a:srcRect l="16303" r="16467" b="7622"/>
+          <a:stretch/>
+        </p:blipFill>
+        <p:spPr bwMode="auto">
+          <a:xfrm>
+            <a:off x="4431000" y="1134000"/>
+            <a:ext cx="3375000" cy="2674229"/>
+          </a:xfrm>
+          <a:prstGeom prst="rect">
+            <a:avLst/>
+          </a:prstGeom>
+          <a:noFill/>
+          <a:extLst>
+            <a:ext uri="{909E8E84-426E-40DD-AFC4-6F175D3DCCD1}">
+              <a14:hiddenFill xmlns:a14="http://schemas.microsoft.com/office/drawing/2010/main">
+                <a:solidFill>
+                  <a:srgbClr val="FFFFFF"/>
+                </a:solidFill>
+              </a14:hiddenFill>
+            </a:ext>
+          </a:extLst>
+        </p:spPr>
+      </p:pic>
+    </p:spTree>
+    <p:extLst>
+      <p:ext uri="{BB962C8B-B14F-4D97-AF65-F5344CB8AC3E}">
+        <p14:creationId xmlns:p14="http://schemas.microsoft.com/office/powerpoint/2010/main" val="3712073252"/>
+      </p:ext>
+    </p:extLst>
+  </p:cSld>
+  <p:clrMapOvr>
+    <a:masterClrMapping/>
+  </p:clrMapOvr>
+  <mc:AlternateContent xmlns:mc="http://schemas.openxmlformats.org/markup-compatibility/2006" xmlns:p14="http://schemas.microsoft.com/office/powerpoint/2010/main">
+    <mc:Choice Requires="p14">
+      <p:transition p14:dur="0" advClick="0" advTm="5000"/>
+    </mc:Choice>
+    <mc:Fallback xmlns="">
+      <p:transition advClick="0" advTm="5000"/>
+    </mc:Fallback>
+  </mc:AlternateContent>
+</p:sld>
+</file>
+
+<file path=ppt/slides/slide30.xml><?xml version="1.0" encoding="utf-8"?>
 <p:sld xmlns:a="http://schemas.openxmlformats.org/drawingml/2006/main" xmlns:r="http://schemas.openxmlformats.org/officeDocument/2006/relationships" xmlns:p="http://schemas.openxmlformats.org/presentationml/2006/main">
   <p:cSld>
     <p:spTree>
@@ -23072,7 +24434,7 @@
             <a:fld id="{2BF067CD-8E6B-4360-9AA8-C5DF2A48A6D1}" type="slidenum">
               <a:rPr lang="en-US" noProof="0" smtClean="0"/>
               <a:pPr/>
-              <a:t>29</a:t>
+              <a:t>30</a:t>
             </a:fld>
             <a:endParaRPr lang="en-US" noProof="0" dirty="0"/>
           </a:p>
@@ -23369,113 +24731,7 @@
 </p:sld>
 </file>
 
-<file path=ppt/slides/slide3.xml><?xml version="1.0" encoding="utf-8"?>
-<p:sld xmlns:a="http://schemas.openxmlformats.org/drawingml/2006/main" xmlns:r="http://schemas.openxmlformats.org/officeDocument/2006/relationships" xmlns:p="http://schemas.openxmlformats.org/presentationml/2006/main">
-  <p:cSld>
-    <p:spTree>
-      <p:nvGrpSpPr>
-        <p:cNvPr id="1" name=""/>
-        <p:cNvGrpSpPr/>
-        <p:nvPr/>
-      </p:nvGrpSpPr>
-      <p:grpSpPr>
-        <a:xfrm>
-          <a:off x="0" y="0"/>
-          <a:ext cx="0" cy="0"/>
-          <a:chOff x="0" y="0"/>
-          <a:chExt cx="0" cy="0"/>
-        </a:xfrm>
-      </p:grpSpPr>
-      <p:sp>
-        <p:nvSpPr>
-          <p:cNvPr id="5" name="Title 4">
-            <a:extLst>
-              <a:ext uri="{FF2B5EF4-FFF2-40B4-BE49-F238E27FC236}">
-                <a16:creationId xmlns:a16="http://schemas.microsoft.com/office/drawing/2014/main" id="{D0486905-80AF-4B7E-BC5B-2EBA1C26D4B9}"/>
-              </a:ext>
-            </a:extLst>
-          </p:cNvPr>
-          <p:cNvSpPr>
-            <a:spLocks noGrp="1"/>
-          </p:cNvSpPr>
-          <p:nvPr>
-            <p:ph type="title" sz="quarter" idx="10"/>
-          </p:nvPr>
-        </p:nvSpPr>
-        <p:spPr/>
-        <p:txBody>
-          <a:bodyPr/>
-          <a:lstStyle/>
-          <a:p>
-            <a:r>
-              <a:rPr lang="bg-BG" dirty="0"/>
-              <a:t>Скриване на имплементацията</a:t>
-            </a:r>
-            <a:endParaRPr lang="en-US" dirty="0"/>
-          </a:p>
-        </p:txBody>
-      </p:sp>
-      <p:pic>
-        <p:nvPicPr>
-          <p:cNvPr id="6" name="Picture 5" descr="Object-Oriented Programming in Java"/>
-          <p:cNvPicPr>
-            <a:picLocks noChangeAspect="1" noChangeArrowheads="1"/>
-          </p:cNvPicPr>
-          <p:nvPr/>
-        </p:nvPicPr>
-        <p:blipFill rotWithShape="1">
-          <a:blip r:embed="rId3">
-            <a:extLst>
-              <a:ext uri="{28A0092B-C50C-407E-A947-70E740481C1C}">
-                <a14:useLocalDpi xmlns:a14="http://schemas.microsoft.com/office/drawing/2010/main" val="0"/>
-              </a:ext>
-            </a:extLst>
-          </a:blip>
-          <a:srcRect l="16303" r="16467" b="7622"/>
-          <a:stretch/>
-        </p:blipFill>
-        <p:spPr bwMode="auto">
-          <a:xfrm>
-            <a:off x="4431000" y="1134000"/>
-            <a:ext cx="3375000" cy="2674229"/>
-          </a:xfrm>
-          <a:prstGeom prst="rect">
-            <a:avLst/>
-          </a:prstGeom>
-          <a:noFill/>
-          <a:extLst>
-            <a:ext uri="{909E8E84-426E-40DD-AFC4-6F175D3DCCD1}">
-              <a14:hiddenFill xmlns:a14="http://schemas.microsoft.com/office/drawing/2010/main">
-                <a:solidFill>
-                  <a:srgbClr val="FFFFFF"/>
-                </a:solidFill>
-              </a14:hiddenFill>
-            </a:ext>
-          </a:extLst>
-        </p:spPr>
-      </p:pic>
-    </p:spTree>
-    <p:extLst>
-      <p:ext uri="{BB962C8B-B14F-4D97-AF65-F5344CB8AC3E}">
-        <p14:creationId xmlns:p14="http://schemas.microsoft.com/office/powerpoint/2010/main" val="3712073252"/>
-      </p:ext>
-    </p:extLst>
-  </p:cSld>
-  <p:clrMapOvr>
-    <a:masterClrMapping/>
-  </p:clrMapOvr>
-  <mc:AlternateContent xmlns:mc="http://schemas.openxmlformats.org/markup-compatibility/2006" xmlns:p14="http://schemas.microsoft.com/office/powerpoint/2010/main">
-    <mc:Choice Requires="p14">
-      <p:transition p14:dur="0" advClick="0" advTm="5000"/>
-    </mc:Choice>
-    <mc:Fallback xmlns="">
-      <p:transition advClick="0" advTm="5000"/>
-    </mc:Fallback>
-  </mc:AlternateContent>
-</p:sld>
-</file>
-
-<file path=ppt/slides/slide30.xml><?xml version="1.0" encoding="utf-8"?>
+<file path=ppt/slides/slide31.xml><?xml version="1.0" encoding="utf-8"?>
 <p:sld xmlns:a="http://schemas.openxmlformats.org/drawingml/2006/main" xmlns:r="http://schemas.openxmlformats.org/officeDocument/2006/relationships" xmlns:p="http://schemas.openxmlformats.org/presentationml/2006/main">
   <p:cSld>
     <p:spTree>
@@ -23961,7 +25217,7 @@
             <a:fld id="{2BF067CD-8E6B-4360-9AA8-C5DF2A48A6D1}" type="slidenum">
               <a:rPr lang="en-US" noProof="0" smtClean="0"/>
               <a:pPr/>
-              <a:t>30</a:t>
+              <a:t>31</a:t>
             </a:fld>
             <a:endParaRPr lang="en-US" noProof="0" dirty="0"/>
           </a:p>
@@ -24210,7 +25466,7 @@
 </p:sld>
 </file>
 
-<file path=ppt/slides/slide31.xml><?xml version="1.0" encoding="utf-8"?>
+<file path=ppt/slides/slide32.xml><?xml version="1.0" encoding="utf-8"?>
 <p:sld xmlns:a="http://schemas.openxmlformats.org/drawingml/2006/main" xmlns:r="http://schemas.openxmlformats.org/officeDocument/2006/relationships" xmlns:p="http://schemas.openxmlformats.org/presentationml/2006/main">
   <p:cSld>
     <p:spTree>
@@ -24575,7 +25831,7 @@
             <a:fld id="{2BF067CD-8E6B-4360-9AA8-C5DF2A48A6D1}" type="slidenum">
               <a:rPr lang="en-US" noProof="0" smtClean="0"/>
               <a:pPr/>
-              <a:t>31</a:t>
+              <a:t>32</a:t>
             </a:fld>
             <a:endParaRPr lang="en-US" noProof="0" dirty="0"/>
           </a:p>
@@ -24903,7 +26159,7 @@
 </p:sld>
 </file>
 
-<file path=ppt/slides/slide32.xml><?xml version="1.0" encoding="utf-8"?>
+<file path=ppt/slides/slide33.xml><?xml version="1.0" encoding="utf-8"?>
 <p:sld xmlns:a="http://schemas.openxmlformats.org/drawingml/2006/main" xmlns:r="http://schemas.openxmlformats.org/officeDocument/2006/relationships" xmlns:p="http://schemas.openxmlformats.org/presentationml/2006/main">
   <p:cSld>
     <p:spTree>
@@ -25445,7 +26701,7 @@
             <a:fld id="{2BF067CD-8E6B-4360-9AA8-C5DF2A48A6D1}" type="slidenum">
               <a:rPr lang="en-US" noProof="0" smtClean="0"/>
               <a:pPr/>
-              <a:t>32</a:t>
+              <a:t>33</a:t>
             </a:fld>
             <a:endParaRPr lang="en-US" noProof="0" dirty="0"/>
           </a:p>
@@ -25804,7 +27060,7 @@
 </p:sld>
 </file>
 
-<file path=ppt/slides/slide33.xml><?xml version="1.0" encoding="utf-8"?>
+<file path=ppt/slides/slide34.xml><?xml version="1.0" encoding="utf-8"?>
 <p:sld xmlns:a="http://schemas.openxmlformats.org/drawingml/2006/main" xmlns:r="http://schemas.openxmlformats.org/officeDocument/2006/relationships" xmlns:p="http://schemas.openxmlformats.org/presentationml/2006/main">
   <p:cSld>
     <p:spTree>
@@ -27218,7 +28474,7 @@
             <a:fld id="{2BF067CD-8E6B-4360-9AA8-C5DF2A48A6D1}" type="slidenum">
               <a:rPr lang="en-US" noProof="0" smtClean="0"/>
               <a:pPr/>
-              <a:t>33</a:t>
+              <a:t>34</a:t>
             </a:fld>
             <a:endParaRPr lang="en-US" noProof="0" dirty="0"/>
           </a:p>
@@ -27746,7 +29002,7 @@
 </p:sld>
 </file>
 
-<file path=ppt/slides/slide34.xml><?xml version="1.0" encoding="utf-8"?>
+<file path=ppt/slides/slide35.xml><?xml version="1.0" encoding="utf-8"?>
 <p:sld xmlns:a="http://schemas.openxmlformats.org/drawingml/2006/main" xmlns:r="http://schemas.openxmlformats.org/officeDocument/2006/relationships" xmlns:p="http://schemas.openxmlformats.org/presentationml/2006/main">
   <p:cSld>
     <p:spTree>
@@ -27825,7 +29081,7 @@
 </p:sld>
 </file>
 
-<file path=ppt/slides/slide35.xml><?xml version="1.0" encoding="utf-8"?>
+<file path=ppt/slides/slide36.xml><?xml version="1.0" encoding="utf-8"?>
 <p:sld xmlns:a="http://schemas.openxmlformats.org/drawingml/2006/main" xmlns:r="http://schemas.openxmlformats.org/officeDocument/2006/relationships" xmlns:p="http://schemas.openxmlformats.org/presentationml/2006/main">
   <p:cSld>
     <p:spTree>
@@ -28098,7 +29354,7 @@
             <a:fld id="{2BF067CD-8E6B-4360-9AA8-C5DF2A48A6D1}" type="slidenum">
               <a:rPr lang="en-US" noProof="0" smtClean="0"/>
               <a:pPr/>
-              <a:t>35</a:t>
+              <a:t>36</a:t>
             </a:fld>
             <a:endParaRPr lang="en-US" noProof="0" dirty="0"/>
           </a:p>
@@ -29205,15 +30461,33 @@
                                   </p:childTnLst>
                                 </p:cTn>
                               </p:par>
+                            </p:childTnLst>
+                          </p:cTn>
+                        </p:par>
+                      </p:childTnLst>
+                    </p:cTn>
+                  </p:par>
+                  <p:par>
+                    <p:cTn id="23" fill="hold">
+                      <p:stCondLst>
+                        <p:cond delay="indefinite"/>
+                      </p:stCondLst>
+                      <p:childTnLst>
+                        <p:par>
+                          <p:cTn id="24" fill="hold">
+                            <p:stCondLst>
+                              <p:cond delay="0"/>
+                            </p:stCondLst>
+                            <p:childTnLst>
                               <p:par>
-                                <p:cTn id="23" presetID="1" presetClass="entr" presetSubtype="0" fill="hold" grpId="0" nodeType="withEffect">
+                                <p:cTn id="25" presetID="1" presetClass="entr" presetSubtype="0" fill="hold" grpId="0" nodeType="clickEffect">
                                   <p:stCondLst>
                                     <p:cond delay="0"/>
                                   </p:stCondLst>
                                   <p:childTnLst>
                                     <p:set>
                                       <p:cBhvr>
-                                        <p:cTn id="24" dur="1" fill="hold">
+                                        <p:cTn id="26" dur="1" fill="hold">
                                           <p:stCondLst>
                                             <p:cond delay="0"/>
                                           </p:stCondLst>
@@ -29314,6 +30588,31 @@
               </a:rPr>
               <a:t>частни</a:t>
             </a:r>
+          </a:p>
+          <a:p>
+            <a:r>
+              <a:rPr lang="bg-BG" dirty="0"/>
+              <a:t>Свойствата трябва да бъдат </a:t>
+            </a:r>
+            <a:r>
+              <a:rPr lang="bg-BG" b="1" dirty="0">
+                <a:solidFill>
+                  <a:schemeClr val="bg1"/>
+                </a:solidFill>
+                <a:latin typeface="Calibri" panose="020F0502020204030204" pitchFamily="34" charset="0"/>
+                <a:cs typeface="Calibri" panose="020F0502020204030204" pitchFamily="34" charset="0"/>
+              </a:rPr>
+              <a:t>публични</a:t>
+            </a:r>
+            <a:endParaRPr lang="en-GB" b="1" dirty="0">
+              <a:solidFill>
+                <a:schemeClr val="bg1"/>
+              </a:solidFill>
+              <a:latin typeface="Calibri" panose="020F0502020204030204" pitchFamily="34" charset="0"/>
+              <a:cs typeface="Calibri" panose="020F0502020204030204" pitchFamily="34" charset="0"/>
+            </a:endParaRPr>
+          </a:p>
+          <a:p>
             <a:endParaRPr lang="en-US" b="1" dirty="0">
               <a:solidFill>
                 <a:schemeClr val="bg1"/>
@@ -29341,29 +30640,6 @@
           </a:p>
           <a:p>
             <a:endParaRPr lang="en-GB" dirty="0"/>
-          </a:p>
-          <a:p>
-            <a:r>
-              <a:rPr lang="bg-BG" dirty="0"/>
-              <a:t>Свойствата трябва да бъдат </a:t>
-            </a:r>
-            <a:r>
-              <a:rPr lang="bg-BG" b="1" dirty="0">
-                <a:solidFill>
-                  <a:schemeClr val="bg1"/>
-                </a:solidFill>
-                <a:latin typeface="Calibri" panose="020F0502020204030204" pitchFamily="34" charset="0"/>
-                <a:cs typeface="Calibri" panose="020F0502020204030204" pitchFamily="34" charset="0"/>
-              </a:rPr>
-              <a:t>публични</a:t>
-            </a:r>
-            <a:endParaRPr lang="en-GB" b="1" dirty="0">
-              <a:solidFill>
-                <a:schemeClr val="bg1"/>
-              </a:solidFill>
-              <a:latin typeface="Calibri" panose="020F0502020204030204" pitchFamily="34" charset="0"/>
-              <a:cs typeface="Calibri" panose="020F0502020204030204" pitchFamily="34" charset="0"/>
-            </a:endParaRPr>
           </a:p>
           <a:p>
             <a:endParaRPr lang="bg-BG" dirty="0"/>
@@ -29414,8 +30690,8 @@
         </p:nvGrpSpPr>
         <p:grpSpPr>
           <a:xfrm>
-            <a:off x="830318" y="1911018"/>
-            <a:ext cx="6036284" cy="3516300"/>
+            <a:off x="841604" y="2768868"/>
+            <a:ext cx="6480682" cy="3516300"/>
             <a:chOff x="2478562" y="1839196"/>
             <a:chExt cx="6036284" cy="3516300"/>
           </a:xfrm>
@@ -29656,13 +30932,13 @@
         </p:nvSpPr>
         <p:spPr bwMode="auto">
           <a:xfrm>
-            <a:off x="3924290" y="2844790"/>
-            <a:ext cx="2688799" cy="600541"/>
+            <a:off x="4070814" y="3564000"/>
+            <a:ext cx="3116710" cy="882024"/>
           </a:xfrm>
           <a:prstGeom prst="wedgeRoundRectCallout">
             <a:avLst>
-              <a:gd name="adj1" fmla="val -69172"/>
-              <a:gd name="adj2" fmla="val -43434"/>
+              <a:gd name="adj1" fmla="val -70184"/>
+              <a:gd name="adj2" fmla="val -31518"/>
               <a:gd name="adj3" fmla="val 16667"/>
             </a:avLst>
           </a:prstGeom>
@@ -29724,8 +31000,37 @@
                   <a:srgbClr val="FFFFFF"/>
                 </a:solidFill>
               </a:rPr>
-              <a:t> means "private"</a:t>
-            </a:r>
+              <a:t> </a:t>
+            </a:r>
+            <a:r>
+              <a:rPr lang="bg-BG" sz="2600" b="1" noProof="1">
+                <a:solidFill>
+                  <a:srgbClr val="FFFFFF"/>
+                </a:solidFill>
+              </a:rPr>
+              <a:t>Означава </a:t>
+            </a:r>
+            <a:r>
+              <a:rPr lang="en-US" sz="2600" b="1" noProof="1">
+                <a:solidFill>
+                  <a:srgbClr val="FFFFFF"/>
+                </a:solidFill>
+              </a:rPr>
+              <a:t>"private“</a:t>
+            </a:r>
+            <a:r>
+              <a:rPr lang="bg-BG" sz="2600" b="1" noProof="1">
+                <a:solidFill>
+                  <a:srgbClr val="FFFFFF"/>
+                </a:solidFill>
+              </a:rPr>
+              <a:t> (частно)</a:t>
+            </a:r>
+            <a:endParaRPr lang="en-US" sz="2600" b="1" noProof="1">
+              <a:solidFill>
+                <a:srgbClr val="FFFFFF"/>
+              </a:solidFill>
+            </a:endParaRPr>
           </a:p>
         </p:txBody>
       </p:sp>
@@ -29739,13 +31044,13 @@
         </p:nvSpPr>
         <p:spPr bwMode="auto">
           <a:xfrm>
-            <a:off x="3936000" y="4528658"/>
-            <a:ext cx="2598799" cy="609600"/>
+            <a:off x="4070814" y="5159515"/>
+            <a:ext cx="3116710" cy="916977"/>
           </a:xfrm>
           <a:prstGeom prst="wedgeRoundRectCallout">
             <a:avLst>
-              <a:gd name="adj1" fmla="val -68624"/>
-              <a:gd name="adj2" fmla="val -54544"/>
+              <a:gd name="adj1" fmla="val -71996"/>
+              <a:gd name="adj2" fmla="val -20158"/>
               <a:gd name="adj3" fmla="val 16667"/>
             </a:avLst>
           </a:prstGeom>
@@ -29807,8 +31112,52 @@
                   <a:srgbClr val="FFFFFF"/>
                 </a:solidFill>
               </a:rPr>
-              <a:t> means "public"</a:t>
-            </a:r>
+              <a:t> </a:t>
+            </a:r>
+            <a:r>
+              <a:rPr lang="bg-BG" sz="2600" b="1" noProof="1">
+                <a:solidFill>
+                  <a:srgbClr val="FFFFFF"/>
+                </a:solidFill>
+              </a:rPr>
+              <a:t>Означава</a:t>
+            </a:r>
+            <a:r>
+              <a:rPr lang="en-US" sz="2600" b="1" noProof="1">
+                <a:solidFill>
+                  <a:srgbClr val="FFFFFF"/>
+                </a:solidFill>
+              </a:rPr>
+              <a:t> </a:t>
+            </a:r>
+            <a:br>
+              <a:rPr lang="bg-BG" sz="2600" b="1" noProof="1">
+                <a:solidFill>
+                  <a:srgbClr val="FFFFFF"/>
+                </a:solidFill>
+              </a:rPr>
+            </a:br>
+            <a:r>
+              <a:rPr lang="en-US" sz="2600" b="1" noProof="1">
+                <a:solidFill>
+                  <a:srgbClr val="FFFFFF"/>
+                </a:solidFill>
+              </a:rPr>
+              <a:t>"public"</a:t>
+            </a:r>
+            <a:r>
+              <a:rPr lang="bg-BG" sz="2600" b="1" noProof="1">
+                <a:solidFill>
+                  <a:srgbClr val="FFFFFF"/>
+                </a:solidFill>
+              </a:rPr>
+              <a:t> (публично)</a:t>
+            </a:r>
+            <a:endParaRPr lang="en-US" sz="2600" b="1" noProof="1">
+              <a:solidFill>
+                <a:srgbClr val="FFFFFF"/>
+              </a:solidFill>
+            </a:endParaRPr>
           </a:p>
         </p:txBody>
       </p:sp>
@@ -30144,7 +31493,7 @@
                             </p:stCondLst>
                             <p:childTnLst>
                               <p:par>
-                                <p:cTn id="5" presetID="1" presetClass="entr" presetSubtype="0" fill="hold" grpId="0" nodeType="clickEffect">
+                                <p:cTn id="5" presetID="1" presetClass="entr" presetSubtype="0" fill="hold" nodeType="clickEffect">
                                   <p:stCondLst>
                                     <p:cond delay="0"/>
                                   </p:stCondLst>
@@ -30157,7 +31506,11 @@
                                           </p:stCondLst>
                                         </p:cTn>
                                         <p:tgtEl>
-                                          <p:spTgt spid="9"/>
+                                          <p:spTgt spid="806915">
+                                            <p:txEl>
+                                              <p:pRg st="1" end="1"/>
+                                            </p:txEl>
+                                          </p:spTgt>
                                         </p:tgtEl>
                                         <p:attrNameLst>
                                           <p:attrName>style.visibility</p:attrName>
@@ -30189,7 +31542,7 @@
                             </p:stCondLst>
                             <p:childTnLst>
                               <p:par>
-                                <p:cTn id="9" presetID="1" presetClass="entr" presetSubtype="0" fill="hold" grpId="0" nodeType="clickEffect">
+                                <p:cTn id="9" presetID="1" presetClass="entr" presetSubtype="0" fill="hold" nodeType="clickEffect">
                                   <p:stCondLst>
                                     <p:cond delay="0"/>
                                   </p:stCondLst>
@@ -30202,7 +31555,7 @@
                                           </p:stCondLst>
                                         </p:cTn>
                                         <p:tgtEl>
-                                          <p:spTgt spid="10"/>
+                                          <p:spTgt spid="13"/>
                                         </p:tgtEl>
                                         <p:attrNameLst>
                                           <p:attrName>style.visibility</p:attrName>
@@ -30234,15 +31587,10 @@
                             </p:stCondLst>
                             <p:childTnLst>
                               <p:par>
-                                <p:cTn id="13" presetID="1" presetClass="entr" presetSubtype="0" fill="hold" grpId="0" nodeType="clickEffect" nodePh="1">
+                                <p:cTn id="13" presetID="1" presetClass="entr" presetSubtype="0" fill="hold" grpId="0" nodeType="clickEffect">
                                   <p:stCondLst>
                                     <p:cond delay="0"/>
                                   </p:stCondLst>
-                                  <p:endCondLst>
-                                    <p:cond evt="begin" delay="0">
-                                      <p:tn val="13"/>
-                                    </p:cond>
-                                  </p:endCondLst>
                                   <p:childTnLst>
                                     <p:set>
                                       <p:cBhvr>
@@ -30252,7 +31600,7 @@
                                           </p:stCondLst>
                                         </p:cTn>
                                         <p:tgtEl>
-                                          <p:spTgt spid="11"/>
+                                          <p:spTgt spid="9"/>
                                         </p:tgtEl>
                                         <p:attrNameLst>
                                           <p:attrName>style.visibility</p:attrName>
@@ -30284,7 +31632,7 @@
                             </p:stCondLst>
                             <p:childTnLst>
                               <p:par>
-                                <p:cTn id="17" presetID="1" presetClass="entr" presetSubtype="0" fill="hold" nodeType="clickEffect">
+                                <p:cTn id="17" presetID="1" presetClass="entr" presetSubtype="0" fill="hold" grpId="0" nodeType="clickEffect">
                                   <p:stCondLst>
                                     <p:cond delay="0"/>
                                   </p:stCondLst>
@@ -30297,11 +31645,7 @@
                                           </p:stCondLst>
                                         </p:cTn>
                                         <p:tgtEl>
-                                          <p:spTgt spid="806915">
-                                            <p:txEl>
-                                              <p:pRg st="6" end="6"/>
-                                            </p:txEl>
-                                          </p:spTgt>
+                                          <p:spTgt spid="10"/>
                                         </p:tgtEl>
                                         <p:attrNameLst>
                                           <p:attrName>style.visibility</p:attrName>
@@ -30344,7 +31688,6 @@
     <p:bldLst>
       <p:bldP spid="9" grpId="0" animBg="1"/>
       <p:bldP spid="10" grpId="0" animBg="1"/>
-      <p:bldP spid="11" grpId="0"/>
     </p:bldLst>
   </p:timing>
 </p:sld>

</xml_diff>

<commit_message>
Updated metadata for "09. Encapsulation"
</commit_message>
<xml_diff>
--- a/Courses/Software-Sciences/Module-1-OOP-New/09-Encapsulation/09-Encapsulation.pptx
+++ b/Courses/Software-Sciences/Module-1-OOP-New/09-Encapsulation/09-Encapsulation.pptx
@@ -349,7 +349,7 @@
           <a:p>
             <a:fld id="{4E087215-0C8F-4762-A664-737A353EC9A4}" type="datetimeFigureOut">
               <a:rPr lang="bg-BG" smtClean="0"/>
-              <a:t>17.1.2023 г.</a:t>
+              <a:t>18.01.23 г.</a:t>
             </a:fld>
             <a:endParaRPr lang="bg-BG" dirty="0"/>
           </a:p>
@@ -540,7 +540,7 @@
           <a:p>
             <a:fld id="{72D84649-876A-46C9-8472-14CB09C070D8}" type="datetimeFigureOut">
               <a:rPr lang="en-US" smtClean="0"/>
-              <a:t>17-Jan-23</a:t>
+              <a:t>1/18/23</a:t>
             </a:fld>
             <a:endParaRPr lang="en-US" dirty="0"/>
           </a:p>
@@ -12298,8 +12298,8 @@
         </p:nvSpPr>
         <p:spPr>
           <a:xfrm>
-            <a:off x="1033608" y="2799000"/>
-            <a:ext cx="10417392" cy="3952408"/>
+            <a:off x="1033608" y="2851592"/>
+            <a:ext cx="10124784" cy="3952408"/>
           </a:xfrm>
           <a:prstGeom prst="rect">
             <a:avLst/>
@@ -12453,7 +12453,7 @@
             </a:pPr>
             <a:r>
               <a:rPr lang="en-GB" sz="2400" dirty="0"/>
-              <a:t>    return $"The student’s name is </a:t>
+              <a:t>    return $"The student’s name is</a:t>
             </a:r>
             <a:r>
               <a:rPr lang="en-US" sz="2400" dirty="0"/>

</xml_diff>

<commit_message>
Uploaded correct slides for "09. Encapsulation"
</commit_message>
<xml_diff>
--- a/Courses/Software-Sciences/Module-1-OOP-New/09-Encapsulation/09-Encapsulation.pptx
+++ b/Courses/Software-Sciences/Module-1-OOP-New/09-Encapsulation/09-Encapsulation.pptx
@@ -12298,8 +12298,8 @@
         </p:nvSpPr>
         <p:spPr>
           <a:xfrm>
-            <a:off x="1033608" y="2851592"/>
-            <a:ext cx="10124784" cy="3952408"/>
+            <a:off x="1033608" y="2799000"/>
+            <a:ext cx="10417392" cy="3952408"/>
           </a:xfrm>
           <a:prstGeom prst="rect">
             <a:avLst/>
@@ -12453,7 +12453,7 @@
             </a:pPr>
             <a:r>
               <a:rPr lang="en-GB" sz="2400" dirty="0"/>
-              <a:t>    return $"The student’s name is</a:t>
+              <a:t>    return $"The student’s name is </a:t>
             </a:r>
             <a:r>
               <a:rPr lang="en-US" sz="2400" dirty="0"/>

</xml_diff>